<commit_message>
Starting the section on ways of storing sparse matrices.
</commit_message>
<xml_diff>
--- a/Data Mining Presentation.pptx
+++ b/Data Mining Presentation.pptx
@@ -9,11 +9,12 @@
     <p:sldId id="261" r:id="rId3"/>
     <p:sldId id="262" r:id="rId4"/>
     <p:sldId id="263" r:id="rId5"/>
-    <p:sldId id="264" r:id="rId6"/>
-    <p:sldId id="257" r:id="rId7"/>
-    <p:sldId id="258" r:id="rId8"/>
-    <p:sldId id="259" r:id="rId9"/>
-    <p:sldId id="260" r:id="rId10"/>
+    <p:sldId id="265" r:id="rId6"/>
+    <p:sldId id="266" r:id="rId7"/>
+    <p:sldId id="257" r:id="rId8"/>
+    <p:sldId id="258" r:id="rId9"/>
+    <p:sldId id="259" r:id="rId10"/>
+    <p:sldId id="260" r:id="rId11"/>
   </p:sldIdLst>
   <p:sldSz cx="12192000" cy="6858000"/>
   <p:notesSz cx="6858000" cy="9144000"/>
@@ -251,7 +252,7 @@
           <a:p>
             <a:fld id="{A7240CF3-A3AC-47B2-BAF2-362E5A25AD91}" type="datetimeFigureOut">
               <a:rPr lang="en-US" smtClean="0"/>
-              <a:t>6/4/2021</a:t>
+              <a:t>6/5/2021</a:t>
             </a:fld>
             <a:endParaRPr lang="en-US"/>
           </a:p>
@@ -421,7 +422,7 @@
           <a:p>
             <a:fld id="{A7240CF3-A3AC-47B2-BAF2-362E5A25AD91}" type="datetimeFigureOut">
               <a:rPr lang="en-US" smtClean="0"/>
-              <a:t>6/4/2021</a:t>
+              <a:t>6/5/2021</a:t>
             </a:fld>
             <a:endParaRPr lang="en-US"/>
           </a:p>
@@ -601,7 +602,7 @@
           <a:p>
             <a:fld id="{A7240CF3-A3AC-47B2-BAF2-362E5A25AD91}" type="datetimeFigureOut">
               <a:rPr lang="en-US" smtClean="0"/>
-              <a:t>6/4/2021</a:t>
+              <a:t>6/5/2021</a:t>
             </a:fld>
             <a:endParaRPr lang="en-US"/>
           </a:p>
@@ -771,7 +772,7 @@
           <a:p>
             <a:fld id="{A7240CF3-A3AC-47B2-BAF2-362E5A25AD91}" type="datetimeFigureOut">
               <a:rPr lang="en-US" smtClean="0"/>
-              <a:t>6/4/2021</a:t>
+              <a:t>6/5/2021</a:t>
             </a:fld>
             <a:endParaRPr lang="en-US"/>
           </a:p>
@@ -1017,7 +1018,7 @@
           <a:p>
             <a:fld id="{A7240CF3-A3AC-47B2-BAF2-362E5A25AD91}" type="datetimeFigureOut">
               <a:rPr lang="en-US" smtClean="0"/>
-              <a:t>6/4/2021</a:t>
+              <a:t>6/5/2021</a:t>
             </a:fld>
             <a:endParaRPr lang="en-US"/>
           </a:p>
@@ -1249,7 +1250,7 @@
           <a:p>
             <a:fld id="{A7240CF3-A3AC-47B2-BAF2-362E5A25AD91}" type="datetimeFigureOut">
               <a:rPr lang="en-US" smtClean="0"/>
-              <a:t>6/4/2021</a:t>
+              <a:t>6/5/2021</a:t>
             </a:fld>
             <a:endParaRPr lang="en-US"/>
           </a:p>
@@ -1616,7 +1617,7 @@
           <a:p>
             <a:fld id="{A7240CF3-A3AC-47B2-BAF2-362E5A25AD91}" type="datetimeFigureOut">
               <a:rPr lang="en-US" smtClean="0"/>
-              <a:t>6/4/2021</a:t>
+              <a:t>6/5/2021</a:t>
             </a:fld>
             <a:endParaRPr lang="en-US"/>
           </a:p>
@@ -1734,7 +1735,7 @@
           <a:p>
             <a:fld id="{A7240CF3-A3AC-47B2-BAF2-362E5A25AD91}" type="datetimeFigureOut">
               <a:rPr lang="en-US" smtClean="0"/>
-              <a:t>6/4/2021</a:t>
+              <a:t>6/5/2021</a:t>
             </a:fld>
             <a:endParaRPr lang="en-US"/>
           </a:p>
@@ -1829,7 +1830,7 @@
           <a:p>
             <a:fld id="{A7240CF3-A3AC-47B2-BAF2-362E5A25AD91}" type="datetimeFigureOut">
               <a:rPr lang="en-US" smtClean="0"/>
-              <a:t>6/4/2021</a:t>
+              <a:t>6/5/2021</a:t>
             </a:fld>
             <a:endParaRPr lang="en-US"/>
           </a:p>
@@ -2106,7 +2107,7 @@
           <a:p>
             <a:fld id="{A7240CF3-A3AC-47B2-BAF2-362E5A25AD91}" type="datetimeFigureOut">
               <a:rPr lang="en-US" smtClean="0"/>
-              <a:t>6/4/2021</a:t>
+              <a:t>6/5/2021</a:t>
             </a:fld>
             <a:endParaRPr lang="en-US"/>
           </a:p>
@@ -2359,7 +2360,7 @@
           <a:p>
             <a:fld id="{A7240CF3-A3AC-47B2-BAF2-362E5A25AD91}" type="datetimeFigureOut">
               <a:rPr lang="en-US" smtClean="0"/>
-              <a:t>6/4/2021</a:t>
+              <a:t>6/5/2021</a:t>
             </a:fld>
             <a:endParaRPr lang="en-US"/>
           </a:p>
@@ -2572,7 +2573,7 @@
           <a:p>
             <a:fld id="{A7240CF3-A3AC-47B2-BAF2-362E5A25AD91}" type="datetimeFigureOut">
               <a:rPr lang="en-US" smtClean="0"/>
-              <a:t>6/4/2021</a:t>
+              <a:t>6/5/2021</a:t>
             </a:fld>
             <a:endParaRPr lang="en-US"/>
           </a:p>
@@ -2961,7 +2962,7 @@
 </file>
 
 <file path=ppt/slides/slide1.xml><?xml version="1.0" encoding="utf-8"?>
-<p:sld xmlns:a="http://schemas.openxmlformats.org/drawingml/2006/main" xmlns:r="http://schemas.openxmlformats.org/officeDocument/2006/relationships" xmlns:p="http://schemas.openxmlformats.org/presentationml/2006/main">
+<p:sld xmlns:a="http://schemas.openxmlformats.org/drawingml/2006/main" xmlns:r="http://schemas.openxmlformats.org/officeDocument/2006/relationships" xmlns:p="http://schemas.openxmlformats.org/presentationml/2006/main" show="0">
   <p:cSld>
     <p:spTree>
       <p:nvGrpSpPr>
@@ -3040,1842 +3041,19 @@
   <p:clrMapOvr>
     <a:masterClrMapping/>
   </p:clrMapOvr>
+  <mc:AlternateContent xmlns:mc="http://schemas.openxmlformats.org/markup-compatibility/2006">
+    <mc:Choice xmlns:p14="http://schemas.microsoft.com/office/powerpoint/2010/main" Requires="p14">
+      <p:transition spd="slow" p14:dur="2000"/>
+    </mc:Choice>
+    <mc:Fallback>
+      <p:transition spd="slow"/>
+    </mc:Fallback>
+  </mc:AlternateContent>
 </p:sld>
 </file>
 
-<file path=ppt/slides/slide2.xml><?xml version="1.0" encoding="utf-8"?>
-<p:sld xmlns:a="http://schemas.openxmlformats.org/drawingml/2006/main" xmlns:r="http://schemas.openxmlformats.org/officeDocument/2006/relationships" xmlns:p="http://schemas.openxmlformats.org/presentationml/2006/main">
-  <p:cSld>
-    <p:spTree>
-      <p:nvGrpSpPr>
-        <p:cNvPr id="1" name=""/>
-        <p:cNvGrpSpPr/>
-        <p:nvPr/>
-      </p:nvGrpSpPr>
-      <p:grpSpPr>
-        <a:xfrm>
-          <a:off x="0" y="0"/>
-          <a:ext cx="0" cy="0"/>
-          <a:chOff x="0" y="0"/>
-          <a:chExt cx="0" cy="0"/>
-        </a:xfrm>
-      </p:grpSpPr>
-      <p:sp>
-        <p:nvSpPr>
-          <p:cNvPr id="2" name="Title 1"/>
-          <p:cNvSpPr>
-            <a:spLocks noGrp="1"/>
-          </p:cNvSpPr>
-          <p:nvPr>
-            <p:ph type="title"/>
-          </p:nvPr>
-        </p:nvSpPr>
-        <p:spPr>
-          <a:gradFill>
-            <a:gsLst>
-              <a:gs pos="0">
-                <a:schemeClr val="accent1">
-                  <a:lumMod val="5000"/>
-                  <a:lumOff val="95000"/>
-                </a:schemeClr>
-              </a:gs>
-              <a:gs pos="74000">
-                <a:schemeClr val="accent1">
-                  <a:lumMod val="45000"/>
-                  <a:lumOff val="55000"/>
-                </a:schemeClr>
-              </a:gs>
-              <a:gs pos="83000">
-                <a:schemeClr val="accent1">
-                  <a:lumMod val="45000"/>
-                  <a:lumOff val="55000"/>
-                </a:schemeClr>
-              </a:gs>
-              <a:gs pos="100000">
-                <a:schemeClr val="accent1">
-                  <a:lumMod val="30000"/>
-                  <a:lumOff val="70000"/>
-                </a:schemeClr>
-              </a:gs>
-            </a:gsLst>
-            <a:lin ang="5400000" scaled="1"/>
-          </a:gradFill>
-        </p:spPr>
-        <p:txBody>
-          <a:bodyPr>
-            <a:normAutofit/>
-          </a:bodyPr>
-          <a:lstStyle/>
-          <a:p>
-            <a:pPr algn="ctr"/>
-            <a:r>
-              <a:rPr lang="en-US" dirty="0" smtClean="0"/>
-              <a:t>Let’s State A Problem</a:t>
-            </a:r>
-            <a:endParaRPr lang="en-US" dirty="0"/>
-          </a:p>
-        </p:txBody>
-      </p:sp>
-      <p:sp>
-        <p:nvSpPr>
-          <p:cNvPr id="3" name="Content Placeholder 2"/>
-          <p:cNvSpPr>
-            <a:spLocks noGrp="1"/>
-          </p:cNvSpPr>
-          <p:nvPr>
-            <p:ph idx="1"/>
-          </p:nvPr>
-        </p:nvSpPr>
-        <p:spPr/>
-        <p:txBody>
-          <a:bodyPr>
-            <a:normAutofit/>
-          </a:bodyPr>
-          <a:lstStyle/>
-          <a:p>
-            <a:pPr algn="just">
-              <a:spcAft>
-                <a:spcPts val="1200"/>
-              </a:spcAft>
-            </a:pPr>
-            <a:r>
-              <a:rPr lang="en-US" sz="3400" dirty="0" smtClean="0"/>
-              <a:t>In social networks, often a form of an adjacency matrix is used to store the information about users that follow each other.</a:t>
-            </a:r>
-            <a:endParaRPr lang="en-US" sz="3400" dirty="0" smtClean="0"/>
-          </a:p>
-          <a:p>
-            <a:pPr algn="just">
-              <a:spcAft>
-                <a:spcPts val="1200"/>
-              </a:spcAft>
-            </a:pPr>
-            <a:endParaRPr lang="en-US" sz="3400" dirty="0" smtClean="0"/>
-          </a:p>
-          <a:p>
-            <a:pPr marL="0" indent="0" algn="just">
-              <a:spcAft>
-                <a:spcPts val="1200"/>
-              </a:spcAft>
-              <a:buNone/>
-            </a:pPr>
-            <a:endParaRPr lang="en-US" sz="3200" dirty="0"/>
-          </a:p>
-        </p:txBody>
-      </p:sp>
-    </p:spTree>
-    <p:extLst>
-      <p:ext uri="{BB962C8B-B14F-4D97-AF65-F5344CB8AC3E}">
-        <p14:creationId xmlns:p14="http://schemas.microsoft.com/office/powerpoint/2010/main" val="905099816"/>
-      </p:ext>
-    </p:extLst>
-  </p:cSld>
-  <p:clrMapOvr>
-    <a:masterClrMapping/>
-  </p:clrMapOvr>
-</p:sld>
-</file>
-
-<file path=ppt/slides/slide3.xml><?xml version="1.0" encoding="utf-8"?>
-<p:sld xmlns:a="http://schemas.openxmlformats.org/drawingml/2006/main" xmlns:r="http://schemas.openxmlformats.org/officeDocument/2006/relationships" xmlns:p="http://schemas.openxmlformats.org/presentationml/2006/main">
-  <p:cSld>
-    <p:spTree>
-      <p:nvGrpSpPr>
-        <p:cNvPr id="1" name=""/>
-        <p:cNvGrpSpPr/>
-        <p:nvPr/>
-      </p:nvGrpSpPr>
-      <p:grpSpPr>
-        <a:xfrm>
-          <a:off x="0" y="0"/>
-          <a:ext cx="0" cy="0"/>
-          <a:chOff x="0" y="0"/>
-          <a:chExt cx="0" cy="0"/>
-        </a:xfrm>
-      </p:grpSpPr>
-      <p:sp>
-        <p:nvSpPr>
-          <p:cNvPr id="2" name="Title 1"/>
-          <p:cNvSpPr>
-            <a:spLocks noGrp="1"/>
-          </p:cNvSpPr>
-          <p:nvPr>
-            <p:ph type="title"/>
-          </p:nvPr>
-        </p:nvSpPr>
-        <p:spPr>
-          <a:gradFill>
-            <a:gsLst>
-              <a:gs pos="0">
-                <a:schemeClr val="accent1">
-                  <a:lumMod val="5000"/>
-                  <a:lumOff val="95000"/>
-                </a:schemeClr>
-              </a:gs>
-              <a:gs pos="74000">
-                <a:schemeClr val="accent1">
-                  <a:lumMod val="45000"/>
-                  <a:lumOff val="55000"/>
-                </a:schemeClr>
-              </a:gs>
-              <a:gs pos="83000">
-                <a:schemeClr val="accent1">
-                  <a:lumMod val="45000"/>
-                  <a:lumOff val="55000"/>
-                </a:schemeClr>
-              </a:gs>
-              <a:gs pos="100000">
-                <a:schemeClr val="accent1">
-                  <a:lumMod val="30000"/>
-                  <a:lumOff val="70000"/>
-                </a:schemeClr>
-              </a:gs>
-            </a:gsLst>
-            <a:lin ang="5400000" scaled="1"/>
-          </a:gradFill>
-        </p:spPr>
-        <p:txBody>
-          <a:bodyPr>
-            <a:normAutofit/>
-          </a:bodyPr>
-          <a:lstStyle/>
-          <a:p>
-            <a:pPr algn="ctr"/>
-            <a:r>
-              <a:rPr lang="en-US" dirty="0" smtClean="0"/>
-              <a:t>Let’s State A Problem</a:t>
-            </a:r>
-            <a:endParaRPr lang="en-US" dirty="0"/>
-          </a:p>
-        </p:txBody>
-      </p:sp>
-      <mc:AlternateContent xmlns:mc="http://schemas.openxmlformats.org/markup-compatibility/2006">
-        <mc:Choice xmlns:a14="http://schemas.microsoft.com/office/drawing/2010/main" Requires="a14">
-          <p:sp>
-            <p:nvSpPr>
-              <p:cNvPr id="6" name="TextBox 5"/>
-              <p:cNvSpPr txBox="1"/>
-              <p:nvPr/>
-            </p:nvSpPr>
-            <p:spPr>
-              <a:xfrm>
-                <a:off x="4321732" y="2900218"/>
-                <a:ext cx="3548536" cy="2547492"/>
-              </a:xfrm>
-              <a:prstGeom prst="rect">
-                <a:avLst/>
-              </a:prstGeom>
-              <a:noFill/>
-            </p:spPr>
-            <p:txBody>
-              <a:bodyPr wrap="none" lIns="0" tIns="0" rIns="0" bIns="0" rtlCol="0">
-                <a:spAutoFit/>
-              </a:bodyPr>
-              <a:lstStyle/>
-              <a:p>
-                <a14:m>
-                  <m:oMathPara xmlns:m="http://schemas.openxmlformats.org/officeDocument/2006/math">
-                    <m:oMathParaPr>
-                      <m:jc m:val="centerGroup"/>
-                    </m:oMathParaPr>
-                    <m:oMath xmlns:m="http://schemas.openxmlformats.org/officeDocument/2006/math">
-                      <m:d>
-                        <m:dPr>
-                          <m:begChr m:val="["/>
-                          <m:endChr m:val="]"/>
-                          <m:ctrlPr>
-                            <a:rPr lang="en-US" sz="3600" b="0" i="1" smtClean="0">
-                              <a:latin typeface="Cambria Math" panose="02040503050406030204" pitchFamily="18" charset="0"/>
-                            </a:rPr>
-                          </m:ctrlPr>
-                        </m:dPr>
-                        <m:e>
-                          <m:m>
-                            <m:mPr>
-                              <m:mcs>
-                                <m:mc>
-                                  <m:mcPr>
-                                    <m:count m:val="5"/>
-                                    <m:mcJc m:val="center"/>
-                                  </m:mcPr>
-                                </m:mc>
-                              </m:mcs>
-                              <m:ctrlPr>
-                                <a:rPr lang="en-US" sz="3600" i="1">
-                                  <a:latin typeface="Cambria Math" panose="02040503050406030204" pitchFamily="18" charset="0"/>
-                                </a:rPr>
-                              </m:ctrlPr>
-                            </m:mPr>
-                            <m:mr>
-                              <m:e>
-                                <m:r>
-                                  <m:rPr>
-                                    <m:brk m:alnAt="7"/>
-                                  </m:rPr>
-                                  <a:rPr lang="en-US" sz="3600" b="0" i="1" smtClean="0">
-                                    <a:latin typeface="Cambria Math" panose="02040503050406030204" pitchFamily="18" charset="0"/>
-                                  </a:rPr>
-                                  <m:t>0</m:t>
-                                </m:r>
-                              </m:e>
-                              <m:e>
-                                <m:r>
-                                  <a:rPr lang="en-US" sz="3600" b="0" i="1" smtClean="0">
-                                    <a:latin typeface="Cambria Math" panose="02040503050406030204" pitchFamily="18" charset="0"/>
-                                  </a:rPr>
-                                  <m:t>0</m:t>
-                                </m:r>
-                              </m:e>
-                              <m:e>
-                                <m:r>
-                                  <a:rPr lang="en-US" sz="3600" b="0" i="1" smtClean="0">
-                                    <a:latin typeface="Cambria Math" panose="02040503050406030204" pitchFamily="18" charset="0"/>
-                                  </a:rPr>
-                                  <m:t>1</m:t>
-                                </m:r>
-                              </m:e>
-                              <m:e>
-                                <m:r>
-                                  <a:rPr lang="en-US" sz="3600" b="0" i="1" smtClean="0">
-                                    <a:latin typeface="Cambria Math" panose="02040503050406030204" pitchFamily="18" charset="0"/>
-                                  </a:rPr>
-                                  <m:t>0</m:t>
-                                </m:r>
-                              </m:e>
-                              <m:e>
-                                <m:r>
-                                  <a:rPr lang="en-US" sz="3600" b="0" i="1" smtClean="0">
-                                    <a:latin typeface="Cambria Math" panose="02040503050406030204" pitchFamily="18" charset="0"/>
-                                  </a:rPr>
-                                  <m:t>1</m:t>
-                                </m:r>
-                              </m:e>
-                            </m:mr>
-                            <m:mr>
-                              <m:e>
-                                <m:r>
-                                  <a:rPr lang="en-US" sz="3600" b="0" i="1" smtClean="0">
-                                    <a:latin typeface="Cambria Math" panose="02040503050406030204" pitchFamily="18" charset="0"/>
-                                  </a:rPr>
-                                  <m:t>0</m:t>
-                                </m:r>
-                              </m:e>
-                              <m:e>
-                                <m:r>
-                                  <a:rPr lang="en-US" sz="3600" b="0" i="1" smtClean="0">
-                                    <a:latin typeface="Cambria Math" panose="02040503050406030204" pitchFamily="18" charset="0"/>
-                                  </a:rPr>
-                                  <m:t>0</m:t>
-                                </m:r>
-                              </m:e>
-                              <m:e>
-                                <m:r>
-                                  <a:rPr lang="en-US" sz="3600" b="0" i="1" smtClean="0">
-                                    <a:latin typeface="Cambria Math" panose="02040503050406030204" pitchFamily="18" charset="0"/>
-                                  </a:rPr>
-                                  <m:t>1</m:t>
-                                </m:r>
-                              </m:e>
-                              <m:e>
-                                <m:r>
-                                  <a:rPr lang="en-US" sz="3600" b="0" i="1" smtClean="0">
-                                    <a:latin typeface="Cambria Math" panose="02040503050406030204" pitchFamily="18" charset="0"/>
-                                  </a:rPr>
-                                  <m:t>1</m:t>
-                                </m:r>
-                              </m:e>
-                              <m:e>
-                                <m:r>
-                                  <a:rPr lang="en-US" sz="3600" b="0" i="1" smtClean="0">
-                                    <a:latin typeface="Cambria Math" panose="02040503050406030204" pitchFamily="18" charset="0"/>
-                                  </a:rPr>
-                                  <m:t>0</m:t>
-                                </m:r>
-                              </m:e>
-                            </m:mr>
-                            <m:mr>
-                              <m:e>
-                                <m:r>
-                                  <a:rPr lang="en-US" sz="3600" b="0" i="1" smtClean="0">
-                                    <a:latin typeface="Cambria Math" panose="02040503050406030204" pitchFamily="18" charset="0"/>
-                                  </a:rPr>
-                                  <m:t>1</m:t>
-                                </m:r>
-                              </m:e>
-                              <m:e>
-                                <m:r>
-                                  <a:rPr lang="en-US" sz="3600" b="0" i="1" smtClean="0">
-                                    <a:latin typeface="Cambria Math" panose="02040503050406030204" pitchFamily="18" charset="0"/>
-                                  </a:rPr>
-                                  <m:t>0</m:t>
-                                </m:r>
-                              </m:e>
-                              <m:e>
-                                <m:r>
-                                  <a:rPr lang="en-US" sz="3600" b="0" i="1" smtClean="0">
-                                    <a:latin typeface="Cambria Math" panose="02040503050406030204" pitchFamily="18" charset="0"/>
-                                  </a:rPr>
-                                  <m:t>0</m:t>
-                                </m:r>
-                              </m:e>
-                              <m:e>
-                                <m:r>
-                                  <a:rPr lang="en-US" sz="3600" b="0" i="1" smtClean="0">
-                                    <a:latin typeface="Cambria Math" panose="02040503050406030204" pitchFamily="18" charset="0"/>
-                                  </a:rPr>
-                                  <m:t>0</m:t>
-                                </m:r>
-                              </m:e>
-                              <m:e>
-                                <m:r>
-                                  <a:rPr lang="en-US" sz="3600" b="0" i="1" smtClean="0">
-                                    <a:latin typeface="Cambria Math" panose="02040503050406030204" pitchFamily="18" charset="0"/>
-                                  </a:rPr>
-                                  <m:t>1</m:t>
-                                </m:r>
-                              </m:e>
-                            </m:mr>
-                            <m:mr>
-                              <m:e>
-                                <m:r>
-                                  <a:rPr lang="en-US" sz="3600" b="0" i="1" smtClean="0">
-                                    <a:latin typeface="Cambria Math" panose="02040503050406030204" pitchFamily="18" charset="0"/>
-                                  </a:rPr>
-                                  <m:t>1</m:t>
-                                </m:r>
-                              </m:e>
-                              <m:e>
-                                <m:r>
-                                  <a:rPr lang="en-US" sz="3600" b="0" i="1" smtClean="0">
-                                    <a:latin typeface="Cambria Math" panose="02040503050406030204" pitchFamily="18" charset="0"/>
-                                  </a:rPr>
-                                  <m:t>1</m:t>
-                                </m:r>
-                              </m:e>
-                              <m:e>
-                                <m:r>
-                                  <a:rPr lang="en-US" sz="3600" b="0" i="1" smtClean="0">
-                                    <a:latin typeface="Cambria Math" panose="02040503050406030204" pitchFamily="18" charset="0"/>
-                                  </a:rPr>
-                                  <m:t>0</m:t>
-                                </m:r>
-                              </m:e>
-                              <m:e>
-                                <m:r>
-                                  <a:rPr lang="en-US" sz="3600" b="0" i="1" smtClean="0">
-                                    <a:latin typeface="Cambria Math" panose="02040503050406030204" pitchFamily="18" charset="0"/>
-                                  </a:rPr>
-                                  <m:t>0</m:t>
-                                </m:r>
-                              </m:e>
-                              <m:e>
-                                <m:r>
-                                  <a:rPr lang="en-US" sz="3600" b="0" i="1" smtClean="0">
-                                    <a:latin typeface="Cambria Math" panose="02040503050406030204" pitchFamily="18" charset="0"/>
-                                  </a:rPr>
-                                  <m:t>0</m:t>
-                                </m:r>
-                              </m:e>
-                            </m:mr>
-                            <m:mr>
-                              <m:e>
-                                <m:r>
-                                  <a:rPr lang="en-US" sz="3600" b="0" i="1" smtClean="0">
-                                    <a:latin typeface="Cambria Math" panose="02040503050406030204" pitchFamily="18" charset="0"/>
-                                  </a:rPr>
-                                  <m:t>1</m:t>
-                                </m:r>
-                              </m:e>
-                              <m:e>
-                                <m:r>
-                                  <a:rPr lang="en-US" sz="3600" b="0" i="1" smtClean="0">
-                                    <a:latin typeface="Cambria Math" panose="02040503050406030204" pitchFamily="18" charset="0"/>
-                                  </a:rPr>
-                                  <m:t>0</m:t>
-                                </m:r>
-                              </m:e>
-                              <m:e>
-                                <m:r>
-                                  <a:rPr lang="en-US" sz="3600" b="0" i="1" smtClean="0">
-                                    <a:latin typeface="Cambria Math" panose="02040503050406030204" pitchFamily="18" charset="0"/>
-                                  </a:rPr>
-                                  <m:t>0</m:t>
-                                </m:r>
-                              </m:e>
-                              <m:e>
-                                <m:r>
-                                  <a:rPr lang="en-US" sz="3600" b="0" i="1" smtClean="0">
-                                    <a:latin typeface="Cambria Math" panose="02040503050406030204" pitchFamily="18" charset="0"/>
-                                  </a:rPr>
-                                  <m:t>1</m:t>
-                                </m:r>
-                              </m:e>
-                              <m:e>
-                                <m:r>
-                                  <a:rPr lang="en-US" sz="3600" b="0" i="1" smtClean="0">
-                                    <a:latin typeface="Cambria Math" panose="02040503050406030204" pitchFamily="18" charset="0"/>
-                                  </a:rPr>
-                                  <m:t>0</m:t>
-                                </m:r>
-                              </m:e>
-                            </m:mr>
-                          </m:m>
-                        </m:e>
-                      </m:d>
-                    </m:oMath>
-                  </m:oMathPara>
-                </a14:m>
-                <a:endParaRPr lang="en-US" sz="3600" dirty="0"/>
-              </a:p>
-            </p:txBody>
-          </p:sp>
-        </mc:Choice>
-        <mc:Fallback>
-          <p:sp>
-            <p:nvSpPr>
-              <p:cNvPr id="6" name="TextBox 5"/>
-              <p:cNvSpPr txBox="1">
-                <a:spLocks noRot="1" noChangeAspect="1" noMove="1" noResize="1" noEditPoints="1" noAdjustHandles="1" noChangeArrowheads="1" noChangeShapeType="1" noTextEdit="1"/>
-              </p:cNvSpPr>
-              <p:nvPr/>
-            </p:nvSpPr>
-            <p:spPr>
-              <a:xfrm>
-                <a:off x="4321732" y="2900218"/>
-                <a:ext cx="3548536" cy="2547492"/>
-              </a:xfrm>
-              <a:prstGeom prst="rect">
-                <a:avLst/>
-              </a:prstGeom>
-              <a:blipFill>
-                <a:blip r:embed="rId2"/>
-                <a:stretch>
-                  <a:fillRect/>
-                </a:stretch>
-              </a:blipFill>
-            </p:spPr>
-            <p:txBody>
-              <a:bodyPr/>
-              <a:lstStyle/>
-              <a:p>
-                <a:r>
-                  <a:rPr lang="en-US">
-                    <a:noFill/>
-                  </a:rPr>
-                  <a:t> </a:t>
-                </a:r>
-              </a:p>
-            </p:txBody>
-          </p:sp>
-        </mc:Fallback>
-      </mc:AlternateContent>
-      <mc:AlternateContent xmlns:mc="http://schemas.openxmlformats.org/markup-compatibility/2006">
-        <mc:Choice xmlns:a14="http://schemas.microsoft.com/office/drawing/2010/main" Requires="a14">
-          <p:sp>
-            <p:nvSpPr>
-              <p:cNvPr id="7" name="TextBox 6"/>
-              <p:cNvSpPr txBox="1"/>
-              <p:nvPr/>
-            </p:nvSpPr>
-            <p:spPr>
-              <a:xfrm>
-                <a:off x="4483379" y="2138527"/>
-                <a:ext cx="3225242" cy="553998"/>
-              </a:xfrm>
-              <a:prstGeom prst="rect">
-                <a:avLst/>
-              </a:prstGeom>
-              <a:noFill/>
-            </p:spPr>
-            <p:txBody>
-              <a:bodyPr wrap="none" lIns="0" tIns="0" rIns="0" bIns="0" rtlCol="0">
-                <a:spAutoFit/>
-              </a:bodyPr>
-              <a:lstStyle/>
-              <a:p>
-                <a14:m>
-                  <m:oMathPara xmlns:m="http://schemas.openxmlformats.org/officeDocument/2006/math">
-                    <m:oMathParaPr>
-                      <m:jc m:val="centerGroup"/>
-                    </m:oMathParaPr>
-                    <m:oMath xmlns:m="http://schemas.openxmlformats.org/officeDocument/2006/math">
-                      <m:m>
-                        <m:mPr>
-                          <m:mcs>
-                            <m:mc>
-                              <m:mcPr>
-                                <m:count m:val="5"/>
-                                <m:mcJc m:val="center"/>
-                              </m:mcPr>
-                            </m:mc>
-                          </m:mcs>
-                          <m:ctrlPr>
-                            <a:rPr lang="en-US" sz="3600" i="1" smtClean="0">
-                              <a:latin typeface="Cambria Math" panose="02040503050406030204" pitchFamily="18" charset="0"/>
-                            </a:rPr>
-                          </m:ctrlPr>
-                        </m:mPr>
-                        <m:mr>
-                          <m:e>
-                            <m:r>
-                              <m:rPr>
-                                <m:brk m:alnAt="7"/>
-                              </m:rPr>
-                              <a:rPr lang="en-US" sz="3600" b="0" i="1" smtClean="0">
-                                <a:latin typeface="Cambria Math" panose="02040503050406030204" pitchFamily="18" charset="0"/>
-                              </a:rPr>
-                              <m:t>1</m:t>
-                            </m:r>
-                          </m:e>
-                          <m:e>
-                            <m:r>
-                              <a:rPr lang="en-US" sz="3600" b="0" i="1" smtClean="0">
-                                <a:latin typeface="Cambria Math" panose="02040503050406030204" pitchFamily="18" charset="0"/>
-                              </a:rPr>
-                              <m:t>2</m:t>
-                            </m:r>
-                          </m:e>
-                          <m:e>
-                            <m:r>
-                              <a:rPr lang="en-US" sz="3600" b="0" i="1" smtClean="0">
-                                <a:latin typeface="Cambria Math" panose="02040503050406030204" pitchFamily="18" charset="0"/>
-                              </a:rPr>
-                              <m:t>3</m:t>
-                            </m:r>
-                          </m:e>
-                          <m:e>
-                            <m:r>
-                              <a:rPr lang="en-US" sz="3600" b="0" i="1" smtClean="0">
-                                <a:latin typeface="Cambria Math" panose="02040503050406030204" pitchFamily="18" charset="0"/>
-                              </a:rPr>
-                              <m:t>4</m:t>
-                            </m:r>
-                          </m:e>
-                          <m:e>
-                            <m:r>
-                              <a:rPr lang="en-US" sz="3600" b="0" i="1" smtClean="0">
-                                <a:latin typeface="Cambria Math" panose="02040503050406030204" pitchFamily="18" charset="0"/>
-                              </a:rPr>
-                              <m:t>5</m:t>
-                            </m:r>
-                          </m:e>
-                        </m:mr>
-                      </m:m>
-                    </m:oMath>
-                  </m:oMathPara>
-                </a14:m>
-                <a:endParaRPr lang="en-US" sz="3600" dirty="0"/>
-              </a:p>
-            </p:txBody>
-          </p:sp>
-        </mc:Choice>
-        <mc:Fallback>
-          <p:sp>
-            <p:nvSpPr>
-              <p:cNvPr id="7" name="TextBox 6"/>
-              <p:cNvSpPr txBox="1">
-                <a:spLocks noRot="1" noChangeAspect="1" noMove="1" noResize="1" noEditPoints="1" noAdjustHandles="1" noChangeArrowheads="1" noChangeShapeType="1" noTextEdit="1"/>
-              </p:cNvSpPr>
-              <p:nvPr/>
-            </p:nvSpPr>
-            <p:spPr>
-              <a:xfrm>
-                <a:off x="4483379" y="2138527"/>
-                <a:ext cx="3225242" cy="553998"/>
-              </a:xfrm>
-              <a:prstGeom prst="rect">
-                <a:avLst/>
-              </a:prstGeom>
-              <a:blipFill>
-                <a:blip r:embed="rId3"/>
-                <a:stretch>
-                  <a:fillRect/>
-                </a:stretch>
-              </a:blipFill>
-            </p:spPr>
-            <p:txBody>
-              <a:bodyPr/>
-              <a:lstStyle/>
-              <a:p>
-                <a:r>
-                  <a:rPr lang="en-US">
-                    <a:noFill/>
-                  </a:rPr>
-                  <a:t> </a:t>
-                </a:r>
-              </a:p>
-            </p:txBody>
-          </p:sp>
-        </mc:Fallback>
-      </mc:AlternateContent>
-      <mc:AlternateContent xmlns:mc="http://schemas.openxmlformats.org/markup-compatibility/2006">
-        <mc:Choice xmlns:a14="http://schemas.microsoft.com/office/drawing/2010/main" Requires="a14">
-          <p:sp>
-            <p:nvSpPr>
-              <p:cNvPr id="8" name="TextBox 7"/>
-              <p:cNvSpPr txBox="1"/>
-              <p:nvPr/>
-            </p:nvSpPr>
-            <p:spPr>
-              <a:xfrm>
-                <a:off x="3468254" y="2900218"/>
-                <a:ext cx="359073" cy="2547492"/>
-              </a:xfrm>
-              <a:prstGeom prst="rect">
-                <a:avLst/>
-              </a:prstGeom>
-              <a:noFill/>
-            </p:spPr>
-            <p:txBody>
-              <a:bodyPr wrap="none" lIns="0" tIns="0" rIns="0" bIns="0" rtlCol="0">
-                <a:spAutoFit/>
-              </a:bodyPr>
-              <a:lstStyle/>
-              <a:p>
-                <a14:m>
-                  <m:oMathPara xmlns:m="http://schemas.openxmlformats.org/officeDocument/2006/math">
-                    <m:oMathParaPr>
-                      <m:jc m:val="centerGroup"/>
-                    </m:oMathParaPr>
-                    <m:oMath xmlns:m="http://schemas.openxmlformats.org/officeDocument/2006/math">
-                      <m:m>
-                        <m:mPr>
-                          <m:mcs>
-                            <m:mc>
-                              <m:mcPr>
-                                <m:count m:val="1"/>
-                                <m:mcJc m:val="center"/>
-                              </m:mcPr>
-                            </m:mc>
-                          </m:mcs>
-                          <m:ctrlPr>
-                            <a:rPr lang="en-US" sz="3600" i="1" smtClean="0">
-                              <a:latin typeface="Cambria Math" panose="02040503050406030204" pitchFamily="18" charset="0"/>
-                            </a:rPr>
-                          </m:ctrlPr>
-                        </m:mPr>
-                        <m:mr>
-                          <m:e>
-                            <m:r>
-                              <m:rPr>
-                                <m:brk m:alnAt="7"/>
-                              </m:rPr>
-                              <a:rPr lang="en-US" sz="3600" b="0" i="1" smtClean="0">
-                                <a:latin typeface="Cambria Math" panose="02040503050406030204" pitchFamily="18" charset="0"/>
-                              </a:rPr>
-                              <m:t>1</m:t>
-                            </m:r>
-                          </m:e>
-                        </m:mr>
-                        <m:mr>
-                          <m:e>
-                            <m:r>
-                              <a:rPr lang="en-US" sz="3600" b="0" i="1" smtClean="0">
-                                <a:latin typeface="Cambria Math" panose="02040503050406030204" pitchFamily="18" charset="0"/>
-                              </a:rPr>
-                              <m:t>2</m:t>
-                            </m:r>
-                          </m:e>
-                        </m:mr>
-                        <m:mr>
-                          <m:e>
-                            <m:r>
-                              <a:rPr lang="en-US" sz="3600" b="0" i="1" smtClean="0">
-                                <a:latin typeface="Cambria Math" panose="02040503050406030204" pitchFamily="18" charset="0"/>
-                              </a:rPr>
-                              <m:t>3</m:t>
-                            </m:r>
-                          </m:e>
-                        </m:mr>
-                        <m:mr>
-                          <m:e>
-                            <m:r>
-                              <a:rPr lang="en-US" sz="3600" b="0" i="1" smtClean="0">
-                                <a:latin typeface="Cambria Math" panose="02040503050406030204" pitchFamily="18" charset="0"/>
-                              </a:rPr>
-                              <m:t>4</m:t>
-                            </m:r>
-                          </m:e>
-                        </m:mr>
-                        <m:mr>
-                          <m:e>
-                            <m:r>
-                              <a:rPr lang="en-US" sz="3600" b="0" i="1" smtClean="0">
-                                <a:latin typeface="Cambria Math" panose="02040503050406030204" pitchFamily="18" charset="0"/>
-                              </a:rPr>
-                              <m:t>5</m:t>
-                            </m:r>
-                          </m:e>
-                        </m:mr>
-                      </m:m>
-                    </m:oMath>
-                  </m:oMathPara>
-                </a14:m>
-                <a:endParaRPr lang="en-US" sz="3600" dirty="0"/>
-              </a:p>
-            </p:txBody>
-          </p:sp>
-        </mc:Choice>
-        <mc:Fallback>
-          <p:sp>
-            <p:nvSpPr>
-              <p:cNvPr id="8" name="TextBox 7"/>
-              <p:cNvSpPr txBox="1">
-                <a:spLocks noRot="1" noChangeAspect="1" noMove="1" noResize="1" noEditPoints="1" noAdjustHandles="1" noChangeArrowheads="1" noChangeShapeType="1" noTextEdit="1"/>
-              </p:cNvSpPr>
-              <p:nvPr/>
-            </p:nvSpPr>
-            <p:spPr>
-              <a:xfrm>
-                <a:off x="3468254" y="2900218"/>
-                <a:ext cx="359073" cy="2547492"/>
-              </a:xfrm>
-              <a:prstGeom prst="rect">
-                <a:avLst/>
-              </a:prstGeom>
-              <a:blipFill>
-                <a:blip r:embed="rId4"/>
-                <a:stretch>
-                  <a:fillRect/>
-                </a:stretch>
-              </a:blipFill>
-            </p:spPr>
-            <p:txBody>
-              <a:bodyPr/>
-              <a:lstStyle/>
-              <a:p>
-                <a:r>
-                  <a:rPr lang="en-US">
-                    <a:noFill/>
-                  </a:rPr>
-                  <a:t> </a:t>
-                </a:r>
-              </a:p>
-            </p:txBody>
-          </p:sp>
-        </mc:Fallback>
-      </mc:AlternateContent>
-    </p:spTree>
-    <p:extLst>
-      <p:ext uri="{BB962C8B-B14F-4D97-AF65-F5344CB8AC3E}">
-        <p14:creationId xmlns:p14="http://schemas.microsoft.com/office/powerpoint/2010/main" val="3916248390"/>
-      </p:ext>
-    </p:extLst>
-  </p:cSld>
-  <p:clrMapOvr>
-    <a:masterClrMapping/>
-  </p:clrMapOvr>
-</p:sld>
-</file>
-
-<file path=ppt/slides/slide4.xml><?xml version="1.0" encoding="utf-8"?>
-<p:sld xmlns:a="http://schemas.openxmlformats.org/drawingml/2006/main" xmlns:r="http://schemas.openxmlformats.org/officeDocument/2006/relationships" xmlns:p="http://schemas.openxmlformats.org/presentationml/2006/main">
-  <p:cSld>
-    <p:spTree>
-      <p:nvGrpSpPr>
-        <p:cNvPr id="1" name=""/>
-        <p:cNvGrpSpPr/>
-        <p:nvPr/>
-      </p:nvGrpSpPr>
-      <p:grpSpPr>
-        <a:xfrm>
-          <a:off x="0" y="0"/>
-          <a:ext cx="0" cy="0"/>
-          <a:chOff x="0" y="0"/>
-          <a:chExt cx="0" cy="0"/>
-        </a:xfrm>
-      </p:grpSpPr>
-      <p:sp>
-        <p:nvSpPr>
-          <p:cNvPr id="2" name="Title 1"/>
-          <p:cNvSpPr>
-            <a:spLocks noGrp="1"/>
-          </p:cNvSpPr>
-          <p:nvPr>
-            <p:ph type="title"/>
-          </p:nvPr>
-        </p:nvSpPr>
-        <p:spPr>
-          <a:gradFill>
-            <a:gsLst>
-              <a:gs pos="0">
-                <a:schemeClr val="accent1">
-                  <a:lumMod val="5000"/>
-                  <a:lumOff val="95000"/>
-                </a:schemeClr>
-              </a:gs>
-              <a:gs pos="74000">
-                <a:schemeClr val="accent1">
-                  <a:lumMod val="45000"/>
-                  <a:lumOff val="55000"/>
-                </a:schemeClr>
-              </a:gs>
-              <a:gs pos="83000">
-                <a:schemeClr val="accent1">
-                  <a:lumMod val="45000"/>
-                  <a:lumOff val="55000"/>
-                </a:schemeClr>
-              </a:gs>
-              <a:gs pos="100000">
-                <a:schemeClr val="accent1">
-                  <a:lumMod val="30000"/>
-                  <a:lumOff val="70000"/>
-                </a:schemeClr>
-              </a:gs>
-            </a:gsLst>
-            <a:lin ang="5400000" scaled="1"/>
-          </a:gradFill>
-        </p:spPr>
-        <p:txBody>
-          <a:bodyPr>
-            <a:normAutofit/>
-          </a:bodyPr>
-          <a:lstStyle/>
-          <a:p>
-            <a:pPr algn="ctr"/>
-            <a:r>
-              <a:rPr lang="en-US" dirty="0" smtClean="0"/>
-              <a:t>Let’s State A Problem</a:t>
-            </a:r>
-            <a:endParaRPr lang="en-US" dirty="0"/>
-          </a:p>
-        </p:txBody>
-      </p:sp>
-      <mc:AlternateContent xmlns:mc="http://schemas.openxmlformats.org/markup-compatibility/2006">
-        <mc:Choice xmlns:a14="http://schemas.microsoft.com/office/drawing/2010/main" Requires="a14">
-          <p:sp>
-            <p:nvSpPr>
-              <p:cNvPr id="3" name="Content Placeholder 2"/>
-              <p:cNvSpPr>
-                <a:spLocks noGrp="1"/>
-              </p:cNvSpPr>
-              <p:nvPr>
-                <p:ph idx="1"/>
-              </p:nvPr>
-            </p:nvSpPr>
-            <p:spPr/>
-            <p:txBody>
-              <a:bodyPr>
-                <a:normAutofit/>
-              </a:bodyPr>
-              <a:lstStyle/>
-              <a:p>
-                <a:pPr algn="just">
-                  <a:spcAft>
-                    <a:spcPts val="1200"/>
-                  </a:spcAft>
-                </a:pPr>
-                <a:r>
-                  <a:rPr lang="en-US" sz="3400" dirty="0" smtClean="0"/>
-                  <a:t>Now, imagine a social network with 100 million users.</a:t>
-                </a:r>
-                <a:endParaRPr lang="en-US" sz="3400" dirty="0" smtClean="0"/>
-              </a:p>
-              <a:p>
-                <a:pPr algn="just">
-                  <a:spcAft>
-                    <a:spcPts val="1200"/>
-                  </a:spcAft>
-                </a:pPr>
-                <a:endParaRPr lang="en-US" sz="3400" dirty="0" smtClean="0"/>
-              </a:p>
-              <a:p>
-                <a:pPr algn="just">
-                  <a:spcAft>
-                    <a:spcPts val="1200"/>
-                  </a:spcAft>
-                </a:pPr>
-                <a:r>
-                  <a:rPr lang="en-US" sz="3400" dirty="0" smtClean="0"/>
-                  <a:t>This results in an adjacency matrix with </a:t>
-                </a:r>
-                <a14:m>
-                  <m:oMath xmlns:m="http://schemas.openxmlformats.org/officeDocument/2006/math">
-                    <m:sSup>
-                      <m:sSupPr>
-                        <m:ctrlPr>
-                          <a:rPr lang="en-US" sz="3200" i="1" smtClean="0">
-                            <a:latin typeface="Cambria Math" panose="02040503050406030204" pitchFamily="18" charset="0"/>
-                          </a:rPr>
-                        </m:ctrlPr>
-                      </m:sSupPr>
-                      <m:e>
-                        <m:r>
-                          <a:rPr lang="en-US" sz="3200" b="0" i="1" smtClean="0">
-                            <a:latin typeface="Cambria Math" panose="02040503050406030204" pitchFamily="18" charset="0"/>
-                          </a:rPr>
-                          <m:t>10</m:t>
-                        </m:r>
-                      </m:e>
-                      <m:sup>
-                        <m:r>
-                          <a:rPr lang="en-US" sz="3200" b="0" i="1" smtClean="0">
-                            <a:latin typeface="Cambria Math" panose="02040503050406030204" pitchFamily="18" charset="0"/>
-                          </a:rPr>
-                          <m:t>8</m:t>
-                        </m:r>
-                      </m:sup>
-                    </m:sSup>
-                    <m:r>
-                      <a:rPr lang="en-US" sz="3200" b="0" i="1" smtClean="0">
-                        <a:latin typeface="Cambria Math" panose="02040503050406030204" pitchFamily="18" charset="0"/>
-                      </a:rPr>
-                      <m:t>∗</m:t>
-                    </m:r>
-                    <m:sSup>
-                      <m:sSupPr>
-                        <m:ctrlPr>
-                          <a:rPr lang="en-US" sz="3200" b="0" i="1" smtClean="0">
-                            <a:latin typeface="Cambria Math" panose="02040503050406030204" pitchFamily="18" charset="0"/>
-                          </a:rPr>
-                        </m:ctrlPr>
-                      </m:sSupPr>
-                      <m:e>
-                        <m:r>
-                          <a:rPr lang="en-US" sz="3200" b="0" i="1" smtClean="0">
-                            <a:latin typeface="Cambria Math" panose="02040503050406030204" pitchFamily="18" charset="0"/>
-                          </a:rPr>
-                          <m:t>10</m:t>
-                        </m:r>
-                      </m:e>
-                      <m:sup>
-                        <m:r>
-                          <a:rPr lang="en-US" sz="3200" b="0" i="1" smtClean="0">
-                            <a:latin typeface="Cambria Math" panose="02040503050406030204" pitchFamily="18" charset="0"/>
-                          </a:rPr>
-                          <m:t>8</m:t>
-                        </m:r>
-                      </m:sup>
-                    </m:sSup>
-                    <m:r>
-                      <a:rPr lang="en-US" sz="3200" b="0" i="1" smtClean="0">
-                        <a:latin typeface="Cambria Math" panose="02040503050406030204" pitchFamily="18" charset="0"/>
-                      </a:rPr>
-                      <m:t>=</m:t>
-                    </m:r>
-                    <m:sSup>
-                      <m:sSupPr>
-                        <m:ctrlPr>
-                          <a:rPr lang="en-US" sz="3200" b="0" i="1" smtClean="0">
-                            <a:latin typeface="Cambria Math" panose="02040503050406030204" pitchFamily="18" charset="0"/>
-                          </a:rPr>
-                        </m:ctrlPr>
-                      </m:sSupPr>
-                      <m:e>
-                        <m:r>
-                          <a:rPr lang="en-US" sz="3200" b="0" i="1" smtClean="0">
-                            <a:latin typeface="Cambria Math" panose="02040503050406030204" pitchFamily="18" charset="0"/>
-                          </a:rPr>
-                          <m:t>10</m:t>
-                        </m:r>
-                      </m:e>
-                      <m:sup>
-                        <m:r>
-                          <a:rPr lang="en-US" sz="3200" b="0" i="1" smtClean="0">
-                            <a:latin typeface="Cambria Math" panose="02040503050406030204" pitchFamily="18" charset="0"/>
-                          </a:rPr>
-                          <m:t>16</m:t>
-                        </m:r>
-                      </m:sup>
-                    </m:sSup>
-                  </m:oMath>
-                </a14:m>
-                <a:r>
-                  <a:rPr lang="en-US" sz="3200" dirty="0" smtClean="0"/>
-                  <a:t> </a:t>
-                </a:r>
-                <a:r>
-                  <a:rPr lang="en-US" sz="3400" dirty="0" smtClean="0"/>
-                  <a:t>elements.</a:t>
-                </a:r>
-                <a:endParaRPr lang="en-US" sz="3200" dirty="0" smtClean="0"/>
-              </a:p>
-              <a:p>
-                <a:pPr marL="0" indent="0" algn="just">
-                  <a:spcAft>
-                    <a:spcPts val="1200"/>
-                  </a:spcAft>
-                  <a:buNone/>
-                </a:pPr>
-                <a:endParaRPr lang="en-US" sz="3200" dirty="0"/>
-              </a:p>
-            </p:txBody>
-          </p:sp>
-        </mc:Choice>
-        <mc:Fallback>
-          <p:sp>
-            <p:nvSpPr>
-              <p:cNvPr id="3" name="Content Placeholder 2"/>
-              <p:cNvSpPr>
-                <a:spLocks noGrp="1" noRot="1" noChangeAspect="1" noMove="1" noResize="1" noEditPoints="1" noAdjustHandles="1" noChangeArrowheads="1" noChangeShapeType="1" noTextEdit="1"/>
-              </p:cNvSpPr>
-              <p:nvPr>
-                <p:ph idx="1"/>
-              </p:nvPr>
-            </p:nvSpPr>
-            <p:spPr>
-              <a:blipFill>
-                <a:blip r:embed="rId2"/>
-                <a:stretch>
-                  <a:fillRect l="-1449" t="-3081"/>
-                </a:stretch>
-              </a:blipFill>
-            </p:spPr>
-            <p:txBody>
-              <a:bodyPr/>
-              <a:lstStyle/>
-              <a:p>
-                <a:r>
-                  <a:rPr lang="en-US">
-                    <a:noFill/>
-                  </a:rPr>
-                  <a:t> </a:t>
-                </a:r>
-              </a:p>
-            </p:txBody>
-          </p:sp>
-        </mc:Fallback>
-      </mc:AlternateContent>
-    </p:spTree>
-    <p:extLst>
-      <p:ext uri="{BB962C8B-B14F-4D97-AF65-F5344CB8AC3E}">
-        <p14:creationId xmlns:p14="http://schemas.microsoft.com/office/powerpoint/2010/main" val="3891607552"/>
-      </p:ext>
-    </p:extLst>
-  </p:cSld>
-  <p:clrMapOvr>
-    <a:masterClrMapping/>
-  </p:clrMapOvr>
-</p:sld>
-</file>
-
-<file path=ppt/slides/slide5.xml><?xml version="1.0" encoding="utf-8"?>
-<p:sld xmlns:a="http://schemas.openxmlformats.org/drawingml/2006/main" xmlns:r="http://schemas.openxmlformats.org/officeDocument/2006/relationships" xmlns:p="http://schemas.openxmlformats.org/presentationml/2006/main">
-  <p:cSld>
-    <p:spTree>
-      <p:nvGrpSpPr>
-        <p:cNvPr id="1" name=""/>
-        <p:cNvGrpSpPr/>
-        <p:nvPr/>
-      </p:nvGrpSpPr>
-      <p:grpSpPr>
-        <a:xfrm>
-          <a:off x="0" y="0"/>
-          <a:ext cx="0" cy="0"/>
-          <a:chOff x="0" y="0"/>
-          <a:chExt cx="0" cy="0"/>
-        </a:xfrm>
-      </p:grpSpPr>
-      <p:sp>
-        <p:nvSpPr>
-          <p:cNvPr id="2" name="Title 1"/>
-          <p:cNvSpPr>
-            <a:spLocks noGrp="1"/>
-          </p:cNvSpPr>
-          <p:nvPr>
-            <p:ph type="title"/>
-          </p:nvPr>
-        </p:nvSpPr>
-        <p:spPr>
-          <a:gradFill>
-            <a:gsLst>
-              <a:gs pos="0">
-                <a:schemeClr val="accent1">
-                  <a:lumMod val="5000"/>
-                  <a:lumOff val="95000"/>
-                </a:schemeClr>
-              </a:gs>
-              <a:gs pos="74000">
-                <a:schemeClr val="accent1">
-                  <a:lumMod val="45000"/>
-                  <a:lumOff val="55000"/>
-                </a:schemeClr>
-              </a:gs>
-              <a:gs pos="83000">
-                <a:schemeClr val="accent1">
-                  <a:lumMod val="45000"/>
-                  <a:lumOff val="55000"/>
-                </a:schemeClr>
-              </a:gs>
-              <a:gs pos="100000">
-                <a:schemeClr val="accent1">
-                  <a:lumMod val="30000"/>
-                  <a:lumOff val="70000"/>
-                </a:schemeClr>
-              </a:gs>
-            </a:gsLst>
-            <a:lin ang="5400000" scaled="1"/>
-          </a:gradFill>
-        </p:spPr>
-        <p:txBody>
-          <a:bodyPr>
-            <a:normAutofit/>
-          </a:bodyPr>
-          <a:lstStyle/>
-          <a:p>
-            <a:pPr algn="ctr"/>
-            <a:r>
-              <a:rPr lang="en-US" dirty="0" smtClean="0"/>
-              <a:t>Let’s State A Problem</a:t>
-            </a:r>
-            <a:endParaRPr lang="en-US" dirty="0"/>
-          </a:p>
-        </p:txBody>
-      </p:sp>
-      <mc:AlternateContent xmlns:mc="http://schemas.openxmlformats.org/markup-compatibility/2006">
-        <mc:Choice xmlns:a14="http://schemas.microsoft.com/office/drawing/2010/main" Requires="a14">
-          <p:sp>
-            <p:nvSpPr>
-              <p:cNvPr id="3" name="Content Placeholder 2"/>
-              <p:cNvSpPr>
-                <a:spLocks noGrp="1"/>
-              </p:cNvSpPr>
-              <p:nvPr>
-                <p:ph idx="1"/>
-              </p:nvPr>
-            </p:nvSpPr>
-            <p:spPr/>
-            <p:txBody>
-              <a:bodyPr>
-                <a:normAutofit/>
-              </a:bodyPr>
-              <a:lstStyle/>
-              <a:p>
-                <a:pPr algn="just">
-                  <a:spcAft>
-                    <a:spcPts val="1200"/>
-                  </a:spcAft>
-                </a:pPr>
-                <a:r>
-                  <a:rPr lang="en-US" sz="3400" dirty="0" smtClean="0"/>
-                  <a:t>Now, imagine a social network with 100 million users.</a:t>
-                </a:r>
-                <a:endParaRPr lang="en-US" sz="3400" dirty="0" smtClean="0"/>
-              </a:p>
-              <a:p>
-                <a:pPr algn="just">
-                  <a:spcAft>
-                    <a:spcPts val="1200"/>
-                  </a:spcAft>
-                </a:pPr>
-                <a:endParaRPr lang="en-US" sz="3400" dirty="0" smtClean="0"/>
-              </a:p>
-              <a:p>
-                <a:pPr algn="just">
-                  <a:spcAft>
-                    <a:spcPts val="1200"/>
-                  </a:spcAft>
-                </a:pPr>
-                <a:r>
-                  <a:rPr lang="en-US" sz="3400" dirty="0" smtClean="0"/>
-                  <a:t>This results in an adjacency matrix with </a:t>
-                </a:r>
-                <a14:m>
-                  <m:oMath xmlns:m="http://schemas.openxmlformats.org/officeDocument/2006/math">
-                    <m:sSup>
-                      <m:sSupPr>
-                        <m:ctrlPr>
-                          <a:rPr lang="en-US" sz="3200" i="1" smtClean="0">
-                            <a:latin typeface="Cambria Math" panose="02040503050406030204" pitchFamily="18" charset="0"/>
-                          </a:rPr>
-                        </m:ctrlPr>
-                      </m:sSupPr>
-                      <m:e>
-                        <m:r>
-                          <a:rPr lang="en-US" sz="3200" b="0" i="1" smtClean="0">
-                            <a:latin typeface="Cambria Math" panose="02040503050406030204" pitchFamily="18" charset="0"/>
-                          </a:rPr>
-                          <m:t>10</m:t>
-                        </m:r>
-                      </m:e>
-                      <m:sup>
-                        <m:r>
-                          <a:rPr lang="en-US" sz="3200" b="0" i="1" smtClean="0">
-                            <a:latin typeface="Cambria Math" panose="02040503050406030204" pitchFamily="18" charset="0"/>
-                          </a:rPr>
-                          <m:t>8</m:t>
-                        </m:r>
-                      </m:sup>
-                    </m:sSup>
-                    <m:r>
-                      <a:rPr lang="en-US" sz="3200" b="0" i="1" smtClean="0">
-                        <a:latin typeface="Cambria Math" panose="02040503050406030204" pitchFamily="18" charset="0"/>
-                      </a:rPr>
-                      <m:t>∗</m:t>
-                    </m:r>
-                    <m:sSup>
-                      <m:sSupPr>
-                        <m:ctrlPr>
-                          <a:rPr lang="en-US" sz="3200" b="0" i="1" smtClean="0">
-                            <a:latin typeface="Cambria Math" panose="02040503050406030204" pitchFamily="18" charset="0"/>
-                          </a:rPr>
-                        </m:ctrlPr>
-                      </m:sSupPr>
-                      <m:e>
-                        <m:r>
-                          <a:rPr lang="en-US" sz="3200" b="0" i="1" smtClean="0">
-                            <a:latin typeface="Cambria Math" panose="02040503050406030204" pitchFamily="18" charset="0"/>
-                          </a:rPr>
-                          <m:t>10</m:t>
-                        </m:r>
-                      </m:e>
-                      <m:sup>
-                        <m:r>
-                          <a:rPr lang="en-US" sz="3200" b="0" i="1" smtClean="0">
-                            <a:latin typeface="Cambria Math" panose="02040503050406030204" pitchFamily="18" charset="0"/>
-                          </a:rPr>
-                          <m:t>8</m:t>
-                        </m:r>
-                      </m:sup>
-                    </m:sSup>
-                    <m:r>
-                      <a:rPr lang="en-US" sz="3200" b="0" i="1" smtClean="0">
-                        <a:latin typeface="Cambria Math" panose="02040503050406030204" pitchFamily="18" charset="0"/>
-                      </a:rPr>
-                      <m:t>=</m:t>
-                    </m:r>
-                    <m:sSup>
-                      <m:sSupPr>
-                        <m:ctrlPr>
-                          <a:rPr lang="en-US" sz="3200" b="0" i="1" smtClean="0">
-                            <a:latin typeface="Cambria Math" panose="02040503050406030204" pitchFamily="18" charset="0"/>
-                          </a:rPr>
-                        </m:ctrlPr>
-                      </m:sSupPr>
-                      <m:e>
-                        <m:r>
-                          <a:rPr lang="en-US" sz="3200" b="0" i="1" smtClean="0">
-                            <a:latin typeface="Cambria Math" panose="02040503050406030204" pitchFamily="18" charset="0"/>
-                          </a:rPr>
-                          <m:t>10</m:t>
-                        </m:r>
-                      </m:e>
-                      <m:sup>
-                        <m:r>
-                          <a:rPr lang="en-US" sz="3200" b="0" i="1" smtClean="0">
-                            <a:latin typeface="Cambria Math" panose="02040503050406030204" pitchFamily="18" charset="0"/>
-                          </a:rPr>
-                          <m:t>16</m:t>
-                        </m:r>
-                      </m:sup>
-                    </m:sSup>
-                  </m:oMath>
-                </a14:m>
-                <a:r>
-                  <a:rPr lang="en-US" sz="3200" dirty="0" smtClean="0"/>
-                  <a:t> </a:t>
-                </a:r>
-                <a:r>
-                  <a:rPr lang="en-US" sz="3400" dirty="0" smtClean="0"/>
-                  <a:t>elements.</a:t>
-                </a:r>
-                <a:endParaRPr lang="en-US" sz="3200" dirty="0" smtClean="0"/>
-              </a:p>
-              <a:p>
-                <a:pPr marL="0" indent="0" algn="just">
-                  <a:spcAft>
-                    <a:spcPts val="1200"/>
-                  </a:spcAft>
-                  <a:buNone/>
-                </a:pPr>
-                <a:endParaRPr lang="en-US" sz="3200" dirty="0"/>
-              </a:p>
-            </p:txBody>
-          </p:sp>
-        </mc:Choice>
-        <mc:Fallback>
-          <p:sp>
-            <p:nvSpPr>
-              <p:cNvPr id="3" name="Content Placeholder 2"/>
-              <p:cNvSpPr>
-                <a:spLocks noGrp="1" noRot="1" noChangeAspect="1" noMove="1" noResize="1" noEditPoints="1" noAdjustHandles="1" noChangeArrowheads="1" noChangeShapeType="1" noTextEdit="1"/>
-              </p:cNvSpPr>
-              <p:nvPr>
-                <p:ph idx="1"/>
-              </p:nvPr>
-            </p:nvSpPr>
-            <p:spPr>
-              <a:blipFill>
-                <a:blip r:embed="rId2"/>
-                <a:stretch>
-                  <a:fillRect l="-1449" t="-3081"/>
-                </a:stretch>
-              </a:blipFill>
-            </p:spPr>
-            <p:txBody>
-              <a:bodyPr/>
-              <a:lstStyle/>
-              <a:p>
-                <a:r>
-                  <a:rPr lang="en-US">
-                    <a:noFill/>
-                  </a:rPr>
-                  <a:t> </a:t>
-                </a:r>
-              </a:p>
-            </p:txBody>
-          </p:sp>
-        </mc:Fallback>
-      </mc:AlternateContent>
-    </p:spTree>
-    <p:extLst>
-      <p:ext uri="{BB962C8B-B14F-4D97-AF65-F5344CB8AC3E}">
-        <p14:creationId xmlns:p14="http://schemas.microsoft.com/office/powerpoint/2010/main" val="1763435039"/>
-      </p:ext>
-    </p:extLst>
-  </p:cSld>
-  <p:clrMapOvr>
-    <a:masterClrMapping/>
-  </p:clrMapOvr>
-</p:sld>
-</file>
-
-<file path=ppt/slides/slide6.xml><?xml version="1.0" encoding="utf-8"?>
-<p:sld xmlns:a="http://schemas.openxmlformats.org/drawingml/2006/main" xmlns:r="http://schemas.openxmlformats.org/officeDocument/2006/relationships" xmlns:p="http://schemas.openxmlformats.org/presentationml/2006/main">
-  <p:cSld>
-    <p:spTree>
-      <p:nvGrpSpPr>
-        <p:cNvPr id="1" name=""/>
-        <p:cNvGrpSpPr/>
-        <p:nvPr/>
-      </p:nvGrpSpPr>
-      <p:grpSpPr>
-        <a:xfrm>
-          <a:off x="0" y="0"/>
-          <a:ext cx="0" cy="0"/>
-          <a:chOff x="0" y="0"/>
-          <a:chExt cx="0" cy="0"/>
-        </a:xfrm>
-      </p:grpSpPr>
-      <p:sp>
-        <p:nvSpPr>
-          <p:cNvPr id="2" name="Title 1"/>
-          <p:cNvSpPr>
-            <a:spLocks noGrp="1"/>
-          </p:cNvSpPr>
-          <p:nvPr>
-            <p:ph type="title"/>
-          </p:nvPr>
-        </p:nvSpPr>
-        <p:spPr>
-          <a:gradFill>
-            <a:gsLst>
-              <a:gs pos="0">
-                <a:schemeClr val="accent1">
-                  <a:lumMod val="5000"/>
-                  <a:lumOff val="95000"/>
-                </a:schemeClr>
-              </a:gs>
-              <a:gs pos="74000">
-                <a:schemeClr val="accent1">
-                  <a:lumMod val="45000"/>
-                  <a:lumOff val="55000"/>
-                </a:schemeClr>
-              </a:gs>
-              <a:gs pos="83000">
-                <a:schemeClr val="accent1">
-                  <a:lumMod val="45000"/>
-                  <a:lumOff val="55000"/>
-                </a:schemeClr>
-              </a:gs>
-              <a:gs pos="100000">
-                <a:schemeClr val="accent1">
-                  <a:lumMod val="30000"/>
-                  <a:lumOff val="70000"/>
-                </a:schemeClr>
-              </a:gs>
-            </a:gsLst>
-            <a:lin ang="5400000" scaled="1"/>
-          </a:gradFill>
-        </p:spPr>
-        <p:txBody>
-          <a:bodyPr>
-            <a:normAutofit/>
-          </a:bodyPr>
-          <a:lstStyle/>
-          <a:p>
-            <a:pPr algn="ctr"/>
-            <a:r>
-              <a:rPr lang="en-US" dirty="0" smtClean="0"/>
-              <a:t>What Are Sparse Matrices?</a:t>
-            </a:r>
-            <a:endParaRPr lang="en-US" dirty="0"/>
-          </a:p>
-        </p:txBody>
-      </p:sp>
-      <p:sp>
-        <p:nvSpPr>
-          <p:cNvPr id="3" name="Content Placeholder 2"/>
-          <p:cNvSpPr>
-            <a:spLocks noGrp="1"/>
-          </p:cNvSpPr>
-          <p:nvPr>
-            <p:ph idx="1"/>
-          </p:nvPr>
-        </p:nvSpPr>
-        <p:spPr/>
-        <p:txBody>
-          <a:bodyPr>
-            <a:normAutofit/>
-          </a:bodyPr>
-          <a:lstStyle/>
-          <a:p>
-            <a:pPr algn="just">
-              <a:spcAft>
-                <a:spcPts val="1200"/>
-              </a:spcAft>
-            </a:pPr>
-            <a:r>
-              <a:rPr lang="en-US" sz="3400" dirty="0"/>
-              <a:t>A</a:t>
-            </a:r>
-            <a:r>
-              <a:rPr lang="en-US" sz="3400" dirty="0" smtClean="0"/>
-              <a:t> sparse matrix is a matrix in which most of the elements are zero.</a:t>
-            </a:r>
-          </a:p>
-          <a:p>
-            <a:pPr algn="just">
-              <a:spcAft>
-                <a:spcPts val="1200"/>
-              </a:spcAft>
-            </a:pPr>
-            <a:endParaRPr lang="en-US" sz="3400" dirty="0"/>
-          </a:p>
-          <a:p>
-            <a:pPr algn="just">
-              <a:spcAft>
-                <a:spcPts val="1200"/>
-              </a:spcAft>
-            </a:pPr>
-            <a:r>
-              <a:rPr lang="en-US" sz="3400" dirty="0" smtClean="0"/>
-              <a:t>By contrast, if most of the elements in a matrix are nonzero, then the matrix is considered dense.</a:t>
-            </a:r>
-          </a:p>
-          <a:p>
-            <a:pPr algn="just">
-              <a:spcAft>
-                <a:spcPts val="1200"/>
-              </a:spcAft>
-            </a:pPr>
-            <a:endParaRPr lang="en-US" sz="3400" dirty="0" smtClean="0"/>
-          </a:p>
-          <a:p>
-            <a:pPr marL="0" indent="0" algn="just">
-              <a:spcAft>
-                <a:spcPts val="1200"/>
-              </a:spcAft>
-              <a:buNone/>
-            </a:pPr>
-            <a:endParaRPr lang="en-US" sz="3200" dirty="0"/>
-          </a:p>
-        </p:txBody>
-      </p:sp>
-    </p:spTree>
-    <p:extLst>
-      <p:ext uri="{BB962C8B-B14F-4D97-AF65-F5344CB8AC3E}">
-        <p14:creationId xmlns:p14="http://schemas.microsoft.com/office/powerpoint/2010/main" val="418931126"/>
-      </p:ext>
-    </p:extLst>
-  </p:cSld>
-  <p:clrMapOvr>
-    <a:masterClrMapping/>
-  </p:clrMapOvr>
-</p:sld>
-</file>
-
-<file path=ppt/slides/slide7.xml><?xml version="1.0" encoding="utf-8"?>
-<p:sld xmlns:a="http://schemas.openxmlformats.org/drawingml/2006/main" xmlns:r="http://schemas.openxmlformats.org/officeDocument/2006/relationships" xmlns:p="http://schemas.openxmlformats.org/presentationml/2006/main">
-  <p:cSld>
-    <p:spTree>
-      <p:nvGrpSpPr>
-        <p:cNvPr id="1" name=""/>
-        <p:cNvGrpSpPr/>
-        <p:nvPr/>
-      </p:nvGrpSpPr>
-      <p:grpSpPr>
-        <a:xfrm>
-          <a:off x="0" y="0"/>
-          <a:ext cx="0" cy="0"/>
-          <a:chOff x="0" y="0"/>
-          <a:chExt cx="0" cy="0"/>
-        </a:xfrm>
-      </p:grpSpPr>
-      <p:sp>
-        <p:nvSpPr>
-          <p:cNvPr id="2" name="Title 1"/>
-          <p:cNvSpPr>
-            <a:spLocks noGrp="1"/>
-          </p:cNvSpPr>
-          <p:nvPr>
-            <p:ph type="title"/>
-          </p:nvPr>
-        </p:nvSpPr>
-        <p:spPr>
-          <a:gradFill>
-            <a:gsLst>
-              <a:gs pos="0">
-                <a:schemeClr val="accent1">
-                  <a:lumMod val="5000"/>
-                  <a:lumOff val="95000"/>
-                </a:schemeClr>
-              </a:gs>
-              <a:gs pos="74000">
-                <a:schemeClr val="accent1">
-                  <a:lumMod val="45000"/>
-                  <a:lumOff val="55000"/>
-                </a:schemeClr>
-              </a:gs>
-              <a:gs pos="83000">
-                <a:schemeClr val="accent1">
-                  <a:lumMod val="45000"/>
-                  <a:lumOff val="55000"/>
-                </a:schemeClr>
-              </a:gs>
-              <a:gs pos="100000">
-                <a:schemeClr val="accent1">
-                  <a:lumMod val="30000"/>
-                  <a:lumOff val="70000"/>
-                </a:schemeClr>
-              </a:gs>
-            </a:gsLst>
-            <a:lin ang="5400000" scaled="1"/>
-          </a:gradFill>
-        </p:spPr>
-        <p:txBody>
-          <a:bodyPr>
-            <a:normAutofit/>
-          </a:bodyPr>
-          <a:lstStyle/>
-          <a:p>
-            <a:pPr algn="ctr"/>
-            <a:r>
-              <a:rPr lang="en-US" dirty="0" smtClean="0"/>
-              <a:t>What Are Sparse Matrices?</a:t>
-            </a:r>
-            <a:endParaRPr lang="en-US" dirty="0"/>
-          </a:p>
-        </p:txBody>
-      </p:sp>
-      <p:sp>
-        <p:nvSpPr>
-          <p:cNvPr id="3" name="Content Placeholder 2"/>
-          <p:cNvSpPr>
-            <a:spLocks noGrp="1"/>
-          </p:cNvSpPr>
-          <p:nvPr>
-            <p:ph idx="1"/>
-          </p:nvPr>
-        </p:nvSpPr>
-        <p:spPr/>
-        <p:txBody>
-          <a:bodyPr>
-            <a:normAutofit/>
-          </a:bodyPr>
-          <a:lstStyle/>
-          <a:p>
-            <a:pPr algn="just">
-              <a:spcAft>
-                <a:spcPts val="1200"/>
-              </a:spcAft>
-            </a:pPr>
-            <a:r>
-              <a:rPr lang="en-US" sz="3400" dirty="0" smtClean="0"/>
-              <a:t>There are no strict rules for the number of elements in a matrix that need to be zero in order to describe the matrix as sparse.</a:t>
-            </a:r>
-          </a:p>
-          <a:p>
-            <a:pPr marL="0" indent="0" algn="just">
-              <a:spcAft>
-                <a:spcPts val="1200"/>
-              </a:spcAft>
-              <a:buNone/>
-            </a:pPr>
-            <a:endParaRPr lang="en-US" sz="3200" dirty="0"/>
-          </a:p>
-          <a:p>
-            <a:pPr algn="just">
-              <a:spcAft>
-                <a:spcPts val="1200"/>
-              </a:spcAft>
-            </a:pPr>
-            <a:r>
-              <a:rPr lang="en-US" sz="3400" dirty="0" smtClean="0"/>
-              <a:t>The number of zero-valued elements in a matrix, divided by the total number of elements in that matrix, is referred to as the sparsity of that matrix.</a:t>
-            </a:r>
-            <a:endParaRPr lang="en-US" sz="3400" dirty="0"/>
-          </a:p>
-        </p:txBody>
-      </p:sp>
-    </p:spTree>
-    <p:extLst>
-      <p:ext uri="{BB962C8B-B14F-4D97-AF65-F5344CB8AC3E}">
-        <p14:creationId xmlns:p14="http://schemas.microsoft.com/office/powerpoint/2010/main" val="2879655215"/>
-      </p:ext>
-    </p:extLst>
-  </p:cSld>
-  <p:clrMapOvr>
-    <a:masterClrMapping/>
-  </p:clrMapOvr>
-</p:sld>
-</file>
-
-<file path=ppt/slides/slide8.xml><?xml version="1.0" encoding="utf-8"?>
-<p:sld xmlns:a="http://schemas.openxmlformats.org/drawingml/2006/main" xmlns:r="http://schemas.openxmlformats.org/officeDocument/2006/relationships" xmlns:p="http://schemas.openxmlformats.org/presentationml/2006/main">
-  <p:cSld>
-    <p:spTree>
-      <p:nvGrpSpPr>
-        <p:cNvPr id="1" name=""/>
-        <p:cNvGrpSpPr/>
-        <p:nvPr/>
-      </p:nvGrpSpPr>
-      <p:grpSpPr>
-        <a:xfrm>
-          <a:off x="0" y="0"/>
-          <a:ext cx="0" cy="0"/>
-          <a:chOff x="0" y="0"/>
-          <a:chExt cx="0" cy="0"/>
-        </a:xfrm>
-      </p:grpSpPr>
-      <p:sp>
-        <p:nvSpPr>
-          <p:cNvPr id="2" name="Title 1"/>
-          <p:cNvSpPr>
-            <a:spLocks noGrp="1"/>
-          </p:cNvSpPr>
-          <p:nvPr>
-            <p:ph type="title"/>
-          </p:nvPr>
-        </p:nvSpPr>
-        <p:spPr>
-          <a:gradFill>
-            <a:gsLst>
-              <a:gs pos="0">
-                <a:schemeClr val="accent1">
-                  <a:lumMod val="5000"/>
-                  <a:lumOff val="95000"/>
-                </a:schemeClr>
-              </a:gs>
-              <a:gs pos="74000">
-                <a:schemeClr val="accent1">
-                  <a:lumMod val="45000"/>
-                  <a:lumOff val="55000"/>
-                </a:schemeClr>
-              </a:gs>
-              <a:gs pos="83000">
-                <a:schemeClr val="accent1">
-                  <a:lumMod val="45000"/>
-                  <a:lumOff val="55000"/>
-                </a:schemeClr>
-              </a:gs>
-              <a:gs pos="100000">
-                <a:schemeClr val="accent1">
-                  <a:lumMod val="30000"/>
-                  <a:lumOff val="70000"/>
-                </a:schemeClr>
-              </a:gs>
-            </a:gsLst>
-            <a:lin ang="5400000" scaled="1"/>
-          </a:gradFill>
-        </p:spPr>
-        <p:txBody>
-          <a:bodyPr>
-            <a:normAutofit/>
-          </a:bodyPr>
-          <a:lstStyle/>
-          <a:p>
-            <a:pPr algn="ctr"/>
-            <a:r>
-              <a:rPr lang="en-US" dirty="0" smtClean="0"/>
-              <a:t>What Are Sparse Matrices?</a:t>
-            </a:r>
-            <a:endParaRPr lang="en-US" dirty="0"/>
-          </a:p>
-        </p:txBody>
-      </p:sp>
-      <p:sp>
-        <p:nvSpPr>
-          <p:cNvPr id="3" name="Content Placeholder 2"/>
-          <p:cNvSpPr>
-            <a:spLocks noGrp="1"/>
-          </p:cNvSpPr>
-          <p:nvPr>
-            <p:ph idx="1"/>
-          </p:nvPr>
-        </p:nvSpPr>
-        <p:spPr/>
-        <p:txBody>
-          <a:bodyPr>
-            <a:normAutofit/>
-          </a:bodyPr>
-          <a:lstStyle/>
-          <a:p>
-            <a:pPr marL="0" indent="0" algn="ctr">
-              <a:spcAft>
-                <a:spcPts val="1200"/>
-              </a:spcAft>
-              <a:buNone/>
-            </a:pPr>
-            <a:r>
-              <a:rPr lang="en-US" sz="5400" i="1" dirty="0" smtClean="0"/>
-              <a:t>“In </a:t>
-            </a:r>
-            <a:r>
-              <a:rPr lang="en-US" sz="5400" i="1" dirty="0"/>
-              <a:t>practice, most large matrices are sparse — almost all entries are zeros</a:t>
-            </a:r>
-            <a:r>
-              <a:rPr lang="en-US" sz="5400" i="1" dirty="0" smtClean="0"/>
-              <a:t>.”</a:t>
-            </a:r>
-          </a:p>
-          <a:p>
-            <a:pPr marL="0" indent="0" algn="ctr">
-              <a:spcAft>
-                <a:spcPts val="1200"/>
-              </a:spcAft>
-              <a:buNone/>
-            </a:pPr>
-            <a:r>
-              <a:rPr lang="en-US" sz="3200" i="1" dirty="0" smtClean="0"/>
-              <a:t>- Dr. Gilbert </a:t>
-            </a:r>
-            <a:r>
-              <a:rPr lang="en-US" sz="3200" i="1" dirty="0" err="1" smtClean="0"/>
-              <a:t>Strang</a:t>
-            </a:r>
-            <a:r>
-              <a:rPr lang="en-US" sz="3200" i="1" dirty="0" smtClean="0"/>
-              <a:t>, Introduction to Linear Algebra, 5</a:t>
-            </a:r>
-            <a:r>
-              <a:rPr lang="en-US" sz="3200" i="1" baseline="30000" dirty="0" smtClean="0"/>
-              <a:t>th</a:t>
-            </a:r>
-            <a:r>
-              <a:rPr lang="en-US" sz="3200" i="1" dirty="0" smtClean="0"/>
-              <a:t> ed., Page 465</a:t>
-            </a:r>
-            <a:endParaRPr lang="en-US" sz="3200" dirty="0"/>
-          </a:p>
-        </p:txBody>
-      </p:sp>
-    </p:spTree>
-    <p:extLst>
-      <p:ext uri="{BB962C8B-B14F-4D97-AF65-F5344CB8AC3E}">
-        <p14:creationId xmlns:p14="http://schemas.microsoft.com/office/powerpoint/2010/main" val="1293524280"/>
-      </p:ext>
-    </p:extLst>
-  </p:cSld>
-  <p:clrMapOvr>
-    <a:masterClrMapping/>
-  </p:clrMapOvr>
-</p:sld>
-</file>
-
-<file path=ppt/slides/slide9.xml><?xml version="1.0" encoding="utf-8"?>
-<p:sld xmlns:a="http://schemas.openxmlformats.org/drawingml/2006/main" xmlns:r="http://schemas.openxmlformats.org/officeDocument/2006/relationships" xmlns:p="http://schemas.openxmlformats.org/presentationml/2006/main">
+<file path=ppt/slides/slide10.xml><?xml version="1.0" encoding="utf-8"?>
+<p:sld xmlns:a="http://schemas.openxmlformats.org/drawingml/2006/main" xmlns:r="http://schemas.openxmlformats.org/officeDocument/2006/relationships" xmlns:p="http://schemas.openxmlformats.org/presentationml/2006/main" show="0">
   <p:cSld>
     <p:spTree>
       <p:nvGrpSpPr>
@@ -5276,8 +3454,8 @@
           </p:sp>
         </mc:Fallback>
       </mc:AlternateContent>
-      <mc:AlternateContent xmlns:mc="http://schemas.openxmlformats.org/markup-compatibility/2006">
-        <mc:Choice xmlns:a14="http://schemas.microsoft.com/office/drawing/2010/main" Requires="a14">
+      <mc:AlternateContent xmlns:mc="http://schemas.openxmlformats.org/markup-compatibility/2006" xmlns:a14="http://schemas.microsoft.com/office/drawing/2010/main">
+        <mc:Choice Requires="a14">
           <p:sp>
             <p:nvSpPr>
               <p:cNvPr id="7" name="TextBox 6"/>
@@ -5400,7 +3578,7 @@
             </p:txBody>
           </p:sp>
         </mc:Choice>
-        <mc:Fallback>
+        <mc:Fallback xmlns="">
           <p:sp>
             <p:nvSpPr>
               <p:cNvPr id="7" name="TextBox 6"/>
@@ -5449,6 +3627,2050 @@
   <p:clrMapOvr>
     <a:masterClrMapping/>
   </p:clrMapOvr>
+  <mc:AlternateContent xmlns:mc="http://schemas.openxmlformats.org/markup-compatibility/2006">
+    <mc:Choice xmlns:p14="http://schemas.microsoft.com/office/powerpoint/2010/main" Requires="p14">
+      <p:transition spd="slow" p14:dur="2000"/>
+    </mc:Choice>
+    <mc:Fallback>
+      <p:transition spd="slow"/>
+    </mc:Fallback>
+  </mc:AlternateContent>
+</p:sld>
+</file>
+
+<file path=ppt/slides/slide2.xml><?xml version="1.0" encoding="utf-8"?>
+<p:sld xmlns:a="http://schemas.openxmlformats.org/drawingml/2006/main" xmlns:r="http://schemas.openxmlformats.org/officeDocument/2006/relationships" xmlns:p="http://schemas.openxmlformats.org/presentationml/2006/main">
+  <p:cSld>
+    <p:spTree>
+      <p:nvGrpSpPr>
+        <p:cNvPr id="1" name=""/>
+        <p:cNvGrpSpPr/>
+        <p:nvPr/>
+      </p:nvGrpSpPr>
+      <p:grpSpPr>
+        <a:xfrm>
+          <a:off x="0" y="0"/>
+          <a:ext cx="0" cy="0"/>
+          <a:chOff x="0" y="0"/>
+          <a:chExt cx="0" cy="0"/>
+        </a:xfrm>
+      </p:grpSpPr>
+      <p:sp>
+        <p:nvSpPr>
+          <p:cNvPr id="2" name="Title 1"/>
+          <p:cNvSpPr>
+            <a:spLocks noGrp="1"/>
+          </p:cNvSpPr>
+          <p:nvPr>
+            <p:ph type="title"/>
+          </p:nvPr>
+        </p:nvSpPr>
+        <p:spPr>
+          <a:gradFill>
+            <a:gsLst>
+              <a:gs pos="0">
+                <a:schemeClr val="accent1">
+                  <a:lumMod val="5000"/>
+                  <a:lumOff val="95000"/>
+                </a:schemeClr>
+              </a:gs>
+              <a:gs pos="74000">
+                <a:schemeClr val="accent1">
+                  <a:lumMod val="45000"/>
+                  <a:lumOff val="55000"/>
+                </a:schemeClr>
+              </a:gs>
+              <a:gs pos="83000">
+                <a:schemeClr val="accent1">
+                  <a:lumMod val="45000"/>
+                  <a:lumOff val="55000"/>
+                </a:schemeClr>
+              </a:gs>
+              <a:gs pos="100000">
+                <a:schemeClr val="accent1">
+                  <a:lumMod val="30000"/>
+                  <a:lumOff val="70000"/>
+                </a:schemeClr>
+              </a:gs>
+            </a:gsLst>
+            <a:lin ang="5400000" scaled="1"/>
+          </a:gradFill>
+        </p:spPr>
+        <p:txBody>
+          <a:bodyPr>
+            <a:normAutofit/>
+          </a:bodyPr>
+          <a:lstStyle/>
+          <a:p>
+            <a:pPr algn="ctr"/>
+            <a:r>
+              <a:rPr lang="en-US" dirty="0" smtClean="0"/>
+              <a:t>Let’s State A Problem</a:t>
+            </a:r>
+            <a:endParaRPr lang="en-US" dirty="0"/>
+          </a:p>
+        </p:txBody>
+      </p:sp>
+      <p:sp>
+        <p:nvSpPr>
+          <p:cNvPr id="3" name="Content Placeholder 2"/>
+          <p:cNvSpPr>
+            <a:spLocks noGrp="1"/>
+          </p:cNvSpPr>
+          <p:nvPr>
+            <p:ph idx="1"/>
+          </p:nvPr>
+        </p:nvSpPr>
+        <p:spPr/>
+        <p:txBody>
+          <a:bodyPr>
+            <a:normAutofit/>
+          </a:bodyPr>
+          <a:lstStyle/>
+          <a:p>
+            <a:pPr algn="just">
+              <a:spcAft>
+                <a:spcPts val="1200"/>
+              </a:spcAft>
+            </a:pPr>
+            <a:r>
+              <a:rPr lang="en-US" sz="3400" dirty="0" smtClean="0"/>
+              <a:t>In social networks, often a form of an adjacency matrix is used to store the information about users that follow each other.</a:t>
+            </a:r>
+          </a:p>
+          <a:p>
+            <a:pPr algn="just">
+              <a:spcAft>
+                <a:spcPts val="1200"/>
+              </a:spcAft>
+            </a:pPr>
+            <a:endParaRPr lang="en-US" sz="3400" dirty="0" smtClean="0"/>
+          </a:p>
+          <a:p>
+            <a:pPr marL="0" indent="0" algn="just">
+              <a:spcAft>
+                <a:spcPts val="1200"/>
+              </a:spcAft>
+              <a:buNone/>
+            </a:pPr>
+            <a:endParaRPr lang="en-US" sz="3200" dirty="0"/>
+          </a:p>
+        </p:txBody>
+      </p:sp>
+    </p:spTree>
+    <p:extLst>
+      <p:ext uri="{BB962C8B-B14F-4D97-AF65-F5344CB8AC3E}">
+        <p14:creationId xmlns:p14="http://schemas.microsoft.com/office/powerpoint/2010/main" val="905099816"/>
+      </p:ext>
+    </p:extLst>
+  </p:cSld>
+  <p:clrMapOvr>
+    <a:masterClrMapping/>
+  </p:clrMapOvr>
+</p:sld>
+</file>
+
+<file path=ppt/slides/slide3.xml><?xml version="1.0" encoding="utf-8"?>
+<p:sld xmlns:a="http://schemas.openxmlformats.org/drawingml/2006/main" xmlns:r="http://schemas.openxmlformats.org/officeDocument/2006/relationships" xmlns:p="http://schemas.openxmlformats.org/presentationml/2006/main">
+  <p:cSld>
+    <p:spTree>
+      <p:nvGrpSpPr>
+        <p:cNvPr id="1" name=""/>
+        <p:cNvGrpSpPr/>
+        <p:nvPr/>
+      </p:nvGrpSpPr>
+      <p:grpSpPr>
+        <a:xfrm>
+          <a:off x="0" y="0"/>
+          <a:ext cx="0" cy="0"/>
+          <a:chOff x="0" y="0"/>
+          <a:chExt cx="0" cy="0"/>
+        </a:xfrm>
+      </p:grpSpPr>
+      <p:sp>
+        <p:nvSpPr>
+          <p:cNvPr id="2" name="Title 1"/>
+          <p:cNvSpPr>
+            <a:spLocks noGrp="1"/>
+          </p:cNvSpPr>
+          <p:nvPr>
+            <p:ph type="title"/>
+          </p:nvPr>
+        </p:nvSpPr>
+        <p:spPr>
+          <a:gradFill>
+            <a:gsLst>
+              <a:gs pos="0">
+                <a:schemeClr val="accent1">
+                  <a:lumMod val="5000"/>
+                  <a:lumOff val="95000"/>
+                </a:schemeClr>
+              </a:gs>
+              <a:gs pos="74000">
+                <a:schemeClr val="accent1">
+                  <a:lumMod val="45000"/>
+                  <a:lumOff val="55000"/>
+                </a:schemeClr>
+              </a:gs>
+              <a:gs pos="83000">
+                <a:schemeClr val="accent1">
+                  <a:lumMod val="45000"/>
+                  <a:lumOff val="55000"/>
+                </a:schemeClr>
+              </a:gs>
+              <a:gs pos="100000">
+                <a:schemeClr val="accent1">
+                  <a:lumMod val="30000"/>
+                  <a:lumOff val="70000"/>
+                </a:schemeClr>
+              </a:gs>
+            </a:gsLst>
+            <a:lin ang="5400000" scaled="1"/>
+          </a:gradFill>
+        </p:spPr>
+        <p:txBody>
+          <a:bodyPr>
+            <a:normAutofit/>
+          </a:bodyPr>
+          <a:lstStyle/>
+          <a:p>
+            <a:pPr algn="ctr"/>
+            <a:r>
+              <a:rPr lang="en-US" dirty="0" smtClean="0"/>
+              <a:t>Let’s State A Problem</a:t>
+            </a:r>
+            <a:endParaRPr lang="en-US" dirty="0"/>
+          </a:p>
+        </p:txBody>
+      </p:sp>
+      <mc:AlternateContent xmlns:mc="http://schemas.openxmlformats.org/markup-compatibility/2006" xmlns:a14="http://schemas.microsoft.com/office/drawing/2010/main">
+        <mc:Choice Requires="a14">
+          <p:sp>
+            <p:nvSpPr>
+              <p:cNvPr id="6" name="TextBox 5"/>
+              <p:cNvSpPr txBox="1"/>
+              <p:nvPr/>
+            </p:nvSpPr>
+            <p:spPr>
+              <a:xfrm>
+                <a:off x="4321732" y="2900218"/>
+                <a:ext cx="3548536" cy="2547492"/>
+              </a:xfrm>
+              <a:prstGeom prst="rect">
+                <a:avLst/>
+              </a:prstGeom>
+              <a:noFill/>
+            </p:spPr>
+            <p:txBody>
+              <a:bodyPr wrap="none" lIns="0" tIns="0" rIns="0" bIns="0" rtlCol="0">
+                <a:spAutoFit/>
+              </a:bodyPr>
+              <a:lstStyle/>
+              <a:p>
+                <a:pPr/>
+                <a14:m>
+                  <m:oMathPara xmlns:m="http://schemas.openxmlformats.org/officeDocument/2006/math">
+                    <m:oMathParaPr>
+                      <m:jc m:val="centerGroup"/>
+                    </m:oMathParaPr>
+                    <m:oMath xmlns:m="http://schemas.openxmlformats.org/officeDocument/2006/math">
+                      <m:d>
+                        <m:dPr>
+                          <m:begChr m:val="["/>
+                          <m:endChr m:val="]"/>
+                          <m:ctrlPr>
+                            <a:rPr lang="en-US" sz="3600" b="0" i="1" smtClean="0">
+                              <a:latin typeface="Cambria Math" panose="02040503050406030204" pitchFamily="18" charset="0"/>
+                            </a:rPr>
+                          </m:ctrlPr>
+                        </m:dPr>
+                        <m:e>
+                          <m:m>
+                            <m:mPr>
+                              <m:mcs>
+                                <m:mc>
+                                  <m:mcPr>
+                                    <m:count m:val="5"/>
+                                    <m:mcJc m:val="center"/>
+                                  </m:mcPr>
+                                </m:mc>
+                              </m:mcs>
+                              <m:ctrlPr>
+                                <a:rPr lang="en-US" sz="3600" i="1">
+                                  <a:latin typeface="Cambria Math" panose="02040503050406030204" pitchFamily="18" charset="0"/>
+                                </a:rPr>
+                              </m:ctrlPr>
+                            </m:mPr>
+                            <m:mr>
+                              <m:e>
+                                <m:r>
+                                  <m:rPr>
+                                    <m:brk m:alnAt="7"/>
+                                  </m:rPr>
+                                  <a:rPr lang="en-US" sz="3600" b="0" i="1" smtClean="0">
+                                    <a:latin typeface="Cambria Math" panose="02040503050406030204" pitchFamily="18" charset="0"/>
+                                  </a:rPr>
+                                  <m:t>0</m:t>
+                                </m:r>
+                              </m:e>
+                              <m:e>
+                                <m:r>
+                                  <a:rPr lang="en-US" sz="3600" b="0" i="1" smtClean="0">
+                                    <a:latin typeface="Cambria Math" panose="02040503050406030204" pitchFamily="18" charset="0"/>
+                                  </a:rPr>
+                                  <m:t>0</m:t>
+                                </m:r>
+                              </m:e>
+                              <m:e>
+                                <m:r>
+                                  <a:rPr lang="en-US" sz="3600" b="0" i="1" smtClean="0">
+                                    <a:latin typeface="Cambria Math" panose="02040503050406030204" pitchFamily="18" charset="0"/>
+                                  </a:rPr>
+                                  <m:t>1</m:t>
+                                </m:r>
+                              </m:e>
+                              <m:e>
+                                <m:r>
+                                  <a:rPr lang="en-US" sz="3600" b="0" i="1" smtClean="0">
+                                    <a:latin typeface="Cambria Math" panose="02040503050406030204" pitchFamily="18" charset="0"/>
+                                  </a:rPr>
+                                  <m:t>0</m:t>
+                                </m:r>
+                              </m:e>
+                              <m:e>
+                                <m:r>
+                                  <a:rPr lang="en-US" sz="3600" b="0" i="1" smtClean="0">
+                                    <a:latin typeface="Cambria Math" panose="02040503050406030204" pitchFamily="18" charset="0"/>
+                                  </a:rPr>
+                                  <m:t>1</m:t>
+                                </m:r>
+                              </m:e>
+                            </m:mr>
+                            <m:mr>
+                              <m:e>
+                                <m:r>
+                                  <a:rPr lang="en-US" sz="3600" b="0" i="1" smtClean="0">
+                                    <a:latin typeface="Cambria Math" panose="02040503050406030204" pitchFamily="18" charset="0"/>
+                                  </a:rPr>
+                                  <m:t>0</m:t>
+                                </m:r>
+                              </m:e>
+                              <m:e>
+                                <m:r>
+                                  <a:rPr lang="en-US" sz="3600" b="0" i="1" smtClean="0">
+                                    <a:latin typeface="Cambria Math" panose="02040503050406030204" pitchFamily="18" charset="0"/>
+                                  </a:rPr>
+                                  <m:t>0</m:t>
+                                </m:r>
+                              </m:e>
+                              <m:e>
+                                <m:r>
+                                  <a:rPr lang="en-US" sz="3600" b="0" i="1" smtClean="0">
+                                    <a:latin typeface="Cambria Math" panose="02040503050406030204" pitchFamily="18" charset="0"/>
+                                  </a:rPr>
+                                  <m:t>1</m:t>
+                                </m:r>
+                              </m:e>
+                              <m:e>
+                                <m:r>
+                                  <a:rPr lang="en-US" sz="3600" b="0" i="1" smtClean="0">
+                                    <a:latin typeface="Cambria Math" panose="02040503050406030204" pitchFamily="18" charset="0"/>
+                                  </a:rPr>
+                                  <m:t>1</m:t>
+                                </m:r>
+                              </m:e>
+                              <m:e>
+                                <m:r>
+                                  <a:rPr lang="en-US" sz="3600" b="0" i="1" smtClean="0">
+                                    <a:latin typeface="Cambria Math" panose="02040503050406030204" pitchFamily="18" charset="0"/>
+                                  </a:rPr>
+                                  <m:t>0</m:t>
+                                </m:r>
+                              </m:e>
+                            </m:mr>
+                            <m:mr>
+                              <m:e>
+                                <m:r>
+                                  <a:rPr lang="en-US" sz="3600" b="0" i="1" smtClean="0">
+                                    <a:latin typeface="Cambria Math" panose="02040503050406030204" pitchFamily="18" charset="0"/>
+                                  </a:rPr>
+                                  <m:t>1</m:t>
+                                </m:r>
+                              </m:e>
+                              <m:e>
+                                <m:r>
+                                  <a:rPr lang="en-US" sz="3600" b="0" i="1" smtClean="0">
+                                    <a:latin typeface="Cambria Math" panose="02040503050406030204" pitchFamily="18" charset="0"/>
+                                  </a:rPr>
+                                  <m:t>0</m:t>
+                                </m:r>
+                              </m:e>
+                              <m:e>
+                                <m:r>
+                                  <a:rPr lang="en-US" sz="3600" b="0" i="1" smtClean="0">
+                                    <a:latin typeface="Cambria Math" panose="02040503050406030204" pitchFamily="18" charset="0"/>
+                                  </a:rPr>
+                                  <m:t>0</m:t>
+                                </m:r>
+                              </m:e>
+                              <m:e>
+                                <m:r>
+                                  <a:rPr lang="en-US" sz="3600" b="0" i="1" smtClean="0">
+                                    <a:latin typeface="Cambria Math" panose="02040503050406030204" pitchFamily="18" charset="0"/>
+                                  </a:rPr>
+                                  <m:t>0</m:t>
+                                </m:r>
+                              </m:e>
+                              <m:e>
+                                <m:r>
+                                  <a:rPr lang="en-US" sz="3600" b="0" i="1" smtClean="0">
+                                    <a:latin typeface="Cambria Math" panose="02040503050406030204" pitchFamily="18" charset="0"/>
+                                  </a:rPr>
+                                  <m:t>1</m:t>
+                                </m:r>
+                              </m:e>
+                            </m:mr>
+                            <m:mr>
+                              <m:e>
+                                <m:r>
+                                  <a:rPr lang="en-US" sz="3600" b="0" i="1" smtClean="0">
+                                    <a:latin typeface="Cambria Math" panose="02040503050406030204" pitchFamily="18" charset="0"/>
+                                  </a:rPr>
+                                  <m:t>1</m:t>
+                                </m:r>
+                              </m:e>
+                              <m:e>
+                                <m:r>
+                                  <a:rPr lang="en-US" sz="3600" b="0" i="1" smtClean="0">
+                                    <a:latin typeface="Cambria Math" panose="02040503050406030204" pitchFamily="18" charset="0"/>
+                                  </a:rPr>
+                                  <m:t>1</m:t>
+                                </m:r>
+                              </m:e>
+                              <m:e>
+                                <m:r>
+                                  <a:rPr lang="en-US" sz="3600" b="0" i="1" smtClean="0">
+                                    <a:latin typeface="Cambria Math" panose="02040503050406030204" pitchFamily="18" charset="0"/>
+                                  </a:rPr>
+                                  <m:t>0</m:t>
+                                </m:r>
+                              </m:e>
+                              <m:e>
+                                <m:r>
+                                  <a:rPr lang="en-US" sz="3600" b="0" i="1" smtClean="0">
+                                    <a:latin typeface="Cambria Math" panose="02040503050406030204" pitchFamily="18" charset="0"/>
+                                  </a:rPr>
+                                  <m:t>0</m:t>
+                                </m:r>
+                              </m:e>
+                              <m:e>
+                                <m:r>
+                                  <a:rPr lang="en-US" sz="3600" b="0" i="1" smtClean="0">
+                                    <a:latin typeface="Cambria Math" panose="02040503050406030204" pitchFamily="18" charset="0"/>
+                                  </a:rPr>
+                                  <m:t>0</m:t>
+                                </m:r>
+                              </m:e>
+                            </m:mr>
+                            <m:mr>
+                              <m:e>
+                                <m:r>
+                                  <a:rPr lang="en-US" sz="3600" b="0" i="1" smtClean="0">
+                                    <a:latin typeface="Cambria Math" panose="02040503050406030204" pitchFamily="18" charset="0"/>
+                                  </a:rPr>
+                                  <m:t>1</m:t>
+                                </m:r>
+                              </m:e>
+                              <m:e>
+                                <m:r>
+                                  <a:rPr lang="en-US" sz="3600" b="0" i="1" smtClean="0">
+                                    <a:latin typeface="Cambria Math" panose="02040503050406030204" pitchFamily="18" charset="0"/>
+                                  </a:rPr>
+                                  <m:t>0</m:t>
+                                </m:r>
+                              </m:e>
+                              <m:e>
+                                <m:r>
+                                  <a:rPr lang="en-US" sz="3600" b="0" i="1" smtClean="0">
+                                    <a:latin typeface="Cambria Math" panose="02040503050406030204" pitchFamily="18" charset="0"/>
+                                  </a:rPr>
+                                  <m:t>0</m:t>
+                                </m:r>
+                              </m:e>
+                              <m:e>
+                                <m:r>
+                                  <a:rPr lang="en-US" sz="3600" b="0" i="1" smtClean="0">
+                                    <a:latin typeface="Cambria Math" panose="02040503050406030204" pitchFamily="18" charset="0"/>
+                                  </a:rPr>
+                                  <m:t>1</m:t>
+                                </m:r>
+                              </m:e>
+                              <m:e>
+                                <m:r>
+                                  <a:rPr lang="en-US" sz="3600" b="0" i="1" smtClean="0">
+                                    <a:latin typeface="Cambria Math" panose="02040503050406030204" pitchFamily="18" charset="0"/>
+                                  </a:rPr>
+                                  <m:t>0</m:t>
+                                </m:r>
+                              </m:e>
+                            </m:mr>
+                          </m:m>
+                        </m:e>
+                      </m:d>
+                    </m:oMath>
+                  </m:oMathPara>
+                </a14:m>
+                <a:endParaRPr lang="en-US" sz="3600" dirty="0"/>
+              </a:p>
+            </p:txBody>
+          </p:sp>
+        </mc:Choice>
+        <mc:Fallback xmlns="">
+          <p:sp>
+            <p:nvSpPr>
+              <p:cNvPr id="6" name="TextBox 5"/>
+              <p:cNvSpPr txBox="1">
+                <a:spLocks noRot="1" noChangeAspect="1" noMove="1" noResize="1" noEditPoints="1" noAdjustHandles="1" noChangeArrowheads="1" noChangeShapeType="1" noTextEdit="1"/>
+              </p:cNvSpPr>
+              <p:nvPr/>
+            </p:nvSpPr>
+            <p:spPr>
+              <a:xfrm>
+                <a:off x="4321732" y="2900218"/>
+                <a:ext cx="3548536" cy="2547492"/>
+              </a:xfrm>
+              <a:prstGeom prst="rect">
+                <a:avLst/>
+              </a:prstGeom>
+              <a:blipFill>
+                <a:blip r:embed="rId2"/>
+                <a:stretch>
+                  <a:fillRect/>
+                </a:stretch>
+              </a:blipFill>
+            </p:spPr>
+            <p:txBody>
+              <a:bodyPr/>
+              <a:lstStyle/>
+              <a:p>
+                <a:r>
+                  <a:rPr lang="en-US">
+                    <a:noFill/>
+                  </a:rPr>
+                  <a:t> </a:t>
+                </a:r>
+              </a:p>
+            </p:txBody>
+          </p:sp>
+        </mc:Fallback>
+      </mc:AlternateContent>
+      <mc:AlternateContent xmlns:mc="http://schemas.openxmlformats.org/markup-compatibility/2006" xmlns:a14="http://schemas.microsoft.com/office/drawing/2010/main">
+        <mc:Choice Requires="a14">
+          <p:sp>
+            <p:nvSpPr>
+              <p:cNvPr id="7" name="TextBox 6"/>
+              <p:cNvSpPr txBox="1"/>
+              <p:nvPr/>
+            </p:nvSpPr>
+            <p:spPr>
+              <a:xfrm>
+                <a:off x="4483379" y="2138527"/>
+                <a:ext cx="3225242" cy="553998"/>
+              </a:xfrm>
+              <a:prstGeom prst="rect">
+                <a:avLst/>
+              </a:prstGeom>
+              <a:noFill/>
+            </p:spPr>
+            <p:txBody>
+              <a:bodyPr wrap="none" lIns="0" tIns="0" rIns="0" bIns="0" rtlCol="0">
+                <a:spAutoFit/>
+              </a:bodyPr>
+              <a:lstStyle/>
+              <a:p>
+                <a:pPr/>
+                <a14:m>
+                  <m:oMathPara xmlns:m="http://schemas.openxmlformats.org/officeDocument/2006/math">
+                    <m:oMathParaPr>
+                      <m:jc m:val="centerGroup"/>
+                    </m:oMathParaPr>
+                    <m:oMath xmlns:m="http://schemas.openxmlformats.org/officeDocument/2006/math">
+                      <m:m>
+                        <m:mPr>
+                          <m:mcs>
+                            <m:mc>
+                              <m:mcPr>
+                                <m:count m:val="5"/>
+                                <m:mcJc m:val="center"/>
+                              </m:mcPr>
+                            </m:mc>
+                          </m:mcs>
+                          <m:ctrlPr>
+                            <a:rPr lang="en-US" sz="3600" i="1" smtClean="0">
+                              <a:latin typeface="Cambria Math" panose="02040503050406030204" pitchFamily="18" charset="0"/>
+                            </a:rPr>
+                          </m:ctrlPr>
+                        </m:mPr>
+                        <m:mr>
+                          <m:e>
+                            <m:r>
+                              <m:rPr>
+                                <m:brk m:alnAt="7"/>
+                              </m:rPr>
+                              <a:rPr lang="en-US" sz="3600" b="0" i="1" smtClean="0">
+                                <a:latin typeface="Cambria Math" panose="02040503050406030204" pitchFamily="18" charset="0"/>
+                              </a:rPr>
+                              <m:t>1</m:t>
+                            </m:r>
+                          </m:e>
+                          <m:e>
+                            <m:r>
+                              <a:rPr lang="en-US" sz="3600" b="0" i="1" smtClean="0">
+                                <a:latin typeface="Cambria Math" panose="02040503050406030204" pitchFamily="18" charset="0"/>
+                              </a:rPr>
+                              <m:t>2</m:t>
+                            </m:r>
+                          </m:e>
+                          <m:e>
+                            <m:r>
+                              <a:rPr lang="en-US" sz="3600" b="0" i="1" smtClean="0">
+                                <a:latin typeface="Cambria Math" panose="02040503050406030204" pitchFamily="18" charset="0"/>
+                              </a:rPr>
+                              <m:t>3</m:t>
+                            </m:r>
+                          </m:e>
+                          <m:e>
+                            <m:r>
+                              <a:rPr lang="en-US" sz="3600" b="0" i="1" smtClean="0">
+                                <a:latin typeface="Cambria Math" panose="02040503050406030204" pitchFamily="18" charset="0"/>
+                              </a:rPr>
+                              <m:t>4</m:t>
+                            </m:r>
+                          </m:e>
+                          <m:e>
+                            <m:r>
+                              <a:rPr lang="en-US" sz="3600" b="0" i="1" smtClean="0">
+                                <a:latin typeface="Cambria Math" panose="02040503050406030204" pitchFamily="18" charset="0"/>
+                              </a:rPr>
+                              <m:t>5</m:t>
+                            </m:r>
+                          </m:e>
+                        </m:mr>
+                      </m:m>
+                    </m:oMath>
+                  </m:oMathPara>
+                </a14:m>
+                <a:endParaRPr lang="en-US" sz="3600" dirty="0"/>
+              </a:p>
+            </p:txBody>
+          </p:sp>
+        </mc:Choice>
+        <mc:Fallback xmlns="">
+          <p:sp>
+            <p:nvSpPr>
+              <p:cNvPr id="7" name="TextBox 6"/>
+              <p:cNvSpPr txBox="1">
+                <a:spLocks noRot="1" noChangeAspect="1" noMove="1" noResize="1" noEditPoints="1" noAdjustHandles="1" noChangeArrowheads="1" noChangeShapeType="1" noTextEdit="1"/>
+              </p:cNvSpPr>
+              <p:nvPr/>
+            </p:nvSpPr>
+            <p:spPr>
+              <a:xfrm>
+                <a:off x="4483379" y="2138527"/>
+                <a:ext cx="3225242" cy="553998"/>
+              </a:xfrm>
+              <a:prstGeom prst="rect">
+                <a:avLst/>
+              </a:prstGeom>
+              <a:blipFill>
+                <a:blip r:embed="rId3"/>
+                <a:stretch>
+                  <a:fillRect/>
+                </a:stretch>
+              </a:blipFill>
+            </p:spPr>
+            <p:txBody>
+              <a:bodyPr/>
+              <a:lstStyle/>
+              <a:p>
+                <a:r>
+                  <a:rPr lang="en-US">
+                    <a:noFill/>
+                  </a:rPr>
+                  <a:t> </a:t>
+                </a:r>
+              </a:p>
+            </p:txBody>
+          </p:sp>
+        </mc:Fallback>
+      </mc:AlternateContent>
+      <mc:AlternateContent xmlns:mc="http://schemas.openxmlformats.org/markup-compatibility/2006" xmlns:a14="http://schemas.microsoft.com/office/drawing/2010/main">
+        <mc:Choice Requires="a14">
+          <p:sp>
+            <p:nvSpPr>
+              <p:cNvPr id="8" name="TextBox 7"/>
+              <p:cNvSpPr txBox="1"/>
+              <p:nvPr/>
+            </p:nvSpPr>
+            <p:spPr>
+              <a:xfrm>
+                <a:off x="3468254" y="2900218"/>
+                <a:ext cx="359073" cy="2547492"/>
+              </a:xfrm>
+              <a:prstGeom prst="rect">
+                <a:avLst/>
+              </a:prstGeom>
+              <a:noFill/>
+            </p:spPr>
+            <p:txBody>
+              <a:bodyPr wrap="none" lIns="0" tIns="0" rIns="0" bIns="0" rtlCol="0">
+                <a:spAutoFit/>
+              </a:bodyPr>
+              <a:lstStyle/>
+              <a:p>
+                <a:pPr/>
+                <a14:m>
+                  <m:oMathPara xmlns:m="http://schemas.openxmlformats.org/officeDocument/2006/math">
+                    <m:oMathParaPr>
+                      <m:jc m:val="centerGroup"/>
+                    </m:oMathParaPr>
+                    <m:oMath xmlns:m="http://schemas.openxmlformats.org/officeDocument/2006/math">
+                      <m:m>
+                        <m:mPr>
+                          <m:mcs>
+                            <m:mc>
+                              <m:mcPr>
+                                <m:count m:val="1"/>
+                                <m:mcJc m:val="center"/>
+                              </m:mcPr>
+                            </m:mc>
+                          </m:mcs>
+                          <m:ctrlPr>
+                            <a:rPr lang="en-US" sz="3600" i="1" smtClean="0">
+                              <a:latin typeface="Cambria Math" panose="02040503050406030204" pitchFamily="18" charset="0"/>
+                            </a:rPr>
+                          </m:ctrlPr>
+                        </m:mPr>
+                        <m:mr>
+                          <m:e>
+                            <m:r>
+                              <m:rPr>
+                                <m:brk m:alnAt="7"/>
+                              </m:rPr>
+                              <a:rPr lang="en-US" sz="3600" b="0" i="1" smtClean="0">
+                                <a:latin typeface="Cambria Math" panose="02040503050406030204" pitchFamily="18" charset="0"/>
+                              </a:rPr>
+                              <m:t>1</m:t>
+                            </m:r>
+                          </m:e>
+                        </m:mr>
+                        <m:mr>
+                          <m:e>
+                            <m:r>
+                              <a:rPr lang="en-US" sz="3600" b="0" i="1" smtClean="0">
+                                <a:latin typeface="Cambria Math" panose="02040503050406030204" pitchFamily="18" charset="0"/>
+                              </a:rPr>
+                              <m:t>2</m:t>
+                            </m:r>
+                          </m:e>
+                        </m:mr>
+                        <m:mr>
+                          <m:e>
+                            <m:r>
+                              <a:rPr lang="en-US" sz="3600" b="0" i="1" smtClean="0">
+                                <a:latin typeface="Cambria Math" panose="02040503050406030204" pitchFamily="18" charset="0"/>
+                              </a:rPr>
+                              <m:t>3</m:t>
+                            </m:r>
+                          </m:e>
+                        </m:mr>
+                        <m:mr>
+                          <m:e>
+                            <m:r>
+                              <a:rPr lang="en-US" sz="3600" b="0" i="1" smtClean="0">
+                                <a:latin typeface="Cambria Math" panose="02040503050406030204" pitchFamily="18" charset="0"/>
+                              </a:rPr>
+                              <m:t>4</m:t>
+                            </m:r>
+                          </m:e>
+                        </m:mr>
+                        <m:mr>
+                          <m:e>
+                            <m:r>
+                              <a:rPr lang="en-US" sz="3600" b="0" i="1" smtClean="0">
+                                <a:latin typeface="Cambria Math" panose="02040503050406030204" pitchFamily="18" charset="0"/>
+                              </a:rPr>
+                              <m:t>5</m:t>
+                            </m:r>
+                          </m:e>
+                        </m:mr>
+                      </m:m>
+                    </m:oMath>
+                  </m:oMathPara>
+                </a14:m>
+                <a:endParaRPr lang="en-US" sz="3600" dirty="0"/>
+              </a:p>
+            </p:txBody>
+          </p:sp>
+        </mc:Choice>
+        <mc:Fallback xmlns="">
+          <p:sp>
+            <p:nvSpPr>
+              <p:cNvPr id="8" name="TextBox 7"/>
+              <p:cNvSpPr txBox="1">
+                <a:spLocks noRot="1" noChangeAspect="1" noMove="1" noResize="1" noEditPoints="1" noAdjustHandles="1" noChangeArrowheads="1" noChangeShapeType="1" noTextEdit="1"/>
+              </p:cNvSpPr>
+              <p:nvPr/>
+            </p:nvSpPr>
+            <p:spPr>
+              <a:xfrm>
+                <a:off x="3468254" y="2900218"/>
+                <a:ext cx="359073" cy="2547492"/>
+              </a:xfrm>
+              <a:prstGeom prst="rect">
+                <a:avLst/>
+              </a:prstGeom>
+              <a:blipFill>
+                <a:blip r:embed="rId4"/>
+                <a:stretch>
+                  <a:fillRect/>
+                </a:stretch>
+              </a:blipFill>
+            </p:spPr>
+            <p:txBody>
+              <a:bodyPr/>
+              <a:lstStyle/>
+              <a:p>
+                <a:r>
+                  <a:rPr lang="en-US">
+                    <a:noFill/>
+                  </a:rPr>
+                  <a:t> </a:t>
+                </a:r>
+              </a:p>
+            </p:txBody>
+          </p:sp>
+        </mc:Fallback>
+      </mc:AlternateContent>
+    </p:spTree>
+    <p:extLst>
+      <p:ext uri="{BB962C8B-B14F-4D97-AF65-F5344CB8AC3E}">
+        <p14:creationId xmlns:p14="http://schemas.microsoft.com/office/powerpoint/2010/main" val="3916248390"/>
+      </p:ext>
+    </p:extLst>
+  </p:cSld>
+  <p:clrMapOvr>
+    <a:masterClrMapping/>
+  </p:clrMapOvr>
+</p:sld>
+</file>
+
+<file path=ppt/slides/slide4.xml><?xml version="1.0" encoding="utf-8"?>
+<p:sld xmlns:a="http://schemas.openxmlformats.org/drawingml/2006/main" xmlns:r="http://schemas.openxmlformats.org/officeDocument/2006/relationships" xmlns:p="http://schemas.openxmlformats.org/presentationml/2006/main">
+  <p:cSld>
+    <p:spTree>
+      <p:nvGrpSpPr>
+        <p:cNvPr id="1" name=""/>
+        <p:cNvGrpSpPr/>
+        <p:nvPr/>
+      </p:nvGrpSpPr>
+      <p:grpSpPr>
+        <a:xfrm>
+          <a:off x="0" y="0"/>
+          <a:ext cx="0" cy="0"/>
+          <a:chOff x="0" y="0"/>
+          <a:chExt cx="0" cy="0"/>
+        </a:xfrm>
+      </p:grpSpPr>
+      <p:sp>
+        <p:nvSpPr>
+          <p:cNvPr id="2" name="Title 1"/>
+          <p:cNvSpPr>
+            <a:spLocks noGrp="1"/>
+          </p:cNvSpPr>
+          <p:nvPr>
+            <p:ph type="title"/>
+          </p:nvPr>
+        </p:nvSpPr>
+        <p:spPr>
+          <a:gradFill>
+            <a:gsLst>
+              <a:gs pos="0">
+                <a:schemeClr val="accent1">
+                  <a:lumMod val="5000"/>
+                  <a:lumOff val="95000"/>
+                </a:schemeClr>
+              </a:gs>
+              <a:gs pos="74000">
+                <a:schemeClr val="accent1">
+                  <a:lumMod val="45000"/>
+                  <a:lumOff val="55000"/>
+                </a:schemeClr>
+              </a:gs>
+              <a:gs pos="83000">
+                <a:schemeClr val="accent1">
+                  <a:lumMod val="45000"/>
+                  <a:lumOff val="55000"/>
+                </a:schemeClr>
+              </a:gs>
+              <a:gs pos="100000">
+                <a:schemeClr val="accent1">
+                  <a:lumMod val="30000"/>
+                  <a:lumOff val="70000"/>
+                </a:schemeClr>
+              </a:gs>
+            </a:gsLst>
+            <a:lin ang="5400000" scaled="1"/>
+          </a:gradFill>
+        </p:spPr>
+        <p:txBody>
+          <a:bodyPr>
+            <a:normAutofit/>
+          </a:bodyPr>
+          <a:lstStyle/>
+          <a:p>
+            <a:pPr algn="ctr"/>
+            <a:r>
+              <a:rPr lang="en-US" dirty="0" smtClean="0"/>
+              <a:t>Let’s State A Problem</a:t>
+            </a:r>
+            <a:endParaRPr lang="en-US" dirty="0"/>
+          </a:p>
+        </p:txBody>
+      </p:sp>
+      <mc:AlternateContent xmlns:mc="http://schemas.openxmlformats.org/markup-compatibility/2006" xmlns:a14="http://schemas.microsoft.com/office/drawing/2010/main">
+        <mc:Choice Requires="a14">
+          <p:sp>
+            <p:nvSpPr>
+              <p:cNvPr id="3" name="Content Placeholder 2"/>
+              <p:cNvSpPr>
+                <a:spLocks noGrp="1"/>
+              </p:cNvSpPr>
+              <p:nvPr>
+                <p:ph idx="1"/>
+              </p:nvPr>
+            </p:nvSpPr>
+            <p:spPr/>
+            <p:txBody>
+              <a:bodyPr>
+                <a:normAutofit/>
+              </a:bodyPr>
+              <a:lstStyle/>
+              <a:p>
+                <a:pPr algn="just">
+                  <a:spcAft>
+                    <a:spcPts val="1200"/>
+                  </a:spcAft>
+                </a:pPr>
+                <a:r>
+                  <a:rPr lang="en-US" sz="3400" dirty="0" smtClean="0"/>
+                  <a:t>Now, imagine a social network with 100 million users.</a:t>
+                </a:r>
+              </a:p>
+              <a:p>
+                <a:pPr algn="just">
+                  <a:spcAft>
+                    <a:spcPts val="1200"/>
+                  </a:spcAft>
+                </a:pPr>
+                <a:endParaRPr lang="en-US" sz="3400" dirty="0" smtClean="0"/>
+              </a:p>
+              <a:p>
+                <a:pPr algn="just">
+                  <a:spcAft>
+                    <a:spcPts val="1200"/>
+                  </a:spcAft>
+                </a:pPr>
+                <a:r>
+                  <a:rPr lang="en-US" sz="3400" dirty="0" smtClean="0"/>
+                  <a:t>This results in an adjacency matrix with </a:t>
+                </a:r>
+                <a14:m>
+                  <m:oMath xmlns:m="http://schemas.openxmlformats.org/officeDocument/2006/math">
+                    <m:sSup>
+                      <m:sSupPr>
+                        <m:ctrlPr>
+                          <a:rPr lang="en-US" sz="3200" i="1" smtClean="0">
+                            <a:latin typeface="Cambria Math" panose="02040503050406030204" pitchFamily="18" charset="0"/>
+                          </a:rPr>
+                        </m:ctrlPr>
+                      </m:sSupPr>
+                      <m:e>
+                        <m:r>
+                          <a:rPr lang="en-US" sz="3200" b="0" i="1" smtClean="0">
+                            <a:latin typeface="Cambria Math" panose="02040503050406030204" pitchFamily="18" charset="0"/>
+                          </a:rPr>
+                          <m:t>10</m:t>
+                        </m:r>
+                      </m:e>
+                      <m:sup>
+                        <m:r>
+                          <a:rPr lang="en-US" sz="3200" b="0" i="1" smtClean="0">
+                            <a:latin typeface="Cambria Math" panose="02040503050406030204" pitchFamily="18" charset="0"/>
+                          </a:rPr>
+                          <m:t>8</m:t>
+                        </m:r>
+                      </m:sup>
+                    </m:sSup>
+                    <m:r>
+                      <a:rPr lang="en-US" sz="3200" b="0" i="1" smtClean="0">
+                        <a:latin typeface="Cambria Math" panose="02040503050406030204" pitchFamily="18" charset="0"/>
+                      </a:rPr>
+                      <m:t>∗</m:t>
+                    </m:r>
+                    <m:sSup>
+                      <m:sSupPr>
+                        <m:ctrlPr>
+                          <a:rPr lang="en-US" sz="3200" b="0" i="1" smtClean="0">
+                            <a:latin typeface="Cambria Math" panose="02040503050406030204" pitchFamily="18" charset="0"/>
+                          </a:rPr>
+                        </m:ctrlPr>
+                      </m:sSupPr>
+                      <m:e>
+                        <m:r>
+                          <a:rPr lang="en-US" sz="3200" b="0" i="1" smtClean="0">
+                            <a:latin typeface="Cambria Math" panose="02040503050406030204" pitchFamily="18" charset="0"/>
+                          </a:rPr>
+                          <m:t>10</m:t>
+                        </m:r>
+                      </m:e>
+                      <m:sup>
+                        <m:r>
+                          <a:rPr lang="en-US" sz="3200" b="0" i="1" smtClean="0">
+                            <a:latin typeface="Cambria Math" panose="02040503050406030204" pitchFamily="18" charset="0"/>
+                          </a:rPr>
+                          <m:t>8</m:t>
+                        </m:r>
+                      </m:sup>
+                    </m:sSup>
+                    <m:r>
+                      <a:rPr lang="en-US" sz="3200" b="0" i="1" smtClean="0">
+                        <a:latin typeface="Cambria Math" panose="02040503050406030204" pitchFamily="18" charset="0"/>
+                      </a:rPr>
+                      <m:t>=</m:t>
+                    </m:r>
+                    <m:sSup>
+                      <m:sSupPr>
+                        <m:ctrlPr>
+                          <a:rPr lang="en-US" sz="3200" b="0" i="1" smtClean="0">
+                            <a:latin typeface="Cambria Math" panose="02040503050406030204" pitchFamily="18" charset="0"/>
+                          </a:rPr>
+                        </m:ctrlPr>
+                      </m:sSupPr>
+                      <m:e>
+                        <m:r>
+                          <a:rPr lang="en-US" sz="3200" b="0" i="1" smtClean="0">
+                            <a:latin typeface="Cambria Math" panose="02040503050406030204" pitchFamily="18" charset="0"/>
+                          </a:rPr>
+                          <m:t>10</m:t>
+                        </m:r>
+                      </m:e>
+                      <m:sup>
+                        <m:r>
+                          <a:rPr lang="en-US" sz="3200" b="0" i="1" smtClean="0">
+                            <a:latin typeface="Cambria Math" panose="02040503050406030204" pitchFamily="18" charset="0"/>
+                          </a:rPr>
+                          <m:t>16</m:t>
+                        </m:r>
+                      </m:sup>
+                    </m:sSup>
+                  </m:oMath>
+                </a14:m>
+                <a:r>
+                  <a:rPr lang="en-US" sz="3200" dirty="0" smtClean="0"/>
+                  <a:t> </a:t>
+                </a:r>
+                <a:r>
+                  <a:rPr lang="en-US" sz="3400" dirty="0" smtClean="0"/>
+                  <a:t>elements.</a:t>
+                </a:r>
+                <a:endParaRPr lang="en-US" sz="3200" dirty="0" smtClean="0"/>
+              </a:p>
+              <a:p>
+                <a:pPr marL="0" indent="0" algn="just">
+                  <a:spcAft>
+                    <a:spcPts val="1200"/>
+                  </a:spcAft>
+                  <a:buNone/>
+                </a:pPr>
+                <a:endParaRPr lang="en-US" sz="3200" dirty="0"/>
+              </a:p>
+            </p:txBody>
+          </p:sp>
+        </mc:Choice>
+        <mc:Fallback xmlns="">
+          <p:sp>
+            <p:nvSpPr>
+              <p:cNvPr id="3" name="Content Placeholder 2"/>
+              <p:cNvSpPr>
+                <a:spLocks noGrp="1" noRot="1" noChangeAspect="1" noMove="1" noResize="1" noEditPoints="1" noAdjustHandles="1" noChangeArrowheads="1" noChangeShapeType="1" noTextEdit="1"/>
+              </p:cNvSpPr>
+              <p:nvPr>
+                <p:ph idx="1"/>
+              </p:nvPr>
+            </p:nvSpPr>
+            <p:spPr>
+              <a:blipFill>
+                <a:blip r:embed="rId2"/>
+                <a:stretch>
+                  <a:fillRect l="-1449" t="-3081"/>
+                </a:stretch>
+              </a:blipFill>
+            </p:spPr>
+            <p:txBody>
+              <a:bodyPr/>
+              <a:lstStyle/>
+              <a:p>
+                <a:r>
+                  <a:rPr lang="en-US">
+                    <a:noFill/>
+                  </a:rPr>
+                  <a:t> </a:t>
+                </a:r>
+              </a:p>
+            </p:txBody>
+          </p:sp>
+        </mc:Fallback>
+      </mc:AlternateContent>
+    </p:spTree>
+    <p:extLst>
+      <p:ext uri="{BB962C8B-B14F-4D97-AF65-F5344CB8AC3E}">
+        <p14:creationId xmlns:p14="http://schemas.microsoft.com/office/powerpoint/2010/main" val="3891607552"/>
+      </p:ext>
+    </p:extLst>
+  </p:cSld>
+  <p:clrMapOvr>
+    <a:masterClrMapping/>
+  </p:clrMapOvr>
+</p:sld>
+</file>
+
+<file path=ppt/slides/slide5.xml><?xml version="1.0" encoding="utf-8"?>
+<p:sld xmlns:a="http://schemas.openxmlformats.org/drawingml/2006/main" xmlns:r="http://schemas.openxmlformats.org/officeDocument/2006/relationships" xmlns:p="http://schemas.openxmlformats.org/presentationml/2006/main">
+  <p:cSld>
+    <p:spTree>
+      <p:nvGrpSpPr>
+        <p:cNvPr id="1" name=""/>
+        <p:cNvGrpSpPr/>
+        <p:nvPr/>
+      </p:nvGrpSpPr>
+      <p:grpSpPr>
+        <a:xfrm>
+          <a:off x="0" y="0"/>
+          <a:ext cx="0" cy="0"/>
+          <a:chOff x="0" y="0"/>
+          <a:chExt cx="0" cy="0"/>
+        </a:xfrm>
+      </p:grpSpPr>
+      <p:sp>
+        <p:nvSpPr>
+          <p:cNvPr id="2" name="Title 1"/>
+          <p:cNvSpPr>
+            <a:spLocks noGrp="1"/>
+          </p:cNvSpPr>
+          <p:nvPr>
+            <p:ph type="title"/>
+          </p:nvPr>
+        </p:nvSpPr>
+        <p:spPr>
+          <a:gradFill>
+            <a:gsLst>
+              <a:gs pos="0">
+                <a:schemeClr val="accent1">
+                  <a:lumMod val="5000"/>
+                  <a:lumOff val="95000"/>
+                </a:schemeClr>
+              </a:gs>
+              <a:gs pos="74000">
+                <a:schemeClr val="accent1">
+                  <a:lumMod val="45000"/>
+                  <a:lumOff val="55000"/>
+                </a:schemeClr>
+              </a:gs>
+              <a:gs pos="83000">
+                <a:schemeClr val="accent1">
+                  <a:lumMod val="45000"/>
+                  <a:lumOff val="55000"/>
+                </a:schemeClr>
+              </a:gs>
+              <a:gs pos="100000">
+                <a:schemeClr val="accent1">
+                  <a:lumMod val="30000"/>
+                  <a:lumOff val="70000"/>
+                </a:schemeClr>
+              </a:gs>
+            </a:gsLst>
+            <a:lin ang="5400000" scaled="1"/>
+          </a:gradFill>
+        </p:spPr>
+        <p:txBody>
+          <a:bodyPr>
+            <a:normAutofit/>
+          </a:bodyPr>
+          <a:lstStyle/>
+          <a:p>
+            <a:pPr algn="ctr"/>
+            <a:r>
+              <a:rPr lang="en-US" dirty="0" smtClean="0"/>
+              <a:t>Let’s State A Problem</a:t>
+            </a:r>
+            <a:endParaRPr lang="en-US" dirty="0"/>
+          </a:p>
+        </p:txBody>
+      </p:sp>
+      <mc:AlternateContent xmlns:mc="http://schemas.openxmlformats.org/markup-compatibility/2006">
+        <mc:Choice xmlns:a14="http://schemas.microsoft.com/office/drawing/2010/main" Requires="a14">
+          <p:sp>
+            <p:nvSpPr>
+              <p:cNvPr id="3" name="Content Placeholder 2"/>
+              <p:cNvSpPr>
+                <a:spLocks noGrp="1"/>
+              </p:cNvSpPr>
+              <p:nvPr>
+                <p:ph idx="1"/>
+              </p:nvPr>
+            </p:nvSpPr>
+            <p:spPr/>
+            <p:txBody>
+              <a:bodyPr>
+                <a:normAutofit/>
+              </a:bodyPr>
+              <a:lstStyle/>
+              <a:p>
+                <a:pPr algn="just">
+                  <a:spcAft>
+                    <a:spcPts val="1200"/>
+                  </a:spcAft>
+                </a:pPr>
+                <a:r>
+                  <a:rPr lang="en-US" sz="3400" dirty="0" smtClean="0"/>
+                  <a:t>Assuming that each element in the matrix takes 1 bit of space, we would need </a:t>
+                </a:r>
+                <a14:m>
+                  <m:oMath xmlns:m="http://schemas.openxmlformats.org/officeDocument/2006/math">
+                    <m:f>
+                      <m:fPr>
+                        <m:ctrlPr>
+                          <a:rPr lang="en-US" sz="3200" i="1" smtClean="0">
+                            <a:latin typeface="Cambria Math" panose="02040503050406030204" pitchFamily="18" charset="0"/>
+                          </a:rPr>
+                        </m:ctrlPr>
+                      </m:fPr>
+                      <m:num>
+                        <m:sSup>
+                          <m:sSupPr>
+                            <m:ctrlPr>
+                              <a:rPr lang="en-US" sz="3200" i="1" smtClean="0">
+                                <a:latin typeface="Cambria Math" panose="02040503050406030204" pitchFamily="18" charset="0"/>
+                              </a:rPr>
+                            </m:ctrlPr>
+                          </m:sSupPr>
+                          <m:e>
+                            <m:r>
+                              <a:rPr lang="en-US" sz="3200" b="0" i="1" smtClean="0">
+                                <a:latin typeface="Cambria Math" panose="02040503050406030204" pitchFamily="18" charset="0"/>
+                              </a:rPr>
+                              <m:t>10</m:t>
+                            </m:r>
+                          </m:e>
+                          <m:sup>
+                            <m:r>
+                              <a:rPr lang="en-US" sz="3200" b="0" i="1" smtClean="0">
+                                <a:latin typeface="Cambria Math" panose="02040503050406030204" pitchFamily="18" charset="0"/>
+                              </a:rPr>
+                              <m:t>16</m:t>
+                            </m:r>
+                          </m:sup>
+                        </m:sSup>
+                      </m:num>
+                      <m:den>
+                        <m:r>
+                          <a:rPr lang="en-US" sz="3200" b="0" i="1" smtClean="0">
+                            <a:latin typeface="Cambria Math" panose="02040503050406030204" pitchFamily="18" charset="0"/>
+                          </a:rPr>
+                          <m:t>8</m:t>
+                        </m:r>
+                      </m:den>
+                    </m:f>
+                    <m:r>
+                      <a:rPr lang="en-US" sz="3200" b="0" i="1" smtClean="0">
+                        <a:latin typeface="Cambria Math" panose="02040503050406030204" pitchFamily="18" charset="0"/>
+                      </a:rPr>
+                      <m:t>=1250∗</m:t>
+                    </m:r>
+                    <m:sSup>
+                      <m:sSupPr>
+                        <m:ctrlPr>
+                          <a:rPr lang="en-US" sz="3200" b="0" i="1" smtClean="0">
+                            <a:latin typeface="Cambria Math" panose="02040503050406030204" pitchFamily="18" charset="0"/>
+                          </a:rPr>
+                        </m:ctrlPr>
+                      </m:sSupPr>
+                      <m:e>
+                        <m:r>
+                          <a:rPr lang="en-US" sz="3200" b="0" i="1" smtClean="0">
+                            <a:latin typeface="Cambria Math" panose="02040503050406030204" pitchFamily="18" charset="0"/>
+                          </a:rPr>
+                          <m:t>10</m:t>
+                        </m:r>
+                      </m:e>
+                      <m:sup>
+                        <m:r>
+                          <a:rPr lang="en-US" sz="3200" b="0" i="1" smtClean="0">
+                            <a:latin typeface="Cambria Math" panose="02040503050406030204" pitchFamily="18" charset="0"/>
+                          </a:rPr>
+                          <m:t>12</m:t>
+                        </m:r>
+                      </m:sup>
+                    </m:sSup>
+                  </m:oMath>
+                </a14:m>
+                <a:r>
+                  <a:rPr lang="en-US" sz="3200" dirty="0" smtClean="0"/>
+                  <a:t> </a:t>
+                </a:r>
+                <a:r>
+                  <a:rPr lang="en-US" sz="3400" dirty="0" smtClean="0"/>
+                  <a:t>bytes of space to store the adjacency matrix.</a:t>
+                </a:r>
+              </a:p>
+              <a:p>
+                <a:pPr algn="just">
+                  <a:spcAft>
+                    <a:spcPts val="1200"/>
+                  </a:spcAft>
+                </a:pPr>
+                <a:endParaRPr lang="en-US" sz="3200" dirty="0"/>
+              </a:p>
+              <a:p>
+                <a:pPr algn="just">
+                  <a:spcAft>
+                    <a:spcPts val="1200"/>
+                  </a:spcAft>
+                </a:pPr>
+                <a:r>
+                  <a:rPr lang="en-US" sz="3400" dirty="0" smtClean="0"/>
+                  <a:t>In other words, the adjacency matrix would take 1250 terabytes.</a:t>
+                </a:r>
+                <a:endParaRPr lang="en-US" sz="3400" dirty="0" smtClean="0"/>
+              </a:p>
+              <a:p>
+                <a:pPr marL="0" indent="0" algn="just">
+                  <a:spcAft>
+                    <a:spcPts val="1200"/>
+                  </a:spcAft>
+                  <a:buNone/>
+                </a:pPr>
+                <a:endParaRPr lang="en-US" sz="3200" dirty="0"/>
+              </a:p>
+            </p:txBody>
+          </p:sp>
+        </mc:Choice>
+        <mc:Fallback>
+          <p:sp>
+            <p:nvSpPr>
+              <p:cNvPr id="3" name="Content Placeholder 2"/>
+              <p:cNvSpPr>
+                <a:spLocks noGrp="1" noRot="1" noChangeAspect="1" noMove="1" noResize="1" noEditPoints="1" noAdjustHandles="1" noChangeArrowheads="1" noChangeShapeType="1" noTextEdit="1"/>
+              </p:cNvSpPr>
+              <p:nvPr>
+                <p:ph idx="1"/>
+              </p:nvPr>
+            </p:nvSpPr>
+            <p:spPr>
+              <a:blipFill>
+                <a:blip r:embed="rId2"/>
+                <a:stretch>
+                  <a:fillRect l="-1449" t="-3081" r="-1565"/>
+                </a:stretch>
+              </a:blipFill>
+            </p:spPr>
+            <p:txBody>
+              <a:bodyPr/>
+              <a:lstStyle/>
+              <a:p>
+                <a:r>
+                  <a:rPr lang="en-US">
+                    <a:noFill/>
+                  </a:rPr>
+                  <a:t> </a:t>
+                </a:r>
+              </a:p>
+            </p:txBody>
+          </p:sp>
+        </mc:Fallback>
+      </mc:AlternateContent>
+    </p:spTree>
+    <p:extLst>
+      <p:ext uri="{BB962C8B-B14F-4D97-AF65-F5344CB8AC3E}">
+        <p14:creationId xmlns:p14="http://schemas.microsoft.com/office/powerpoint/2010/main" val="280342843"/>
+      </p:ext>
+    </p:extLst>
+  </p:cSld>
+  <p:clrMapOvr>
+    <a:masterClrMapping/>
+  </p:clrMapOvr>
+</p:sld>
+</file>
+
+<file path=ppt/slides/slide6.xml><?xml version="1.0" encoding="utf-8"?>
+<p:sld xmlns:a="http://schemas.openxmlformats.org/drawingml/2006/main" xmlns:r="http://schemas.openxmlformats.org/officeDocument/2006/relationships" xmlns:p="http://schemas.openxmlformats.org/presentationml/2006/main">
+  <p:cSld>
+    <p:spTree>
+      <p:nvGrpSpPr>
+        <p:cNvPr id="1" name=""/>
+        <p:cNvGrpSpPr/>
+        <p:nvPr/>
+      </p:nvGrpSpPr>
+      <p:grpSpPr>
+        <a:xfrm>
+          <a:off x="0" y="0"/>
+          <a:ext cx="0" cy="0"/>
+          <a:chOff x="0" y="0"/>
+          <a:chExt cx="0" cy="0"/>
+        </a:xfrm>
+      </p:grpSpPr>
+      <p:sp>
+        <p:nvSpPr>
+          <p:cNvPr id="2" name="Title 1"/>
+          <p:cNvSpPr>
+            <a:spLocks noGrp="1"/>
+          </p:cNvSpPr>
+          <p:nvPr>
+            <p:ph type="title"/>
+          </p:nvPr>
+        </p:nvSpPr>
+        <p:spPr>
+          <a:gradFill>
+            <a:gsLst>
+              <a:gs pos="0">
+                <a:schemeClr val="accent1">
+                  <a:lumMod val="5000"/>
+                  <a:lumOff val="95000"/>
+                </a:schemeClr>
+              </a:gs>
+              <a:gs pos="74000">
+                <a:schemeClr val="accent1">
+                  <a:lumMod val="45000"/>
+                  <a:lumOff val="55000"/>
+                </a:schemeClr>
+              </a:gs>
+              <a:gs pos="83000">
+                <a:schemeClr val="accent1">
+                  <a:lumMod val="45000"/>
+                  <a:lumOff val="55000"/>
+                </a:schemeClr>
+              </a:gs>
+              <a:gs pos="100000">
+                <a:schemeClr val="accent1">
+                  <a:lumMod val="30000"/>
+                  <a:lumOff val="70000"/>
+                </a:schemeClr>
+              </a:gs>
+            </a:gsLst>
+            <a:lin ang="5400000" scaled="1"/>
+          </a:gradFill>
+        </p:spPr>
+        <p:txBody>
+          <a:bodyPr>
+            <a:normAutofit/>
+          </a:bodyPr>
+          <a:lstStyle/>
+          <a:p>
+            <a:pPr algn="ctr"/>
+            <a:r>
+              <a:rPr lang="en-US" dirty="0" smtClean="0"/>
+              <a:t>Let’s State A Problem</a:t>
+            </a:r>
+            <a:endParaRPr lang="en-US" dirty="0"/>
+          </a:p>
+        </p:txBody>
+      </p:sp>
+      <p:sp>
+        <p:nvSpPr>
+          <p:cNvPr id="3" name="Content Placeholder 2"/>
+          <p:cNvSpPr>
+            <a:spLocks noGrp="1"/>
+          </p:cNvSpPr>
+          <p:nvPr>
+            <p:ph idx="1"/>
+          </p:nvPr>
+        </p:nvSpPr>
+        <p:spPr/>
+        <p:txBody>
+          <a:bodyPr>
+            <a:normAutofit/>
+          </a:bodyPr>
+          <a:lstStyle/>
+          <a:p>
+            <a:pPr algn="just">
+              <a:spcAft>
+                <a:spcPts val="1200"/>
+              </a:spcAft>
+            </a:pPr>
+            <a:r>
+              <a:rPr lang="en-US" sz="3400" dirty="0"/>
+              <a:t>In reality, each user of a certain social network follows only </a:t>
+            </a:r>
+            <a:r>
+              <a:rPr lang="en-US" sz="3400" dirty="0" smtClean="0"/>
+              <a:t>a tiny </a:t>
+            </a:r>
+            <a:r>
+              <a:rPr lang="en-US" sz="3400" dirty="0"/>
+              <a:t>fraction of the total users</a:t>
+            </a:r>
+            <a:r>
+              <a:rPr lang="en-US" sz="3400" dirty="0" smtClean="0"/>
+              <a:t>.</a:t>
+            </a:r>
+          </a:p>
+          <a:p>
+            <a:pPr algn="just">
+              <a:spcAft>
+                <a:spcPts val="1200"/>
+              </a:spcAft>
+            </a:pPr>
+            <a:endParaRPr lang="en-US" sz="3400" dirty="0"/>
+          </a:p>
+          <a:p>
+            <a:pPr algn="just">
+              <a:spcAft>
+                <a:spcPts val="1200"/>
+              </a:spcAft>
+            </a:pPr>
+            <a:r>
+              <a:rPr lang="en-US" sz="3400" dirty="0" smtClean="0"/>
+              <a:t>This means that most of the elements in the adjacency matrix are zero. In other words, the adjacency matrix is sparse.</a:t>
+            </a:r>
+          </a:p>
+          <a:p>
+            <a:pPr marL="0" indent="0" algn="just">
+              <a:spcAft>
+                <a:spcPts val="1200"/>
+              </a:spcAft>
+              <a:buNone/>
+            </a:pPr>
+            <a:r>
+              <a:rPr lang="en-US" sz="3400" dirty="0" smtClean="0"/>
+              <a:t> </a:t>
+            </a:r>
+            <a:endParaRPr lang="en-US" sz="3200" dirty="0" smtClean="0"/>
+          </a:p>
+          <a:p>
+            <a:pPr marL="0" indent="0" algn="just">
+              <a:spcAft>
+                <a:spcPts val="1200"/>
+              </a:spcAft>
+              <a:buNone/>
+            </a:pPr>
+            <a:endParaRPr lang="en-US" sz="3200" dirty="0"/>
+          </a:p>
+        </p:txBody>
+      </p:sp>
+    </p:spTree>
+    <p:extLst>
+      <p:ext uri="{BB962C8B-B14F-4D97-AF65-F5344CB8AC3E}">
+        <p14:creationId xmlns:p14="http://schemas.microsoft.com/office/powerpoint/2010/main" val="235728868"/>
+      </p:ext>
+    </p:extLst>
+  </p:cSld>
+  <p:clrMapOvr>
+    <a:masterClrMapping/>
+  </p:clrMapOvr>
+</p:sld>
+</file>
+
+<file path=ppt/slides/slide7.xml><?xml version="1.0" encoding="utf-8"?>
+<p:sld xmlns:a="http://schemas.openxmlformats.org/drawingml/2006/main" xmlns:r="http://schemas.openxmlformats.org/officeDocument/2006/relationships" xmlns:p="http://schemas.openxmlformats.org/presentationml/2006/main" show="0">
+  <p:cSld>
+    <p:spTree>
+      <p:nvGrpSpPr>
+        <p:cNvPr id="1" name=""/>
+        <p:cNvGrpSpPr/>
+        <p:nvPr/>
+      </p:nvGrpSpPr>
+      <p:grpSpPr>
+        <a:xfrm>
+          <a:off x="0" y="0"/>
+          <a:ext cx="0" cy="0"/>
+          <a:chOff x="0" y="0"/>
+          <a:chExt cx="0" cy="0"/>
+        </a:xfrm>
+      </p:grpSpPr>
+      <p:sp>
+        <p:nvSpPr>
+          <p:cNvPr id="2" name="Title 1"/>
+          <p:cNvSpPr>
+            <a:spLocks noGrp="1"/>
+          </p:cNvSpPr>
+          <p:nvPr>
+            <p:ph type="title"/>
+          </p:nvPr>
+        </p:nvSpPr>
+        <p:spPr>
+          <a:gradFill>
+            <a:gsLst>
+              <a:gs pos="0">
+                <a:schemeClr val="accent1">
+                  <a:lumMod val="5000"/>
+                  <a:lumOff val="95000"/>
+                </a:schemeClr>
+              </a:gs>
+              <a:gs pos="74000">
+                <a:schemeClr val="accent1">
+                  <a:lumMod val="45000"/>
+                  <a:lumOff val="55000"/>
+                </a:schemeClr>
+              </a:gs>
+              <a:gs pos="83000">
+                <a:schemeClr val="accent1">
+                  <a:lumMod val="45000"/>
+                  <a:lumOff val="55000"/>
+                </a:schemeClr>
+              </a:gs>
+              <a:gs pos="100000">
+                <a:schemeClr val="accent1">
+                  <a:lumMod val="30000"/>
+                  <a:lumOff val="70000"/>
+                </a:schemeClr>
+              </a:gs>
+            </a:gsLst>
+            <a:lin ang="5400000" scaled="1"/>
+          </a:gradFill>
+        </p:spPr>
+        <p:txBody>
+          <a:bodyPr>
+            <a:normAutofit/>
+          </a:bodyPr>
+          <a:lstStyle/>
+          <a:p>
+            <a:pPr algn="ctr"/>
+            <a:r>
+              <a:rPr lang="en-US" dirty="0" smtClean="0"/>
+              <a:t>What Are Sparse Matrices?</a:t>
+            </a:r>
+            <a:endParaRPr lang="en-US" dirty="0"/>
+          </a:p>
+        </p:txBody>
+      </p:sp>
+      <p:sp>
+        <p:nvSpPr>
+          <p:cNvPr id="3" name="Content Placeholder 2"/>
+          <p:cNvSpPr>
+            <a:spLocks noGrp="1"/>
+          </p:cNvSpPr>
+          <p:nvPr>
+            <p:ph idx="1"/>
+          </p:nvPr>
+        </p:nvSpPr>
+        <p:spPr/>
+        <p:txBody>
+          <a:bodyPr>
+            <a:normAutofit/>
+          </a:bodyPr>
+          <a:lstStyle/>
+          <a:p>
+            <a:pPr algn="just">
+              <a:spcAft>
+                <a:spcPts val="1200"/>
+              </a:spcAft>
+            </a:pPr>
+            <a:r>
+              <a:rPr lang="en-US" sz="3400" dirty="0"/>
+              <a:t>A</a:t>
+            </a:r>
+            <a:r>
+              <a:rPr lang="en-US" sz="3400" dirty="0" smtClean="0"/>
+              <a:t> sparse matrix is a matrix in which most of the elements are </a:t>
+            </a:r>
+            <a:r>
+              <a:rPr lang="en-US" sz="3400" dirty="0" smtClean="0"/>
+              <a:t>zero.</a:t>
+            </a:r>
+            <a:endParaRPr lang="en-US" sz="3400" dirty="0" smtClean="0"/>
+          </a:p>
+          <a:p>
+            <a:pPr algn="just">
+              <a:spcAft>
+                <a:spcPts val="1200"/>
+              </a:spcAft>
+            </a:pPr>
+            <a:endParaRPr lang="en-US" sz="3400" dirty="0"/>
+          </a:p>
+          <a:p>
+            <a:pPr algn="just">
+              <a:spcAft>
+                <a:spcPts val="1200"/>
+              </a:spcAft>
+            </a:pPr>
+            <a:r>
+              <a:rPr lang="en-US" sz="3400" dirty="0" smtClean="0"/>
+              <a:t>By contrast, if most of the elements in a matrix are nonzero, then the matrix is considered dense.</a:t>
+            </a:r>
+          </a:p>
+          <a:p>
+            <a:pPr algn="just">
+              <a:spcAft>
+                <a:spcPts val="1200"/>
+              </a:spcAft>
+            </a:pPr>
+            <a:endParaRPr lang="en-US" sz="3400" dirty="0" smtClean="0"/>
+          </a:p>
+          <a:p>
+            <a:pPr marL="0" indent="0" algn="just">
+              <a:spcAft>
+                <a:spcPts val="1200"/>
+              </a:spcAft>
+              <a:buNone/>
+            </a:pPr>
+            <a:endParaRPr lang="en-US" sz="3200" dirty="0"/>
+          </a:p>
+        </p:txBody>
+      </p:sp>
+    </p:spTree>
+    <p:extLst>
+      <p:ext uri="{BB962C8B-B14F-4D97-AF65-F5344CB8AC3E}">
+        <p14:creationId xmlns:p14="http://schemas.microsoft.com/office/powerpoint/2010/main" val="418931126"/>
+      </p:ext>
+    </p:extLst>
+  </p:cSld>
+  <p:clrMapOvr>
+    <a:masterClrMapping/>
+  </p:clrMapOvr>
+  <mc:AlternateContent xmlns:mc="http://schemas.openxmlformats.org/markup-compatibility/2006">
+    <mc:Choice xmlns:p14="http://schemas.microsoft.com/office/powerpoint/2010/main" Requires="p14">
+      <p:transition spd="slow" p14:dur="2000"/>
+    </mc:Choice>
+    <mc:Fallback>
+      <p:transition spd="slow"/>
+    </mc:Fallback>
+  </mc:AlternateContent>
+</p:sld>
+</file>
+
+<file path=ppt/slides/slide8.xml><?xml version="1.0" encoding="utf-8"?>
+<p:sld xmlns:a="http://schemas.openxmlformats.org/drawingml/2006/main" xmlns:r="http://schemas.openxmlformats.org/officeDocument/2006/relationships" xmlns:p="http://schemas.openxmlformats.org/presentationml/2006/main" show="0">
+  <p:cSld>
+    <p:spTree>
+      <p:nvGrpSpPr>
+        <p:cNvPr id="1" name=""/>
+        <p:cNvGrpSpPr/>
+        <p:nvPr/>
+      </p:nvGrpSpPr>
+      <p:grpSpPr>
+        <a:xfrm>
+          <a:off x="0" y="0"/>
+          <a:ext cx="0" cy="0"/>
+          <a:chOff x="0" y="0"/>
+          <a:chExt cx="0" cy="0"/>
+        </a:xfrm>
+      </p:grpSpPr>
+      <p:sp>
+        <p:nvSpPr>
+          <p:cNvPr id="2" name="Title 1"/>
+          <p:cNvSpPr>
+            <a:spLocks noGrp="1"/>
+          </p:cNvSpPr>
+          <p:nvPr>
+            <p:ph type="title"/>
+          </p:nvPr>
+        </p:nvSpPr>
+        <p:spPr>
+          <a:gradFill>
+            <a:gsLst>
+              <a:gs pos="0">
+                <a:schemeClr val="accent1">
+                  <a:lumMod val="5000"/>
+                  <a:lumOff val="95000"/>
+                </a:schemeClr>
+              </a:gs>
+              <a:gs pos="74000">
+                <a:schemeClr val="accent1">
+                  <a:lumMod val="45000"/>
+                  <a:lumOff val="55000"/>
+                </a:schemeClr>
+              </a:gs>
+              <a:gs pos="83000">
+                <a:schemeClr val="accent1">
+                  <a:lumMod val="45000"/>
+                  <a:lumOff val="55000"/>
+                </a:schemeClr>
+              </a:gs>
+              <a:gs pos="100000">
+                <a:schemeClr val="accent1">
+                  <a:lumMod val="30000"/>
+                  <a:lumOff val="70000"/>
+                </a:schemeClr>
+              </a:gs>
+            </a:gsLst>
+            <a:lin ang="5400000" scaled="1"/>
+          </a:gradFill>
+        </p:spPr>
+        <p:txBody>
+          <a:bodyPr>
+            <a:normAutofit/>
+          </a:bodyPr>
+          <a:lstStyle/>
+          <a:p>
+            <a:pPr algn="ctr"/>
+            <a:r>
+              <a:rPr lang="en-US" dirty="0" smtClean="0"/>
+              <a:t>What Are Sparse Matrices?</a:t>
+            </a:r>
+            <a:endParaRPr lang="en-US" dirty="0"/>
+          </a:p>
+        </p:txBody>
+      </p:sp>
+      <p:sp>
+        <p:nvSpPr>
+          <p:cNvPr id="3" name="Content Placeholder 2"/>
+          <p:cNvSpPr>
+            <a:spLocks noGrp="1"/>
+          </p:cNvSpPr>
+          <p:nvPr>
+            <p:ph idx="1"/>
+          </p:nvPr>
+        </p:nvSpPr>
+        <p:spPr/>
+        <p:txBody>
+          <a:bodyPr>
+            <a:normAutofit/>
+          </a:bodyPr>
+          <a:lstStyle/>
+          <a:p>
+            <a:pPr algn="just">
+              <a:spcAft>
+                <a:spcPts val="1200"/>
+              </a:spcAft>
+            </a:pPr>
+            <a:r>
+              <a:rPr lang="en-US" sz="3400" dirty="0" smtClean="0"/>
+              <a:t>There are no strict rules for the number of elements in a matrix that need to be zero in order to describe the matrix as sparse.</a:t>
+            </a:r>
+          </a:p>
+          <a:p>
+            <a:pPr marL="0" indent="0" algn="just">
+              <a:spcAft>
+                <a:spcPts val="1200"/>
+              </a:spcAft>
+              <a:buNone/>
+            </a:pPr>
+            <a:endParaRPr lang="en-US" sz="3200" dirty="0"/>
+          </a:p>
+          <a:p>
+            <a:pPr algn="just">
+              <a:spcAft>
+                <a:spcPts val="1200"/>
+              </a:spcAft>
+            </a:pPr>
+            <a:r>
+              <a:rPr lang="en-US" sz="3400" dirty="0" smtClean="0"/>
+              <a:t>The number of zero-valued </a:t>
+            </a:r>
+            <a:r>
+              <a:rPr lang="en-US" sz="3400" dirty="0" smtClean="0"/>
+              <a:t>entries </a:t>
+            </a:r>
+            <a:r>
+              <a:rPr lang="en-US" sz="3400" dirty="0" smtClean="0"/>
+              <a:t>in a matrix, divided by the total number of </a:t>
+            </a:r>
+            <a:r>
+              <a:rPr lang="en-US" sz="3400" dirty="0" smtClean="0"/>
+              <a:t>entries </a:t>
+            </a:r>
+            <a:r>
+              <a:rPr lang="en-US" sz="3400" dirty="0" smtClean="0"/>
+              <a:t>in that matrix, is referred to as the sparsity of that matrix.</a:t>
+            </a:r>
+            <a:endParaRPr lang="en-US" sz="3400" dirty="0"/>
+          </a:p>
+        </p:txBody>
+      </p:sp>
+    </p:spTree>
+    <p:extLst>
+      <p:ext uri="{BB962C8B-B14F-4D97-AF65-F5344CB8AC3E}">
+        <p14:creationId xmlns:p14="http://schemas.microsoft.com/office/powerpoint/2010/main" val="2879655215"/>
+      </p:ext>
+    </p:extLst>
+  </p:cSld>
+  <p:clrMapOvr>
+    <a:masterClrMapping/>
+  </p:clrMapOvr>
+  <mc:AlternateContent xmlns:mc="http://schemas.openxmlformats.org/markup-compatibility/2006">
+    <mc:Choice xmlns:p14="http://schemas.microsoft.com/office/powerpoint/2010/main" Requires="p14">
+      <p:transition spd="slow" p14:dur="2000"/>
+    </mc:Choice>
+    <mc:Fallback>
+      <p:transition spd="slow"/>
+    </mc:Fallback>
+  </mc:AlternateContent>
+</p:sld>
+</file>
+
+<file path=ppt/slides/slide9.xml><?xml version="1.0" encoding="utf-8"?>
+<p:sld xmlns:a="http://schemas.openxmlformats.org/drawingml/2006/main" xmlns:r="http://schemas.openxmlformats.org/officeDocument/2006/relationships" xmlns:p="http://schemas.openxmlformats.org/presentationml/2006/main" show="0">
+  <p:cSld>
+    <p:spTree>
+      <p:nvGrpSpPr>
+        <p:cNvPr id="1" name=""/>
+        <p:cNvGrpSpPr/>
+        <p:nvPr/>
+      </p:nvGrpSpPr>
+      <p:grpSpPr>
+        <a:xfrm>
+          <a:off x="0" y="0"/>
+          <a:ext cx="0" cy="0"/>
+          <a:chOff x="0" y="0"/>
+          <a:chExt cx="0" cy="0"/>
+        </a:xfrm>
+      </p:grpSpPr>
+      <p:sp>
+        <p:nvSpPr>
+          <p:cNvPr id="2" name="Title 1"/>
+          <p:cNvSpPr>
+            <a:spLocks noGrp="1"/>
+          </p:cNvSpPr>
+          <p:nvPr>
+            <p:ph type="title"/>
+          </p:nvPr>
+        </p:nvSpPr>
+        <p:spPr>
+          <a:gradFill>
+            <a:gsLst>
+              <a:gs pos="0">
+                <a:schemeClr val="accent1">
+                  <a:lumMod val="5000"/>
+                  <a:lumOff val="95000"/>
+                </a:schemeClr>
+              </a:gs>
+              <a:gs pos="74000">
+                <a:schemeClr val="accent1">
+                  <a:lumMod val="45000"/>
+                  <a:lumOff val="55000"/>
+                </a:schemeClr>
+              </a:gs>
+              <a:gs pos="83000">
+                <a:schemeClr val="accent1">
+                  <a:lumMod val="45000"/>
+                  <a:lumOff val="55000"/>
+                </a:schemeClr>
+              </a:gs>
+              <a:gs pos="100000">
+                <a:schemeClr val="accent1">
+                  <a:lumMod val="30000"/>
+                  <a:lumOff val="70000"/>
+                </a:schemeClr>
+              </a:gs>
+            </a:gsLst>
+            <a:lin ang="5400000" scaled="1"/>
+          </a:gradFill>
+        </p:spPr>
+        <p:txBody>
+          <a:bodyPr>
+            <a:normAutofit/>
+          </a:bodyPr>
+          <a:lstStyle/>
+          <a:p>
+            <a:pPr algn="ctr"/>
+            <a:r>
+              <a:rPr lang="en-US" dirty="0" smtClean="0"/>
+              <a:t>What Are Sparse Matrices?</a:t>
+            </a:r>
+            <a:endParaRPr lang="en-US" dirty="0"/>
+          </a:p>
+        </p:txBody>
+      </p:sp>
+      <p:sp>
+        <p:nvSpPr>
+          <p:cNvPr id="3" name="Content Placeholder 2"/>
+          <p:cNvSpPr>
+            <a:spLocks noGrp="1"/>
+          </p:cNvSpPr>
+          <p:nvPr>
+            <p:ph idx="1"/>
+          </p:nvPr>
+        </p:nvSpPr>
+        <p:spPr/>
+        <p:txBody>
+          <a:bodyPr>
+            <a:normAutofit/>
+          </a:bodyPr>
+          <a:lstStyle/>
+          <a:p>
+            <a:pPr marL="0" indent="0" algn="ctr">
+              <a:spcAft>
+                <a:spcPts val="1200"/>
+              </a:spcAft>
+              <a:buNone/>
+            </a:pPr>
+            <a:r>
+              <a:rPr lang="en-US" sz="5400" i="1" dirty="0" smtClean="0"/>
+              <a:t>“In </a:t>
+            </a:r>
+            <a:r>
+              <a:rPr lang="en-US" sz="5400" i="1" dirty="0"/>
+              <a:t>practice, most large matrices are sparse — almost all entries are zeros</a:t>
+            </a:r>
+            <a:r>
+              <a:rPr lang="en-US" sz="5400" i="1" dirty="0" smtClean="0"/>
+              <a:t>.”</a:t>
+            </a:r>
+          </a:p>
+          <a:p>
+            <a:pPr marL="0" indent="0" algn="ctr">
+              <a:spcAft>
+                <a:spcPts val="1200"/>
+              </a:spcAft>
+              <a:buNone/>
+            </a:pPr>
+            <a:r>
+              <a:rPr lang="en-US" sz="3200" i="1" dirty="0" smtClean="0"/>
+              <a:t>- Dr. Gilbert </a:t>
+            </a:r>
+            <a:r>
+              <a:rPr lang="en-US" sz="3200" i="1" dirty="0" err="1" smtClean="0"/>
+              <a:t>Strang</a:t>
+            </a:r>
+            <a:r>
+              <a:rPr lang="en-US" sz="3200" i="1" dirty="0" smtClean="0"/>
+              <a:t>, Introduction to Linear Algebra, 5</a:t>
+            </a:r>
+            <a:r>
+              <a:rPr lang="en-US" sz="3200" i="1" baseline="30000" dirty="0" smtClean="0"/>
+              <a:t>th</a:t>
+            </a:r>
+            <a:r>
+              <a:rPr lang="en-US" sz="3200" i="1" dirty="0" smtClean="0"/>
+              <a:t> ed., Page </a:t>
+            </a:r>
+            <a:r>
+              <a:rPr lang="en-US" sz="3200" i="1" dirty="0" smtClean="0"/>
+              <a:t>465.</a:t>
+            </a:r>
+            <a:endParaRPr lang="en-US" sz="3200" dirty="0"/>
+          </a:p>
+        </p:txBody>
+      </p:sp>
+    </p:spTree>
+    <p:extLst>
+      <p:ext uri="{BB962C8B-B14F-4D97-AF65-F5344CB8AC3E}">
+        <p14:creationId xmlns:p14="http://schemas.microsoft.com/office/powerpoint/2010/main" val="1293524280"/>
+      </p:ext>
+    </p:extLst>
+  </p:cSld>
+  <p:clrMapOvr>
+    <a:masterClrMapping/>
+  </p:clrMapOvr>
+  <mc:AlternateContent xmlns:mc="http://schemas.openxmlformats.org/markup-compatibility/2006">
+    <mc:Choice xmlns:p14="http://schemas.microsoft.com/office/powerpoint/2010/main" Requires="p14">
+      <p:transition spd="slow" p14:dur="2000"/>
+    </mc:Choice>
+    <mc:Fallback>
+      <p:transition spd="slow"/>
+    </mc:Fallback>
+  </mc:AlternateContent>
 </p:sld>
 </file>
 

</xml_diff>

<commit_message>
Finished list of lists.
</commit_message>
<xml_diff>
--- a/Data Mining Presentation.pptx
+++ b/Data Mining Presentation.pptx
@@ -15,6 +15,14 @@
     <p:sldId id="258" r:id="rId9"/>
     <p:sldId id="259" r:id="rId10"/>
     <p:sldId id="260" r:id="rId11"/>
+    <p:sldId id="267" r:id="rId12"/>
+    <p:sldId id="268" r:id="rId13"/>
+    <p:sldId id="269" r:id="rId14"/>
+    <p:sldId id="270" r:id="rId15"/>
+    <p:sldId id="271" r:id="rId16"/>
+    <p:sldId id="272" r:id="rId17"/>
+    <p:sldId id="273" r:id="rId18"/>
+    <p:sldId id="274" r:id="rId19"/>
   </p:sldIdLst>
   <p:sldSz cx="12192000" cy="6858000"/>
   <p:notesSz cx="6858000" cy="9144000"/>
@@ -252,7 +260,7 @@
           <a:p>
             <a:fld id="{A7240CF3-A3AC-47B2-BAF2-362E5A25AD91}" type="datetimeFigureOut">
               <a:rPr lang="en-US" smtClean="0"/>
-              <a:t>6/5/2021</a:t>
+              <a:t>6/7/2021</a:t>
             </a:fld>
             <a:endParaRPr lang="en-US"/>
           </a:p>
@@ -422,7 +430,7 @@
           <a:p>
             <a:fld id="{A7240CF3-A3AC-47B2-BAF2-362E5A25AD91}" type="datetimeFigureOut">
               <a:rPr lang="en-US" smtClean="0"/>
-              <a:t>6/5/2021</a:t>
+              <a:t>6/7/2021</a:t>
             </a:fld>
             <a:endParaRPr lang="en-US"/>
           </a:p>
@@ -602,7 +610,7 @@
           <a:p>
             <a:fld id="{A7240CF3-A3AC-47B2-BAF2-362E5A25AD91}" type="datetimeFigureOut">
               <a:rPr lang="en-US" smtClean="0"/>
-              <a:t>6/5/2021</a:t>
+              <a:t>6/7/2021</a:t>
             </a:fld>
             <a:endParaRPr lang="en-US"/>
           </a:p>
@@ -772,7 +780,7 @@
           <a:p>
             <a:fld id="{A7240CF3-A3AC-47B2-BAF2-362E5A25AD91}" type="datetimeFigureOut">
               <a:rPr lang="en-US" smtClean="0"/>
-              <a:t>6/5/2021</a:t>
+              <a:t>6/7/2021</a:t>
             </a:fld>
             <a:endParaRPr lang="en-US"/>
           </a:p>
@@ -1018,7 +1026,7 @@
           <a:p>
             <a:fld id="{A7240CF3-A3AC-47B2-BAF2-362E5A25AD91}" type="datetimeFigureOut">
               <a:rPr lang="en-US" smtClean="0"/>
-              <a:t>6/5/2021</a:t>
+              <a:t>6/7/2021</a:t>
             </a:fld>
             <a:endParaRPr lang="en-US"/>
           </a:p>
@@ -1250,7 +1258,7 @@
           <a:p>
             <a:fld id="{A7240CF3-A3AC-47B2-BAF2-362E5A25AD91}" type="datetimeFigureOut">
               <a:rPr lang="en-US" smtClean="0"/>
-              <a:t>6/5/2021</a:t>
+              <a:t>6/7/2021</a:t>
             </a:fld>
             <a:endParaRPr lang="en-US"/>
           </a:p>
@@ -1617,7 +1625,7 @@
           <a:p>
             <a:fld id="{A7240CF3-A3AC-47B2-BAF2-362E5A25AD91}" type="datetimeFigureOut">
               <a:rPr lang="en-US" smtClean="0"/>
-              <a:t>6/5/2021</a:t>
+              <a:t>6/7/2021</a:t>
             </a:fld>
             <a:endParaRPr lang="en-US"/>
           </a:p>
@@ -1735,7 +1743,7 @@
           <a:p>
             <a:fld id="{A7240CF3-A3AC-47B2-BAF2-362E5A25AD91}" type="datetimeFigureOut">
               <a:rPr lang="en-US" smtClean="0"/>
-              <a:t>6/5/2021</a:t>
+              <a:t>6/7/2021</a:t>
             </a:fld>
             <a:endParaRPr lang="en-US"/>
           </a:p>
@@ -1830,7 +1838,7 @@
           <a:p>
             <a:fld id="{A7240CF3-A3AC-47B2-BAF2-362E5A25AD91}" type="datetimeFigureOut">
               <a:rPr lang="en-US" smtClean="0"/>
-              <a:t>6/5/2021</a:t>
+              <a:t>6/7/2021</a:t>
             </a:fld>
             <a:endParaRPr lang="en-US"/>
           </a:p>
@@ -2107,7 +2115,7 @@
           <a:p>
             <a:fld id="{A7240CF3-A3AC-47B2-BAF2-362E5A25AD91}" type="datetimeFigureOut">
               <a:rPr lang="en-US" smtClean="0"/>
-              <a:t>6/5/2021</a:t>
+              <a:t>6/7/2021</a:t>
             </a:fld>
             <a:endParaRPr lang="en-US"/>
           </a:p>
@@ -2360,7 +2368,7 @@
           <a:p>
             <a:fld id="{A7240CF3-A3AC-47B2-BAF2-362E5A25AD91}" type="datetimeFigureOut">
               <a:rPr lang="en-US" smtClean="0"/>
-              <a:t>6/5/2021</a:t>
+              <a:t>6/7/2021</a:t>
             </a:fld>
             <a:endParaRPr lang="en-US"/>
           </a:p>
@@ -2573,7 +2581,7 @@
           <a:p>
             <a:fld id="{A7240CF3-A3AC-47B2-BAF2-362E5A25AD91}" type="datetimeFigureOut">
               <a:rPr lang="en-US" smtClean="0"/>
-              <a:t>6/5/2021</a:t>
+              <a:t>6/7/2021</a:t>
             </a:fld>
             <a:endParaRPr lang="en-US"/>
           </a:p>
@@ -2962,7 +2970,7 @@
 </file>
 
 <file path=ppt/slides/slide1.xml><?xml version="1.0" encoding="utf-8"?>
-<p:sld xmlns:a="http://schemas.openxmlformats.org/drawingml/2006/main" xmlns:r="http://schemas.openxmlformats.org/officeDocument/2006/relationships" xmlns:p="http://schemas.openxmlformats.org/presentationml/2006/main" show="0">
+<p:sld xmlns:a="http://schemas.openxmlformats.org/drawingml/2006/main" xmlns:r="http://schemas.openxmlformats.org/officeDocument/2006/relationships" xmlns:p="http://schemas.openxmlformats.org/presentationml/2006/main">
   <p:cSld>
     <p:spTree>
       <p:nvGrpSpPr>
@@ -3053,7 +3061,7 @@
 </file>
 
 <file path=ppt/slides/slide10.xml><?xml version="1.0" encoding="utf-8"?>
-<p:sld xmlns:a="http://schemas.openxmlformats.org/drawingml/2006/main" xmlns:r="http://schemas.openxmlformats.org/officeDocument/2006/relationships" xmlns:p="http://schemas.openxmlformats.org/presentationml/2006/main" show="0">
+<p:sld xmlns:a="http://schemas.openxmlformats.org/drawingml/2006/main" xmlns:r="http://schemas.openxmlformats.org/officeDocument/2006/relationships" xmlns:p="http://schemas.openxmlformats.org/presentationml/2006/main">
   <p:cSld>
     <p:spTree>
       <p:nvGrpSpPr>
@@ -3621,6 +3629,2827 @@
     <p:extLst>
       <p:ext uri="{BB962C8B-B14F-4D97-AF65-F5344CB8AC3E}">
         <p14:creationId xmlns:p14="http://schemas.microsoft.com/office/powerpoint/2010/main" val="2787915758"/>
+      </p:ext>
+    </p:extLst>
+  </p:cSld>
+  <p:clrMapOvr>
+    <a:masterClrMapping/>
+  </p:clrMapOvr>
+  <mc:AlternateContent xmlns:mc="http://schemas.openxmlformats.org/markup-compatibility/2006">
+    <mc:Choice xmlns:p14="http://schemas.microsoft.com/office/powerpoint/2010/main" Requires="p14">
+      <p:transition spd="slow" p14:dur="2000"/>
+    </mc:Choice>
+    <mc:Fallback>
+      <p:transition spd="slow"/>
+    </mc:Fallback>
+  </mc:AlternateContent>
+</p:sld>
+</file>
+
+<file path=ppt/slides/slide11.xml><?xml version="1.0" encoding="utf-8"?>
+<p:sld xmlns:a="http://schemas.openxmlformats.org/drawingml/2006/main" xmlns:r="http://schemas.openxmlformats.org/officeDocument/2006/relationships" xmlns:p="http://schemas.openxmlformats.org/presentationml/2006/main">
+  <p:cSld>
+    <p:spTree>
+      <p:nvGrpSpPr>
+        <p:cNvPr id="1" name=""/>
+        <p:cNvGrpSpPr/>
+        <p:nvPr/>
+      </p:nvGrpSpPr>
+      <p:grpSpPr>
+        <a:xfrm>
+          <a:off x="0" y="0"/>
+          <a:ext cx="0" cy="0"/>
+          <a:chOff x="0" y="0"/>
+          <a:chExt cx="0" cy="0"/>
+        </a:xfrm>
+      </p:grpSpPr>
+      <p:sp>
+        <p:nvSpPr>
+          <p:cNvPr id="2" name="Title 1"/>
+          <p:cNvSpPr>
+            <a:spLocks noGrp="1"/>
+          </p:cNvSpPr>
+          <p:nvPr>
+            <p:ph type="title"/>
+          </p:nvPr>
+        </p:nvSpPr>
+        <p:spPr>
+          <a:gradFill>
+            <a:gsLst>
+              <a:gs pos="0">
+                <a:schemeClr val="accent1">
+                  <a:lumMod val="5000"/>
+                  <a:lumOff val="95000"/>
+                </a:schemeClr>
+              </a:gs>
+              <a:gs pos="74000">
+                <a:schemeClr val="accent1">
+                  <a:lumMod val="45000"/>
+                  <a:lumOff val="55000"/>
+                </a:schemeClr>
+              </a:gs>
+              <a:gs pos="83000">
+                <a:schemeClr val="accent1">
+                  <a:lumMod val="45000"/>
+                  <a:lumOff val="55000"/>
+                </a:schemeClr>
+              </a:gs>
+              <a:gs pos="100000">
+                <a:schemeClr val="accent1">
+                  <a:lumMod val="30000"/>
+                  <a:lumOff val="70000"/>
+                </a:schemeClr>
+              </a:gs>
+            </a:gsLst>
+            <a:lin ang="5400000" scaled="1"/>
+          </a:gradFill>
+        </p:spPr>
+        <p:txBody>
+          <a:bodyPr>
+            <a:normAutofit/>
+          </a:bodyPr>
+          <a:lstStyle/>
+          <a:p>
+            <a:pPr algn="ctr"/>
+            <a:r>
+              <a:rPr lang="en-US" dirty="0" smtClean="0"/>
+              <a:t>Storing A Sparse Matrix</a:t>
+            </a:r>
+            <a:endParaRPr lang="en-US" dirty="0"/>
+          </a:p>
+        </p:txBody>
+      </p:sp>
+      <p:sp>
+        <p:nvSpPr>
+          <p:cNvPr id="3" name="Content Placeholder 2"/>
+          <p:cNvSpPr>
+            <a:spLocks noGrp="1"/>
+          </p:cNvSpPr>
+          <p:nvPr>
+            <p:ph idx="1"/>
+          </p:nvPr>
+        </p:nvSpPr>
+        <p:spPr/>
+        <p:txBody>
+          <a:bodyPr>
+            <a:normAutofit/>
+          </a:bodyPr>
+          <a:lstStyle/>
+          <a:p>
+            <a:pPr algn="just">
+              <a:spcAft>
+                <a:spcPts val="1200"/>
+              </a:spcAft>
+            </a:pPr>
+            <a:r>
+              <a:rPr lang="en-US" sz="3400" dirty="0"/>
+              <a:t>In the case of a sparse matrix, substantial memory requirement reductions can be realized by </a:t>
+            </a:r>
+            <a:r>
+              <a:rPr lang="en-US" sz="3400" dirty="0" smtClean="0"/>
+              <a:t>storing </a:t>
+            </a:r>
+            <a:r>
+              <a:rPr lang="en-US" sz="3400" dirty="0"/>
+              <a:t>the non-zero </a:t>
+            </a:r>
+            <a:r>
+              <a:rPr lang="en-US" sz="3400" dirty="0" smtClean="0"/>
+              <a:t>entries only.</a:t>
+            </a:r>
+            <a:endParaRPr lang="en-US" sz="3400" dirty="0"/>
+          </a:p>
+        </p:txBody>
+      </p:sp>
+    </p:spTree>
+    <p:extLst>
+      <p:ext uri="{BB962C8B-B14F-4D97-AF65-F5344CB8AC3E}">
+        <p14:creationId xmlns:p14="http://schemas.microsoft.com/office/powerpoint/2010/main" val="955426809"/>
+      </p:ext>
+    </p:extLst>
+  </p:cSld>
+  <p:clrMapOvr>
+    <a:masterClrMapping/>
+  </p:clrMapOvr>
+  <mc:AlternateContent xmlns:mc="http://schemas.openxmlformats.org/markup-compatibility/2006">
+    <mc:Choice xmlns:p14="http://schemas.microsoft.com/office/powerpoint/2010/main" Requires="p14">
+      <p:transition spd="slow" p14:dur="2000"/>
+    </mc:Choice>
+    <mc:Fallback>
+      <p:transition spd="slow"/>
+    </mc:Fallback>
+  </mc:AlternateContent>
+</p:sld>
+</file>
+
+<file path=ppt/slides/slide12.xml><?xml version="1.0" encoding="utf-8"?>
+<p:sld xmlns:a="http://schemas.openxmlformats.org/drawingml/2006/main" xmlns:r="http://schemas.openxmlformats.org/officeDocument/2006/relationships" xmlns:p="http://schemas.openxmlformats.org/presentationml/2006/main">
+  <p:cSld>
+    <p:spTree>
+      <p:nvGrpSpPr>
+        <p:cNvPr id="1" name=""/>
+        <p:cNvGrpSpPr/>
+        <p:nvPr/>
+      </p:nvGrpSpPr>
+      <p:grpSpPr>
+        <a:xfrm>
+          <a:off x="0" y="0"/>
+          <a:ext cx="0" cy="0"/>
+          <a:chOff x="0" y="0"/>
+          <a:chExt cx="0" cy="0"/>
+        </a:xfrm>
+      </p:grpSpPr>
+      <p:sp>
+        <p:nvSpPr>
+          <p:cNvPr id="2" name="Title 1"/>
+          <p:cNvSpPr>
+            <a:spLocks noGrp="1"/>
+          </p:cNvSpPr>
+          <p:nvPr>
+            <p:ph type="title"/>
+          </p:nvPr>
+        </p:nvSpPr>
+        <p:spPr>
+          <a:gradFill>
+            <a:gsLst>
+              <a:gs pos="0">
+                <a:schemeClr val="accent1">
+                  <a:lumMod val="5000"/>
+                  <a:lumOff val="95000"/>
+                </a:schemeClr>
+              </a:gs>
+              <a:gs pos="74000">
+                <a:schemeClr val="accent1">
+                  <a:lumMod val="45000"/>
+                  <a:lumOff val="55000"/>
+                </a:schemeClr>
+              </a:gs>
+              <a:gs pos="83000">
+                <a:schemeClr val="accent1">
+                  <a:lumMod val="45000"/>
+                  <a:lumOff val="55000"/>
+                </a:schemeClr>
+              </a:gs>
+              <a:gs pos="100000">
+                <a:schemeClr val="accent1">
+                  <a:lumMod val="30000"/>
+                  <a:lumOff val="70000"/>
+                </a:schemeClr>
+              </a:gs>
+            </a:gsLst>
+            <a:lin ang="5400000" scaled="1"/>
+          </a:gradFill>
+        </p:spPr>
+        <p:txBody>
+          <a:bodyPr>
+            <a:normAutofit/>
+          </a:bodyPr>
+          <a:lstStyle/>
+          <a:p>
+            <a:pPr algn="ctr"/>
+            <a:r>
+              <a:rPr lang="en-US" dirty="0" smtClean="0"/>
+              <a:t>Storing A Sparse Matrix</a:t>
+            </a:r>
+            <a:endParaRPr lang="en-US" dirty="0"/>
+          </a:p>
+        </p:txBody>
+      </p:sp>
+      <p:sp>
+        <p:nvSpPr>
+          <p:cNvPr id="3" name="Content Placeholder 2"/>
+          <p:cNvSpPr>
+            <a:spLocks noGrp="1"/>
+          </p:cNvSpPr>
+          <p:nvPr>
+            <p:ph idx="1"/>
+          </p:nvPr>
+        </p:nvSpPr>
+        <p:spPr/>
+        <p:txBody>
+          <a:bodyPr>
+            <a:normAutofit/>
+          </a:bodyPr>
+          <a:lstStyle/>
+          <a:p>
+            <a:pPr algn="just">
+              <a:spcAft>
+                <a:spcPts val="1200"/>
+              </a:spcAft>
+            </a:pPr>
+            <a:r>
+              <a:rPr lang="en-US" sz="3400" dirty="0" smtClean="0"/>
+              <a:t>Dictionary of Keys (DOK)</a:t>
+            </a:r>
+          </a:p>
+          <a:p>
+            <a:pPr algn="just">
+              <a:spcAft>
+                <a:spcPts val="1200"/>
+              </a:spcAft>
+            </a:pPr>
+            <a:r>
+              <a:rPr lang="en-US" sz="3400" dirty="0" smtClean="0"/>
+              <a:t>List of Lists (LIL)</a:t>
+            </a:r>
+          </a:p>
+          <a:p>
+            <a:pPr algn="just">
+              <a:spcAft>
+                <a:spcPts val="1200"/>
+              </a:spcAft>
+            </a:pPr>
+            <a:r>
+              <a:rPr lang="en-US" sz="3400" dirty="0" smtClean="0"/>
+              <a:t>Coordinate List (COO)</a:t>
+            </a:r>
+          </a:p>
+          <a:p>
+            <a:pPr algn="just">
+              <a:spcAft>
+                <a:spcPts val="1200"/>
+              </a:spcAft>
+            </a:pPr>
+            <a:r>
+              <a:rPr lang="en-US" sz="3400" dirty="0" smtClean="0"/>
+              <a:t>Compressed Sparse Row (CSR)</a:t>
+            </a:r>
+          </a:p>
+          <a:p>
+            <a:pPr algn="just">
+              <a:spcAft>
+                <a:spcPts val="1200"/>
+              </a:spcAft>
+            </a:pPr>
+            <a:r>
+              <a:rPr lang="en-US" sz="3400" dirty="0" smtClean="0"/>
+              <a:t>Compressed Sparse Column (CSC)</a:t>
+            </a:r>
+            <a:endParaRPr lang="en-US" sz="3400" dirty="0"/>
+          </a:p>
+        </p:txBody>
+      </p:sp>
+    </p:spTree>
+    <p:extLst>
+      <p:ext uri="{BB962C8B-B14F-4D97-AF65-F5344CB8AC3E}">
+        <p14:creationId xmlns:p14="http://schemas.microsoft.com/office/powerpoint/2010/main" val="1511079847"/>
+      </p:ext>
+    </p:extLst>
+  </p:cSld>
+  <p:clrMapOvr>
+    <a:masterClrMapping/>
+  </p:clrMapOvr>
+  <mc:AlternateContent xmlns:mc="http://schemas.openxmlformats.org/markup-compatibility/2006">
+    <mc:Choice xmlns:p14="http://schemas.microsoft.com/office/powerpoint/2010/main" Requires="p14">
+      <p:transition spd="slow" p14:dur="2000"/>
+    </mc:Choice>
+    <mc:Fallback>
+      <p:transition spd="slow"/>
+    </mc:Fallback>
+  </mc:AlternateContent>
+</p:sld>
+</file>
+
+<file path=ppt/slides/slide13.xml><?xml version="1.0" encoding="utf-8"?>
+<p:sld xmlns:a="http://schemas.openxmlformats.org/drawingml/2006/main" xmlns:r="http://schemas.openxmlformats.org/officeDocument/2006/relationships" xmlns:p="http://schemas.openxmlformats.org/presentationml/2006/main">
+  <p:cSld>
+    <p:spTree>
+      <p:nvGrpSpPr>
+        <p:cNvPr id="1" name=""/>
+        <p:cNvGrpSpPr/>
+        <p:nvPr/>
+      </p:nvGrpSpPr>
+      <p:grpSpPr>
+        <a:xfrm>
+          <a:off x="0" y="0"/>
+          <a:ext cx="0" cy="0"/>
+          <a:chOff x="0" y="0"/>
+          <a:chExt cx="0" cy="0"/>
+        </a:xfrm>
+      </p:grpSpPr>
+      <p:sp>
+        <p:nvSpPr>
+          <p:cNvPr id="2" name="Title 1"/>
+          <p:cNvSpPr>
+            <a:spLocks noGrp="1"/>
+          </p:cNvSpPr>
+          <p:nvPr>
+            <p:ph type="title"/>
+          </p:nvPr>
+        </p:nvSpPr>
+        <p:spPr>
+          <a:gradFill>
+            <a:gsLst>
+              <a:gs pos="0">
+                <a:schemeClr val="accent1">
+                  <a:lumMod val="5000"/>
+                  <a:lumOff val="95000"/>
+                </a:schemeClr>
+              </a:gs>
+              <a:gs pos="74000">
+                <a:schemeClr val="accent1">
+                  <a:lumMod val="45000"/>
+                  <a:lumOff val="55000"/>
+                </a:schemeClr>
+              </a:gs>
+              <a:gs pos="83000">
+                <a:schemeClr val="accent1">
+                  <a:lumMod val="45000"/>
+                  <a:lumOff val="55000"/>
+                </a:schemeClr>
+              </a:gs>
+              <a:gs pos="100000">
+                <a:schemeClr val="accent1">
+                  <a:lumMod val="30000"/>
+                  <a:lumOff val="70000"/>
+                </a:schemeClr>
+              </a:gs>
+            </a:gsLst>
+            <a:lin ang="5400000" scaled="1"/>
+          </a:gradFill>
+        </p:spPr>
+        <p:txBody>
+          <a:bodyPr>
+            <a:normAutofit/>
+          </a:bodyPr>
+          <a:lstStyle/>
+          <a:p>
+            <a:pPr algn="ctr"/>
+            <a:r>
+              <a:rPr lang="en-US" dirty="0" smtClean="0"/>
+              <a:t>Dictionary of Keys (DOK)</a:t>
+            </a:r>
+            <a:endParaRPr lang="en-US" dirty="0"/>
+          </a:p>
+        </p:txBody>
+      </p:sp>
+      <p:sp>
+        <p:nvSpPr>
+          <p:cNvPr id="3" name="Content Placeholder 2"/>
+          <p:cNvSpPr>
+            <a:spLocks noGrp="1"/>
+          </p:cNvSpPr>
+          <p:nvPr>
+            <p:ph idx="1"/>
+          </p:nvPr>
+        </p:nvSpPr>
+        <p:spPr/>
+        <p:txBody>
+          <a:bodyPr>
+            <a:normAutofit/>
+          </a:bodyPr>
+          <a:lstStyle/>
+          <a:p>
+            <a:pPr algn="just">
+              <a:spcAft>
+                <a:spcPts val="1200"/>
+              </a:spcAft>
+            </a:pPr>
+            <a:r>
+              <a:rPr lang="en-US" sz="3400" dirty="0"/>
+              <a:t>DOK consists of a dictionary that maps (</a:t>
+            </a:r>
+            <a:r>
+              <a:rPr lang="en-US" sz="3400" dirty="0" smtClean="0"/>
+              <a:t>row, column</a:t>
+            </a:r>
+            <a:r>
+              <a:rPr lang="en-US" sz="3400" dirty="0"/>
+              <a:t>)-pairs to the value of the elements</a:t>
+            </a:r>
+            <a:r>
+              <a:rPr lang="en-US" sz="3400" dirty="0" smtClean="0"/>
+              <a:t>.</a:t>
+            </a:r>
+          </a:p>
+          <a:p>
+            <a:pPr algn="just">
+              <a:spcAft>
+                <a:spcPts val="1200"/>
+              </a:spcAft>
+            </a:pPr>
+            <a:endParaRPr lang="en-US" sz="3400" dirty="0"/>
+          </a:p>
+          <a:p>
+            <a:pPr algn="just">
+              <a:spcAft>
+                <a:spcPts val="1200"/>
+              </a:spcAft>
+            </a:pPr>
+            <a:r>
+              <a:rPr lang="en-US" sz="3400" dirty="0"/>
+              <a:t>Elements that are missing from the dictionary are taken to be zero.</a:t>
+            </a:r>
+            <a:endParaRPr lang="en-US" sz="3400" dirty="0"/>
+          </a:p>
+        </p:txBody>
+      </p:sp>
+    </p:spTree>
+    <p:extLst>
+      <p:ext uri="{BB962C8B-B14F-4D97-AF65-F5344CB8AC3E}">
+        <p14:creationId xmlns:p14="http://schemas.microsoft.com/office/powerpoint/2010/main" val="3955590795"/>
+      </p:ext>
+    </p:extLst>
+  </p:cSld>
+  <p:clrMapOvr>
+    <a:masterClrMapping/>
+  </p:clrMapOvr>
+  <mc:AlternateContent xmlns:mc="http://schemas.openxmlformats.org/markup-compatibility/2006">
+    <mc:Choice xmlns:p14="http://schemas.microsoft.com/office/powerpoint/2010/main" Requires="p14">
+      <p:transition spd="slow" p14:dur="2000"/>
+    </mc:Choice>
+    <mc:Fallback>
+      <p:transition spd="slow"/>
+    </mc:Fallback>
+  </mc:AlternateContent>
+</p:sld>
+</file>
+
+<file path=ppt/slides/slide14.xml><?xml version="1.0" encoding="utf-8"?>
+<p:sld xmlns:a="http://schemas.openxmlformats.org/drawingml/2006/main" xmlns:r="http://schemas.openxmlformats.org/officeDocument/2006/relationships" xmlns:p="http://schemas.openxmlformats.org/presentationml/2006/main">
+  <p:cSld>
+    <p:spTree>
+      <p:nvGrpSpPr>
+        <p:cNvPr id="1" name=""/>
+        <p:cNvGrpSpPr/>
+        <p:nvPr/>
+      </p:nvGrpSpPr>
+      <p:grpSpPr>
+        <a:xfrm>
+          <a:off x="0" y="0"/>
+          <a:ext cx="0" cy="0"/>
+          <a:chOff x="0" y="0"/>
+          <a:chExt cx="0" cy="0"/>
+        </a:xfrm>
+      </p:grpSpPr>
+      <p:sp>
+        <p:nvSpPr>
+          <p:cNvPr id="2" name="Title 1"/>
+          <p:cNvSpPr>
+            <a:spLocks noGrp="1"/>
+          </p:cNvSpPr>
+          <p:nvPr>
+            <p:ph type="title"/>
+          </p:nvPr>
+        </p:nvSpPr>
+        <p:spPr>
+          <a:gradFill>
+            <a:gsLst>
+              <a:gs pos="0">
+                <a:schemeClr val="accent1">
+                  <a:lumMod val="5000"/>
+                  <a:lumOff val="95000"/>
+                </a:schemeClr>
+              </a:gs>
+              <a:gs pos="74000">
+                <a:schemeClr val="accent1">
+                  <a:lumMod val="45000"/>
+                  <a:lumOff val="55000"/>
+                </a:schemeClr>
+              </a:gs>
+              <a:gs pos="83000">
+                <a:schemeClr val="accent1">
+                  <a:lumMod val="45000"/>
+                  <a:lumOff val="55000"/>
+                </a:schemeClr>
+              </a:gs>
+              <a:gs pos="100000">
+                <a:schemeClr val="accent1">
+                  <a:lumMod val="30000"/>
+                  <a:lumOff val="70000"/>
+                </a:schemeClr>
+              </a:gs>
+            </a:gsLst>
+            <a:lin ang="5400000" scaled="1"/>
+          </a:gradFill>
+        </p:spPr>
+        <p:txBody>
+          <a:bodyPr>
+            <a:normAutofit/>
+          </a:bodyPr>
+          <a:lstStyle/>
+          <a:p>
+            <a:pPr algn="ctr"/>
+            <a:r>
+              <a:rPr lang="en-US" dirty="0" smtClean="0"/>
+              <a:t>Dictionary of Keys (DOK)</a:t>
+            </a:r>
+            <a:endParaRPr lang="en-US" dirty="0"/>
+          </a:p>
+        </p:txBody>
+      </p:sp>
+      <mc:AlternateContent xmlns:mc="http://schemas.openxmlformats.org/markup-compatibility/2006" xmlns:a14="http://schemas.microsoft.com/office/drawing/2010/main">
+        <mc:Choice Requires="a14">
+          <p:sp>
+            <p:nvSpPr>
+              <p:cNvPr id="6" name="TextBox 5"/>
+              <p:cNvSpPr txBox="1"/>
+              <p:nvPr/>
+            </p:nvSpPr>
+            <p:spPr>
+              <a:xfrm>
+                <a:off x="2320089" y="2456871"/>
+                <a:ext cx="6757491" cy="2041008"/>
+              </a:xfrm>
+              <a:prstGeom prst="rect">
+                <a:avLst/>
+              </a:prstGeom>
+              <a:noFill/>
+            </p:spPr>
+            <p:txBody>
+              <a:bodyPr wrap="none" lIns="0" tIns="0" rIns="0" bIns="0" rtlCol="0">
+                <a:spAutoFit/>
+              </a:bodyPr>
+              <a:lstStyle/>
+              <a:p>
+                <a:pPr/>
+                <a14:m>
+                  <m:oMathPara xmlns:m="http://schemas.openxmlformats.org/officeDocument/2006/math">
+                    <m:oMathParaPr>
+                      <m:jc m:val="centerGroup"/>
+                    </m:oMathParaPr>
+                    <m:oMath xmlns:m="http://schemas.openxmlformats.org/officeDocument/2006/math">
+                      <m:r>
+                        <a:rPr lang="en-US" sz="3600" b="0" i="1" smtClean="0">
+                          <a:latin typeface="Cambria Math" panose="02040503050406030204" pitchFamily="18" charset="0"/>
+                        </a:rPr>
+                        <m:t>𝐴</m:t>
+                      </m:r>
+                      <m:r>
+                        <a:rPr lang="en-US" sz="3600" b="0" i="1" smtClean="0">
+                          <a:latin typeface="Cambria Math" panose="02040503050406030204" pitchFamily="18" charset="0"/>
+                        </a:rPr>
+                        <m:t>=</m:t>
+                      </m:r>
+                      <m:d>
+                        <m:dPr>
+                          <m:begChr m:val="["/>
+                          <m:endChr m:val="]"/>
+                          <m:ctrlPr>
+                            <a:rPr lang="en-US" sz="3600" i="1">
+                              <a:latin typeface="Cambria Math" panose="02040503050406030204" pitchFamily="18" charset="0"/>
+                            </a:rPr>
+                          </m:ctrlPr>
+                        </m:dPr>
+                        <m:e>
+                          <m:m>
+                            <m:mPr>
+                              <m:mcs>
+                                <m:mc>
+                                  <m:mcPr>
+                                    <m:count m:val="6"/>
+                                    <m:mcJc m:val="center"/>
+                                  </m:mcPr>
+                                </m:mc>
+                              </m:mcs>
+                              <m:ctrlPr>
+                                <a:rPr lang="en-US" sz="3600" i="1">
+                                  <a:latin typeface="Cambria Math" panose="02040503050406030204" pitchFamily="18" charset="0"/>
+                                </a:rPr>
+                              </m:ctrlPr>
+                            </m:mPr>
+                            <m:mr>
+                              <m:e>
+                                <m:r>
+                                  <m:rPr>
+                                    <m:brk m:alnAt="7"/>
+                                  </m:rPr>
+                                  <a:rPr lang="en-US" sz="3600" b="0" i="1" smtClean="0">
+                                    <a:latin typeface="Cambria Math" panose="02040503050406030204" pitchFamily="18" charset="0"/>
+                                  </a:rPr>
+                                  <m:t>1</m:t>
+                                </m:r>
+                                <m:r>
+                                  <a:rPr lang="en-US" sz="3600" b="0" i="1" smtClean="0">
+                                    <a:latin typeface="Cambria Math" panose="02040503050406030204" pitchFamily="18" charset="0"/>
+                                  </a:rPr>
+                                  <m:t>0</m:t>
+                                </m:r>
+                              </m:e>
+                              <m:e>
+                                <m:r>
+                                  <a:rPr lang="en-US" sz="3600" b="0" i="1" smtClean="0">
+                                    <a:latin typeface="Cambria Math" panose="02040503050406030204" pitchFamily="18" charset="0"/>
+                                  </a:rPr>
+                                  <m:t>20</m:t>
+                                </m:r>
+                              </m:e>
+                              <m:e>
+                                <m:r>
+                                  <a:rPr lang="en-US" sz="3600" b="0" i="1" smtClean="0">
+                                    <a:latin typeface="Cambria Math" panose="02040503050406030204" pitchFamily="18" charset="0"/>
+                                  </a:rPr>
+                                  <m:t>0</m:t>
+                                </m:r>
+                              </m:e>
+                              <m:e>
+                                <m:r>
+                                  <a:rPr lang="en-US" sz="3600" b="0" i="1" smtClean="0">
+                                    <a:latin typeface="Cambria Math" panose="02040503050406030204" pitchFamily="18" charset="0"/>
+                                  </a:rPr>
+                                  <m:t>0</m:t>
+                                </m:r>
+                              </m:e>
+                              <m:e>
+                                <m:r>
+                                  <a:rPr lang="en-US" sz="3600" b="0" i="1" smtClean="0">
+                                    <a:latin typeface="Cambria Math" panose="02040503050406030204" pitchFamily="18" charset="0"/>
+                                  </a:rPr>
+                                  <m:t>0</m:t>
+                                </m:r>
+                              </m:e>
+                              <m:e>
+                                <m:r>
+                                  <a:rPr lang="en-US" sz="3600" b="0" i="1" smtClean="0">
+                                    <a:latin typeface="Cambria Math" panose="02040503050406030204" pitchFamily="18" charset="0"/>
+                                  </a:rPr>
+                                  <m:t>0</m:t>
+                                </m:r>
+                              </m:e>
+                            </m:mr>
+                            <m:mr>
+                              <m:e>
+                                <m:r>
+                                  <a:rPr lang="en-US" sz="3600" b="0" i="1" smtClean="0">
+                                    <a:latin typeface="Cambria Math" panose="02040503050406030204" pitchFamily="18" charset="0"/>
+                                  </a:rPr>
+                                  <m:t>0</m:t>
+                                </m:r>
+                              </m:e>
+                              <m:e>
+                                <m:r>
+                                  <a:rPr lang="en-US" sz="3600" b="0" i="1" smtClean="0">
+                                    <a:latin typeface="Cambria Math" panose="02040503050406030204" pitchFamily="18" charset="0"/>
+                                  </a:rPr>
+                                  <m:t>30</m:t>
+                                </m:r>
+                              </m:e>
+                              <m:e>
+                                <m:r>
+                                  <a:rPr lang="en-US" sz="3600" b="0" i="1" smtClean="0">
+                                    <a:latin typeface="Cambria Math" panose="02040503050406030204" pitchFamily="18" charset="0"/>
+                                  </a:rPr>
+                                  <m:t>0</m:t>
+                                </m:r>
+                              </m:e>
+                              <m:e>
+                                <m:r>
+                                  <a:rPr lang="en-US" sz="3600" b="0" i="1" smtClean="0">
+                                    <a:latin typeface="Cambria Math" panose="02040503050406030204" pitchFamily="18" charset="0"/>
+                                  </a:rPr>
+                                  <m:t>40</m:t>
+                                </m:r>
+                              </m:e>
+                              <m:e>
+                                <m:r>
+                                  <a:rPr lang="en-US" sz="3600" b="0" i="1" smtClean="0">
+                                    <a:latin typeface="Cambria Math" panose="02040503050406030204" pitchFamily="18" charset="0"/>
+                                  </a:rPr>
+                                  <m:t>0</m:t>
+                                </m:r>
+                              </m:e>
+                              <m:e>
+                                <m:r>
+                                  <a:rPr lang="en-US" sz="3600" b="0" i="1" smtClean="0">
+                                    <a:latin typeface="Cambria Math" panose="02040503050406030204" pitchFamily="18" charset="0"/>
+                                  </a:rPr>
+                                  <m:t>0</m:t>
+                                </m:r>
+                              </m:e>
+                            </m:mr>
+                            <m:mr>
+                              <m:e>
+                                <m:r>
+                                  <a:rPr lang="en-US" sz="3600" b="0" i="1" smtClean="0">
+                                    <a:latin typeface="Cambria Math" panose="02040503050406030204" pitchFamily="18" charset="0"/>
+                                  </a:rPr>
+                                  <m:t>0</m:t>
+                                </m:r>
+                              </m:e>
+                              <m:e>
+                                <m:r>
+                                  <a:rPr lang="en-US" sz="3600" b="0" i="1" smtClean="0">
+                                    <a:latin typeface="Cambria Math" panose="02040503050406030204" pitchFamily="18" charset="0"/>
+                                  </a:rPr>
+                                  <m:t>0</m:t>
+                                </m:r>
+                              </m:e>
+                              <m:e>
+                                <m:r>
+                                  <a:rPr lang="en-US" sz="3600" b="0" i="1" smtClean="0">
+                                    <a:latin typeface="Cambria Math" panose="02040503050406030204" pitchFamily="18" charset="0"/>
+                                  </a:rPr>
+                                  <m:t>50</m:t>
+                                </m:r>
+                              </m:e>
+                              <m:e>
+                                <m:r>
+                                  <a:rPr lang="en-US" sz="3600" b="0" i="1" smtClean="0">
+                                    <a:latin typeface="Cambria Math" panose="02040503050406030204" pitchFamily="18" charset="0"/>
+                                  </a:rPr>
+                                  <m:t>60</m:t>
+                                </m:r>
+                              </m:e>
+                              <m:e>
+                                <m:r>
+                                  <a:rPr lang="en-US" sz="3600" b="0" i="1" smtClean="0">
+                                    <a:latin typeface="Cambria Math" panose="02040503050406030204" pitchFamily="18" charset="0"/>
+                                  </a:rPr>
+                                  <m:t>70</m:t>
+                                </m:r>
+                              </m:e>
+                              <m:e>
+                                <m:r>
+                                  <a:rPr lang="en-US" sz="3600" b="0" i="1" smtClean="0">
+                                    <a:latin typeface="Cambria Math" panose="02040503050406030204" pitchFamily="18" charset="0"/>
+                                  </a:rPr>
+                                  <m:t>0</m:t>
+                                </m:r>
+                              </m:e>
+                            </m:mr>
+                            <m:mr>
+                              <m:e>
+                                <m:r>
+                                  <a:rPr lang="en-US" sz="3600" b="0" i="1" smtClean="0">
+                                    <a:latin typeface="Cambria Math" panose="02040503050406030204" pitchFamily="18" charset="0"/>
+                                  </a:rPr>
+                                  <m:t>0</m:t>
+                                </m:r>
+                              </m:e>
+                              <m:e>
+                                <m:r>
+                                  <a:rPr lang="en-US" sz="3600" b="0" i="1" smtClean="0">
+                                    <a:latin typeface="Cambria Math" panose="02040503050406030204" pitchFamily="18" charset="0"/>
+                                  </a:rPr>
+                                  <m:t>0</m:t>
+                                </m:r>
+                              </m:e>
+                              <m:e>
+                                <m:r>
+                                  <a:rPr lang="en-US" sz="3600" b="0" i="1" smtClean="0">
+                                    <a:latin typeface="Cambria Math" panose="02040503050406030204" pitchFamily="18" charset="0"/>
+                                  </a:rPr>
+                                  <m:t>0</m:t>
+                                </m:r>
+                              </m:e>
+                              <m:e>
+                                <m:r>
+                                  <a:rPr lang="en-US" sz="3600" b="0" i="1" smtClean="0">
+                                    <a:latin typeface="Cambria Math" panose="02040503050406030204" pitchFamily="18" charset="0"/>
+                                  </a:rPr>
+                                  <m:t>0</m:t>
+                                </m:r>
+                              </m:e>
+                              <m:e>
+                                <m:r>
+                                  <a:rPr lang="en-US" sz="3600" b="0" i="1" smtClean="0">
+                                    <a:latin typeface="Cambria Math" panose="02040503050406030204" pitchFamily="18" charset="0"/>
+                                  </a:rPr>
+                                  <m:t>0</m:t>
+                                </m:r>
+                              </m:e>
+                              <m:e>
+                                <m:r>
+                                  <a:rPr lang="en-US" sz="3600" b="0" i="1" smtClean="0">
+                                    <a:latin typeface="Cambria Math" panose="02040503050406030204" pitchFamily="18" charset="0"/>
+                                  </a:rPr>
+                                  <m:t>80</m:t>
+                                </m:r>
+                              </m:e>
+                            </m:mr>
+                          </m:m>
+                        </m:e>
+                      </m:d>
+                    </m:oMath>
+                  </m:oMathPara>
+                </a14:m>
+                <a:endParaRPr lang="en-US" sz="3600" dirty="0"/>
+              </a:p>
+            </p:txBody>
+          </p:sp>
+        </mc:Choice>
+        <mc:Fallback xmlns="">
+          <p:sp>
+            <p:nvSpPr>
+              <p:cNvPr id="6" name="TextBox 5"/>
+              <p:cNvSpPr txBox="1">
+                <a:spLocks noRot="1" noChangeAspect="1" noMove="1" noResize="1" noEditPoints="1" noAdjustHandles="1" noChangeArrowheads="1" noChangeShapeType="1" noTextEdit="1"/>
+              </p:cNvSpPr>
+              <p:nvPr/>
+            </p:nvSpPr>
+            <p:spPr>
+              <a:xfrm>
+                <a:off x="2320089" y="2456871"/>
+                <a:ext cx="6757491" cy="2041008"/>
+              </a:xfrm>
+              <a:prstGeom prst="rect">
+                <a:avLst/>
+              </a:prstGeom>
+              <a:blipFill>
+                <a:blip r:embed="rId2"/>
+                <a:stretch>
+                  <a:fillRect/>
+                </a:stretch>
+              </a:blipFill>
+            </p:spPr>
+            <p:txBody>
+              <a:bodyPr/>
+              <a:lstStyle/>
+              <a:p>
+                <a:r>
+                  <a:rPr lang="en-US">
+                    <a:noFill/>
+                  </a:rPr>
+                  <a:t> </a:t>
+                </a:r>
+              </a:p>
+            </p:txBody>
+          </p:sp>
+        </mc:Fallback>
+      </mc:AlternateContent>
+    </p:spTree>
+    <p:extLst>
+      <p:ext uri="{BB962C8B-B14F-4D97-AF65-F5344CB8AC3E}">
+        <p14:creationId xmlns:p14="http://schemas.microsoft.com/office/powerpoint/2010/main" val="3695001943"/>
+      </p:ext>
+    </p:extLst>
+  </p:cSld>
+  <p:clrMapOvr>
+    <a:masterClrMapping/>
+  </p:clrMapOvr>
+  <mc:AlternateContent xmlns:mc="http://schemas.openxmlformats.org/markup-compatibility/2006">
+    <mc:Choice xmlns:p14="http://schemas.microsoft.com/office/powerpoint/2010/main" Requires="p14">
+      <p:transition spd="slow" p14:dur="2000"/>
+    </mc:Choice>
+    <mc:Fallback>
+      <p:transition spd="slow"/>
+    </mc:Fallback>
+  </mc:AlternateContent>
+</p:sld>
+</file>
+
+<file path=ppt/slides/slide15.xml><?xml version="1.0" encoding="utf-8"?>
+<p:sld xmlns:a="http://schemas.openxmlformats.org/drawingml/2006/main" xmlns:r="http://schemas.openxmlformats.org/officeDocument/2006/relationships" xmlns:p="http://schemas.openxmlformats.org/presentationml/2006/main">
+  <p:cSld>
+    <p:spTree>
+      <p:nvGrpSpPr>
+        <p:cNvPr id="1" name=""/>
+        <p:cNvGrpSpPr/>
+        <p:nvPr/>
+      </p:nvGrpSpPr>
+      <p:grpSpPr>
+        <a:xfrm>
+          <a:off x="0" y="0"/>
+          <a:ext cx="0" cy="0"/>
+          <a:chOff x="0" y="0"/>
+          <a:chExt cx="0" cy="0"/>
+        </a:xfrm>
+      </p:grpSpPr>
+      <p:sp>
+        <p:nvSpPr>
+          <p:cNvPr id="2" name="Title 1"/>
+          <p:cNvSpPr>
+            <a:spLocks noGrp="1"/>
+          </p:cNvSpPr>
+          <p:nvPr>
+            <p:ph type="title"/>
+          </p:nvPr>
+        </p:nvSpPr>
+        <p:spPr>
+          <a:gradFill>
+            <a:gsLst>
+              <a:gs pos="0">
+                <a:schemeClr val="accent1">
+                  <a:lumMod val="5000"/>
+                  <a:lumOff val="95000"/>
+                </a:schemeClr>
+              </a:gs>
+              <a:gs pos="74000">
+                <a:schemeClr val="accent1">
+                  <a:lumMod val="45000"/>
+                  <a:lumOff val="55000"/>
+                </a:schemeClr>
+              </a:gs>
+              <a:gs pos="83000">
+                <a:schemeClr val="accent1">
+                  <a:lumMod val="45000"/>
+                  <a:lumOff val="55000"/>
+                </a:schemeClr>
+              </a:gs>
+              <a:gs pos="100000">
+                <a:schemeClr val="accent1">
+                  <a:lumMod val="30000"/>
+                  <a:lumOff val="70000"/>
+                </a:schemeClr>
+              </a:gs>
+            </a:gsLst>
+            <a:lin ang="5400000" scaled="1"/>
+          </a:gradFill>
+        </p:spPr>
+        <p:txBody>
+          <a:bodyPr>
+            <a:normAutofit/>
+          </a:bodyPr>
+          <a:lstStyle/>
+          <a:p>
+            <a:pPr algn="ctr"/>
+            <a:r>
+              <a:rPr lang="en-US" dirty="0" smtClean="0"/>
+              <a:t>Dictionary of Keys (DOK)</a:t>
+            </a:r>
+            <a:endParaRPr lang="en-US" dirty="0"/>
+          </a:p>
+        </p:txBody>
+      </p:sp>
+      <mc:AlternateContent xmlns:mc="http://schemas.openxmlformats.org/markup-compatibility/2006">
+        <mc:Choice xmlns:a14="http://schemas.microsoft.com/office/drawing/2010/main" Requires="a14">
+          <p:sp>
+            <p:nvSpPr>
+              <p:cNvPr id="3" name="TextBox 2"/>
+              <p:cNvSpPr txBox="1"/>
+              <p:nvPr/>
+            </p:nvSpPr>
+            <p:spPr>
+              <a:xfrm>
+                <a:off x="5016057" y="2922111"/>
+                <a:ext cx="2159886" cy="492443"/>
+              </a:xfrm>
+              <a:prstGeom prst="rect">
+                <a:avLst/>
+              </a:prstGeom>
+              <a:noFill/>
+            </p:spPr>
+            <p:txBody>
+              <a:bodyPr wrap="none" lIns="0" tIns="0" rIns="0" bIns="0" rtlCol="0">
+                <a:spAutoFit/>
+              </a:bodyPr>
+              <a:lstStyle/>
+              <a:p>
+                <a14:m>
+                  <m:oMathPara xmlns:m="http://schemas.openxmlformats.org/officeDocument/2006/math">
+                    <m:oMathParaPr>
+                      <m:jc m:val="centerGroup"/>
+                    </m:oMathParaPr>
+                    <m:oMath xmlns:m="http://schemas.openxmlformats.org/officeDocument/2006/math">
+                      <m:d>
+                        <m:dPr>
+                          <m:ctrlPr>
+                            <a:rPr lang="en-US" sz="3200" b="0" i="1" smtClean="0">
+                              <a:latin typeface="Cambria Math" panose="02040503050406030204" pitchFamily="18" charset="0"/>
+                            </a:rPr>
+                          </m:ctrlPr>
+                        </m:dPr>
+                        <m:e>
+                          <m:r>
+                            <a:rPr lang="en-US" sz="3200" b="0" i="1" smtClean="0">
+                              <a:latin typeface="Cambria Math" panose="02040503050406030204" pitchFamily="18" charset="0"/>
+                            </a:rPr>
+                            <m:t>1</m:t>
+                          </m:r>
+                          <m:r>
+                            <a:rPr lang="en-US" sz="3200" b="0" i="1" smtClean="0">
+                              <a:latin typeface="Cambria Math" panose="02040503050406030204" pitchFamily="18" charset="0"/>
+                            </a:rPr>
+                            <m:t>, 1</m:t>
+                          </m:r>
+                        </m:e>
+                      </m:d>
+                      <m:r>
+                        <a:rPr lang="en-US" sz="3200" b="0" i="0" smtClean="0">
+                          <a:latin typeface="Cambria Math" panose="02040503050406030204" pitchFamily="18" charset="0"/>
+                        </a:rPr>
+                        <m:t> →30</m:t>
+                      </m:r>
+                    </m:oMath>
+                  </m:oMathPara>
+                </a14:m>
+                <a:endParaRPr lang="en-US" sz="3200" b="0" dirty="0" smtClean="0"/>
+              </a:p>
+            </p:txBody>
+          </p:sp>
+        </mc:Choice>
+        <mc:Fallback>
+          <p:sp>
+            <p:nvSpPr>
+              <p:cNvPr id="3" name="TextBox 2"/>
+              <p:cNvSpPr txBox="1">
+                <a:spLocks noRot="1" noChangeAspect="1" noMove="1" noResize="1" noEditPoints="1" noAdjustHandles="1" noChangeArrowheads="1" noChangeShapeType="1" noTextEdit="1"/>
+              </p:cNvSpPr>
+              <p:nvPr/>
+            </p:nvSpPr>
+            <p:spPr>
+              <a:xfrm>
+                <a:off x="5016057" y="2922111"/>
+                <a:ext cx="2159886" cy="492443"/>
+              </a:xfrm>
+              <a:prstGeom prst="rect">
+                <a:avLst/>
+              </a:prstGeom>
+              <a:blipFill>
+                <a:blip r:embed="rId2"/>
+                <a:stretch>
+                  <a:fillRect/>
+                </a:stretch>
+              </a:blipFill>
+            </p:spPr>
+            <p:txBody>
+              <a:bodyPr/>
+              <a:lstStyle/>
+              <a:p>
+                <a:r>
+                  <a:rPr lang="en-US">
+                    <a:noFill/>
+                  </a:rPr>
+                  <a:t> </a:t>
+                </a:r>
+              </a:p>
+            </p:txBody>
+          </p:sp>
+        </mc:Fallback>
+      </mc:AlternateContent>
+      <mc:AlternateContent xmlns:mc="http://schemas.openxmlformats.org/markup-compatibility/2006">
+        <mc:Choice xmlns:a14="http://schemas.microsoft.com/office/drawing/2010/main" Requires="a14">
+          <p:sp>
+            <p:nvSpPr>
+              <p:cNvPr id="5" name="TextBox 4"/>
+              <p:cNvSpPr txBox="1"/>
+              <p:nvPr/>
+            </p:nvSpPr>
+            <p:spPr>
+              <a:xfrm>
+                <a:off x="5016057" y="2400855"/>
+                <a:ext cx="2159886" cy="492443"/>
+              </a:xfrm>
+              <a:prstGeom prst="rect">
+                <a:avLst/>
+              </a:prstGeom>
+              <a:noFill/>
+            </p:spPr>
+            <p:txBody>
+              <a:bodyPr wrap="none" lIns="0" tIns="0" rIns="0" bIns="0" rtlCol="0">
+                <a:spAutoFit/>
+              </a:bodyPr>
+              <a:lstStyle/>
+              <a:p>
+                <a14:m>
+                  <m:oMathPara xmlns:m="http://schemas.openxmlformats.org/officeDocument/2006/math">
+                    <m:oMathParaPr>
+                      <m:jc m:val="centerGroup"/>
+                    </m:oMathParaPr>
+                    <m:oMath xmlns:m="http://schemas.openxmlformats.org/officeDocument/2006/math">
+                      <m:d>
+                        <m:dPr>
+                          <m:ctrlPr>
+                            <a:rPr lang="en-US" sz="3200" b="0" i="1" smtClean="0">
+                              <a:latin typeface="Cambria Math" panose="02040503050406030204" pitchFamily="18" charset="0"/>
+                            </a:rPr>
+                          </m:ctrlPr>
+                        </m:dPr>
+                        <m:e>
+                          <m:r>
+                            <a:rPr lang="en-US" sz="3200" b="0" i="1" smtClean="0">
+                              <a:latin typeface="Cambria Math" panose="02040503050406030204" pitchFamily="18" charset="0"/>
+                            </a:rPr>
+                            <m:t>0, 1</m:t>
+                          </m:r>
+                        </m:e>
+                      </m:d>
+                      <m:r>
+                        <a:rPr lang="en-US" sz="3200" b="0" i="0" smtClean="0">
+                          <a:latin typeface="Cambria Math" panose="02040503050406030204" pitchFamily="18" charset="0"/>
+                        </a:rPr>
+                        <m:t> →20</m:t>
+                      </m:r>
+                    </m:oMath>
+                  </m:oMathPara>
+                </a14:m>
+                <a:endParaRPr lang="en-US" sz="3200" b="0" dirty="0" smtClean="0"/>
+              </a:p>
+            </p:txBody>
+          </p:sp>
+        </mc:Choice>
+        <mc:Fallback>
+          <p:sp>
+            <p:nvSpPr>
+              <p:cNvPr id="5" name="TextBox 4"/>
+              <p:cNvSpPr txBox="1">
+                <a:spLocks noRot="1" noChangeAspect="1" noMove="1" noResize="1" noEditPoints="1" noAdjustHandles="1" noChangeArrowheads="1" noChangeShapeType="1" noTextEdit="1"/>
+              </p:cNvSpPr>
+              <p:nvPr/>
+            </p:nvSpPr>
+            <p:spPr>
+              <a:xfrm>
+                <a:off x="5016057" y="2400855"/>
+                <a:ext cx="2159886" cy="492443"/>
+              </a:xfrm>
+              <a:prstGeom prst="rect">
+                <a:avLst/>
+              </a:prstGeom>
+              <a:blipFill>
+                <a:blip r:embed="rId3"/>
+                <a:stretch>
+                  <a:fillRect/>
+                </a:stretch>
+              </a:blipFill>
+            </p:spPr>
+            <p:txBody>
+              <a:bodyPr/>
+              <a:lstStyle/>
+              <a:p>
+                <a:r>
+                  <a:rPr lang="en-US">
+                    <a:noFill/>
+                  </a:rPr>
+                  <a:t> </a:t>
+                </a:r>
+              </a:p>
+            </p:txBody>
+          </p:sp>
+        </mc:Fallback>
+      </mc:AlternateContent>
+      <mc:AlternateContent xmlns:mc="http://schemas.openxmlformats.org/markup-compatibility/2006">
+        <mc:Choice xmlns:a14="http://schemas.microsoft.com/office/drawing/2010/main" Requires="a14">
+          <p:sp>
+            <p:nvSpPr>
+              <p:cNvPr id="8" name="TextBox 7"/>
+              <p:cNvSpPr txBox="1"/>
+              <p:nvPr/>
+            </p:nvSpPr>
+            <p:spPr>
+              <a:xfrm>
+                <a:off x="5016057" y="1879600"/>
+                <a:ext cx="2159886" cy="492443"/>
+              </a:xfrm>
+              <a:prstGeom prst="rect">
+                <a:avLst/>
+              </a:prstGeom>
+              <a:noFill/>
+            </p:spPr>
+            <p:txBody>
+              <a:bodyPr wrap="none" lIns="0" tIns="0" rIns="0" bIns="0" rtlCol="0">
+                <a:spAutoFit/>
+              </a:bodyPr>
+              <a:lstStyle/>
+              <a:p>
+                <a14:m>
+                  <m:oMathPara xmlns:m="http://schemas.openxmlformats.org/officeDocument/2006/math">
+                    <m:oMathParaPr>
+                      <m:jc m:val="centerGroup"/>
+                    </m:oMathParaPr>
+                    <m:oMath xmlns:m="http://schemas.openxmlformats.org/officeDocument/2006/math">
+                      <m:d>
+                        <m:dPr>
+                          <m:ctrlPr>
+                            <a:rPr lang="en-US" sz="3200" b="0" i="1" smtClean="0">
+                              <a:latin typeface="Cambria Math" panose="02040503050406030204" pitchFamily="18" charset="0"/>
+                            </a:rPr>
+                          </m:ctrlPr>
+                        </m:dPr>
+                        <m:e>
+                          <m:r>
+                            <a:rPr lang="en-US" sz="3200" b="0" i="1" smtClean="0">
+                              <a:latin typeface="Cambria Math" panose="02040503050406030204" pitchFamily="18" charset="0"/>
+                            </a:rPr>
+                            <m:t>0, 0</m:t>
+                          </m:r>
+                        </m:e>
+                      </m:d>
+                      <m:r>
+                        <a:rPr lang="en-US" sz="3200" b="0" i="0" smtClean="0">
+                          <a:latin typeface="Cambria Math" panose="02040503050406030204" pitchFamily="18" charset="0"/>
+                        </a:rPr>
+                        <m:t> →10</m:t>
+                      </m:r>
+                    </m:oMath>
+                  </m:oMathPara>
+                </a14:m>
+                <a:endParaRPr lang="en-US" sz="3200" b="0" dirty="0" smtClean="0"/>
+              </a:p>
+            </p:txBody>
+          </p:sp>
+        </mc:Choice>
+        <mc:Fallback>
+          <p:sp>
+            <p:nvSpPr>
+              <p:cNvPr id="8" name="TextBox 7"/>
+              <p:cNvSpPr txBox="1">
+                <a:spLocks noRot="1" noChangeAspect="1" noMove="1" noResize="1" noEditPoints="1" noAdjustHandles="1" noChangeArrowheads="1" noChangeShapeType="1" noTextEdit="1"/>
+              </p:cNvSpPr>
+              <p:nvPr/>
+            </p:nvSpPr>
+            <p:spPr>
+              <a:xfrm>
+                <a:off x="5016057" y="1879600"/>
+                <a:ext cx="2159886" cy="492443"/>
+              </a:xfrm>
+              <a:prstGeom prst="rect">
+                <a:avLst/>
+              </a:prstGeom>
+              <a:blipFill>
+                <a:blip r:embed="rId4"/>
+                <a:stretch>
+                  <a:fillRect/>
+                </a:stretch>
+              </a:blipFill>
+            </p:spPr>
+            <p:txBody>
+              <a:bodyPr/>
+              <a:lstStyle/>
+              <a:p>
+                <a:r>
+                  <a:rPr lang="en-US">
+                    <a:noFill/>
+                  </a:rPr>
+                  <a:t> </a:t>
+                </a:r>
+              </a:p>
+            </p:txBody>
+          </p:sp>
+        </mc:Fallback>
+      </mc:AlternateContent>
+      <mc:AlternateContent xmlns:mc="http://schemas.openxmlformats.org/markup-compatibility/2006">
+        <mc:Choice xmlns:a14="http://schemas.microsoft.com/office/drawing/2010/main" Requires="a14">
+          <p:sp>
+            <p:nvSpPr>
+              <p:cNvPr id="9" name="TextBox 8"/>
+              <p:cNvSpPr txBox="1"/>
+              <p:nvPr/>
+            </p:nvSpPr>
+            <p:spPr>
+              <a:xfrm>
+                <a:off x="5016057" y="3443366"/>
+                <a:ext cx="2159886" cy="492443"/>
+              </a:xfrm>
+              <a:prstGeom prst="rect">
+                <a:avLst/>
+              </a:prstGeom>
+              <a:noFill/>
+            </p:spPr>
+            <p:txBody>
+              <a:bodyPr wrap="none" lIns="0" tIns="0" rIns="0" bIns="0" rtlCol="0">
+                <a:spAutoFit/>
+              </a:bodyPr>
+              <a:lstStyle/>
+              <a:p>
+                <a14:m>
+                  <m:oMathPara xmlns:m="http://schemas.openxmlformats.org/officeDocument/2006/math">
+                    <m:oMathParaPr>
+                      <m:jc m:val="centerGroup"/>
+                    </m:oMathParaPr>
+                    <m:oMath xmlns:m="http://schemas.openxmlformats.org/officeDocument/2006/math">
+                      <m:d>
+                        <m:dPr>
+                          <m:ctrlPr>
+                            <a:rPr lang="en-US" sz="3200" b="0" i="1" smtClean="0">
+                              <a:latin typeface="Cambria Math" panose="02040503050406030204" pitchFamily="18" charset="0"/>
+                            </a:rPr>
+                          </m:ctrlPr>
+                        </m:dPr>
+                        <m:e>
+                          <m:r>
+                            <a:rPr lang="en-US" sz="3200" b="0" i="1" smtClean="0">
+                              <a:latin typeface="Cambria Math" panose="02040503050406030204" pitchFamily="18" charset="0"/>
+                            </a:rPr>
+                            <m:t>1</m:t>
+                          </m:r>
+                          <m:r>
+                            <a:rPr lang="en-US" sz="3200" b="0" i="1" smtClean="0">
+                              <a:latin typeface="Cambria Math" panose="02040503050406030204" pitchFamily="18" charset="0"/>
+                            </a:rPr>
+                            <m:t>, 3</m:t>
+                          </m:r>
+                        </m:e>
+                      </m:d>
+                      <m:r>
+                        <a:rPr lang="en-US" sz="3200" b="0" i="0" smtClean="0">
+                          <a:latin typeface="Cambria Math" panose="02040503050406030204" pitchFamily="18" charset="0"/>
+                        </a:rPr>
+                        <m:t> →40</m:t>
+                      </m:r>
+                    </m:oMath>
+                  </m:oMathPara>
+                </a14:m>
+                <a:endParaRPr lang="en-US" sz="3200" b="0" dirty="0" smtClean="0"/>
+              </a:p>
+            </p:txBody>
+          </p:sp>
+        </mc:Choice>
+        <mc:Fallback>
+          <p:sp>
+            <p:nvSpPr>
+              <p:cNvPr id="9" name="TextBox 8"/>
+              <p:cNvSpPr txBox="1">
+                <a:spLocks noRot="1" noChangeAspect="1" noMove="1" noResize="1" noEditPoints="1" noAdjustHandles="1" noChangeArrowheads="1" noChangeShapeType="1" noTextEdit="1"/>
+              </p:cNvSpPr>
+              <p:nvPr/>
+            </p:nvSpPr>
+            <p:spPr>
+              <a:xfrm>
+                <a:off x="5016057" y="3443366"/>
+                <a:ext cx="2159886" cy="492443"/>
+              </a:xfrm>
+              <a:prstGeom prst="rect">
+                <a:avLst/>
+              </a:prstGeom>
+              <a:blipFill>
+                <a:blip r:embed="rId5"/>
+                <a:stretch>
+                  <a:fillRect/>
+                </a:stretch>
+              </a:blipFill>
+            </p:spPr>
+            <p:txBody>
+              <a:bodyPr/>
+              <a:lstStyle/>
+              <a:p>
+                <a:r>
+                  <a:rPr lang="en-US">
+                    <a:noFill/>
+                  </a:rPr>
+                  <a:t> </a:t>
+                </a:r>
+              </a:p>
+            </p:txBody>
+          </p:sp>
+        </mc:Fallback>
+      </mc:AlternateContent>
+      <mc:AlternateContent xmlns:mc="http://schemas.openxmlformats.org/markup-compatibility/2006">
+        <mc:Choice xmlns:a14="http://schemas.microsoft.com/office/drawing/2010/main" Requires="a14">
+          <p:sp>
+            <p:nvSpPr>
+              <p:cNvPr id="12" name="TextBox 11"/>
+              <p:cNvSpPr txBox="1"/>
+              <p:nvPr/>
+            </p:nvSpPr>
+            <p:spPr>
+              <a:xfrm>
+                <a:off x="5016057" y="3964621"/>
+                <a:ext cx="2159886" cy="492443"/>
+              </a:xfrm>
+              <a:prstGeom prst="rect">
+                <a:avLst/>
+              </a:prstGeom>
+              <a:noFill/>
+            </p:spPr>
+            <p:txBody>
+              <a:bodyPr wrap="none" lIns="0" tIns="0" rIns="0" bIns="0" rtlCol="0">
+                <a:spAutoFit/>
+              </a:bodyPr>
+              <a:lstStyle/>
+              <a:p>
+                <a14:m>
+                  <m:oMathPara xmlns:m="http://schemas.openxmlformats.org/officeDocument/2006/math">
+                    <m:oMathParaPr>
+                      <m:jc m:val="centerGroup"/>
+                    </m:oMathParaPr>
+                    <m:oMath xmlns:m="http://schemas.openxmlformats.org/officeDocument/2006/math">
+                      <m:d>
+                        <m:dPr>
+                          <m:ctrlPr>
+                            <a:rPr lang="en-US" sz="3200" b="0" i="1" smtClean="0">
+                              <a:latin typeface="Cambria Math" panose="02040503050406030204" pitchFamily="18" charset="0"/>
+                            </a:rPr>
+                          </m:ctrlPr>
+                        </m:dPr>
+                        <m:e>
+                          <m:r>
+                            <a:rPr lang="en-US" sz="3200" b="0" i="1" smtClean="0">
+                              <a:latin typeface="Cambria Math" panose="02040503050406030204" pitchFamily="18" charset="0"/>
+                            </a:rPr>
+                            <m:t>2</m:t>
+                          </m:r>
+                          <m:r>
+                            <a:rPr lang="en-US" sz="3200" b="0" i="1" smtClean="0">
+                              <a:latin typeface="Cambria Math" panose="02040503050406030204" pitchFamily="18" charset="0"/>
+                            </a:rPr>
+                            <m:t>, 2</m:t>
+                          </m:r>
+                        </m:e>
+                      </m:d>
+                      <m:r>
+                        <a:rPr lang="en-US" sz="3200" b="0" i="0" smtClean="0">
+                          <a:latin typeface="Cambria Math" panose="02040503050406030204" pitchFamily="18" charset="0"/>
+                        </a:rPr>
+                        <m:t> →50</m:t>
+                      </m:r>
+                    </m:oMath>
+                  </m:oMathPara>
+                </a14:m>
+                <a:endParaRPr lang="en-US" sz="3200" b="0" dirty="0" smtClean="0"/>
+              </a:p>
+            </p:txBody>
+          </p:sp>
+        </mc:Choice>
+        <mc:Fallback>
+          <p:sp>
+            <p:nvSpPr>
+              <p:cNvPr id="12" name="TextBox 11"/>
+              <p:cNvSpPr txBox="1">
+                <a:spLocks noRot="1" noChangeAspect="1" noMove="1" noResize="1" noEditPoints="1" noAdjustHandles="1" noChangeArrowheads="1" noChangeShapeType="1" noTextEdit="1"/>
+              </p:cNvSpPr>
+              <p:nvPr/>
+            </p:nvSpPr>
+            <p:spPr>
+              <a:xfrm>
+                <a:off x="5016057" y="3964621"/>
+                <a:ext cx="2159886" cy="492443"/>
+              </a:xfrm>
+              <a:prstGeom prst="rect">
+                <a:avLst/>
+              </a:prstGeom>
+              <a:blipFill>
+                <a:blip r:embed="rId6"/>
+                <a:stretch>
+                  <a:fillRect/>
+                </a:stretch>
+              </a:blipFill>
+            </p:spPr>
+            <p:txBody>
+              <a:bodyPr/>
+              <a:lstStyle/>
+              <a:p>
+                <a:r>
+                  <a:rPr lang="en-US">
+                    <a:noFill/>
+                  </a:rPr>
+                  <a:t> </a:t>
+                </a:r>
+              </a:p>
+            </p:txBody>
+          </p:sp>
+        </mc:Fallback>
+      </mc:AlternateContent>
+      <mc:AlternateContent xmlns:mc="http://schemas.openxmlformats.org/markup-compatibility/2006">
+        <mc:Choice xmlns:a14="http://schemas.microsoft.com/office/drawing/2010/main" Requires="a14">
+          <p:sp>
+            <p:nvSpPr>
+              <p:cNvPr id="13" name="TextBox 12"/>
+              <p:cNvSpPr txBox="1"/>
+              <p:nvPr/>
+            </p:nvSpPr>
+            <p:spPr>
+              <a:xfrm>
+                <a:off x="5016057" y="4485876"/>
+                <a:ext cx="2159886" cy="492443"/>
+              </a:xfrm>
+              <a:prstGeom prst="rect">
+                <a:avLst/>
+              </a:prstGeom>
+              <a:noFill/>
+            </p:spPr>
+            <p:txBody>
+              <a:bodyPr wrap="none" lIns="0" tIns="0" rIns="0" bIns="0" rtlCol="0">
+                <a:spAutoFit/>
+              </a:bodyPr>
+              <a:lstStyle/>
+              <a:p>
+                <a14:m>
+                  <m:oMathPara xmlns:m="http://schemas.openxmlformats.org/officeDocument/2006/math">
+                    <m:oMathParaPr>
+                      <m:jc m:val="centerGroup"/>
+                    </m:oMathParaPr>
+                    <m:oMath xmlns:m="http://schemas.openxmlformats.org/officeDocument/2006/math">
+                      <m:d>
+                        <m:dPr>
+                          <m:ctrlPr>
+                            <a:rPr lang="en-US" sz="3200" b="0" i="1" smtClean="0">
+                              <a:latin typeface="Cambria Math" panose="02040503050406030204" pitchFamily="18" charset="0"/>
+                            </a:rPr>
+                          </m:ctrlPr>
+                        </m:dPr>
+                        <m:e>
+                          <m:r>
+                            <a:rPr lang="en-US" sz="3200" b="0" i="1" smtClean="0">
+                              <a:latin typeface="Cambria Math" panose="02040503050406030204" pitchFamily="18" charset="0"/>
+                            </a:rPr>
+                            <m:t>2, 3</m:t>
+                          </m:r>
+                        </m:e>
+                      </m:d>
+                      <m:r>
+                        <a:rPr lang="en-US" sz="3200" b="0" i="0" smtClean="0">
+                          <a:latin typeface="Cambria Math" panose="02040503050406030204" pitchFamily="18" charset="0"/>
+                        </a:rPr>
+                        <m:t> →60</m:t>
+                      </m:r>
+                    </m:oMath>
+                  </m:oMathPara>
+                </a14:m>
+                <a:endParaRPr lang="en-US" sz="3200" b="0" dirty="0" smtClean="0"/>
+              </a:p>
+            </p:txBody>
+          </p:sp>
+        </mc:Choice>
+        <mc:Fallback>
+          <p:sp>
+            <p:nvSpPr>
+              <p:cNvPr id="13" name="TextBox 12"/>
+              <p:cNvSpPr txBox="1">
+                <a:spLocks noRot="1" noChangeAspect="1" noMove="1" noResize="1" noEditPoints="1" noAdjustHandles="1" noChangeArrowheads="1" noChangeShapeType="1" noTextEdit="1"/>
+              </p:cNvSpPr>
+              <p:nvPr/>
+            </p:nvSpPr>
+            <p:spPr>
+              <a:xfrm>
+                <a:off x="5016057" y="4485876"/>
+                <a:ext cx="2159886" cy="492443"/>
+              </a:xfrm>
+              <a:prstGeom prst="rect">
+                <a:avLst/>
+              </a:prstGeom>
+              <a:blipFill>
+                <a:blip r:embed="rId7"/>
+                <a:stretch>
+                  <a:fillRect/>
+                </a:stretch>
+              </a:blipFill>
+            </p:spPr>
+            <p:txBody>
+              <a:bodyPr/>
+              <a:lstStyle/>
+              <a:p>
+                <a:r>
+                  <a:rPr lang="en-US">
+                    <a:noFill/>
+                  </a:rPr>
+                  <a:t> </a:t>
+                </a:r>
+              </a:p>
+            </p:txBody>
+          </p:sp>
+        </mc:Fallback>
+      </mc:AlternateContent>
+      <mc:AlternateContent xmlns:mc="http://schemas.openxmlformats.org/markup-compatibility/2006">
+        <mc:Choice xmlns:a14="http://schemas.microsoft.com/office/drawing/2010/main" Requires="a14">
+          <p:sp>
+            <p:nvSpPr>
+              <p:cNvPr id="15" name="TextBox 14"/>
+              <p:cNvSpPr txBox="1"/>
+              <p:nvPr/>
+            </p:nvSpPr>
+            <p:spPr>
+              <a:xfrm>
+                <a:off x="5016057" y="5007131"/>
+                <a:ext cx="2159886" cy="492443"/>
+              </a:xfrm>
+              <a:prstGeom prst="rect">
+                <a:avLst/>
+              </a:prstGeom>
+              <a:noFill/>
+            </p:spPr>
+            <p:txBody>
+              <a:bodyPr wrap="none" lIns="0" tIns="0" rIns="0" bIns="0" rtlCol="0">
+                <a:spAutoFit/>
+              </a:bodyPr>
+              <a:lstStyle/>
+              <a:p>
+                <a14:m>
+                  <m:oMathPara xmlns:m="http://schemas.openxmlformats.org/officeDocument/2006/math">
+                    <m:oMathParaPr>
+                      <m:jc m:val="centerGroup"/>
+                    </m:oMathParaPr>
+                    <m:oMath xmlns:m="http://schemas.openxmlformats.org/officeDocument/2006/math">
+                      <m:d>
+                        <m:dPr>
+                          <m:ctrlPr>
+                            <a:rPr lang="en-US" sz="3200" b="0" i="1" smtClean="0">
+                              <a:latin typeface="Cambria Math" panose="02040503050406030204" pitchFamily="18" charset="0"/>
+                            </a:rPr>
+                          </m:ctrlPr>
+                        </m:dPr>
+                        <m:e>
+                          <m:r>
+                            <a:rPr lang="en-US" sz="3200" b="0" i="1" smtClean="0">
+                              <a:latin typeface="Cambria Math" panose="02040503050406030204" pitchFamily="18" charset="0"/>
+                            </a:rPr>
+                            <m:t>2, 4</m:t>
+                          </m:r>
+                        </m:e>
+                      </m:d>
+                      <m:r>
+                        <a:rPr lang="en-US" sz="3200" b="0" i="0" smtClean="0">
+                          <a:latin typeface="Cambria Math" panose="02040503050406030204" pitchFamily="18" charset="0"/>
+                        </a:rPr>
+                        <m:t> →70</m:t>
+                      </m:r>
+                    </m:oMath>
+                  </m:oMathPara>
+                </a14:m>
+                <a:endParaRPr lang="en-US" sz="3200" b="0" dirty="0" smtClean="0"/>
+              </a:p>
+            </p:txBody>
+          </p:sp>
+        </mc:Choice>
+        <mc:Fallback>
+          <p:sp>
+            <p:nvSpPr>
+              <p:cNvPr id="15" name="TextBox 14"/>
+              <p:cNvSpPr txBox="1">
+                <a:spLocks noRot="1" noChangeAspect="1" noMove="1" noResize="1" noEditPoints="1" noAdjustHandles="1" noChangeArrowheads="1" noChangeShapeType="1" noTextEdit="1"/>
+              </p:cNvSpPr>
+              <p:nvPr/>
+            </p:nvSpPr>
+            <p:spPr>
+              <a:xfrm>
+                <a:off x="5016057" y="5007131"/>
+                <a:ext cx="2159886" cy="492443"/>
+              </a:xfrm>
+              <a:prstGeom prst="rect">
+                <a:avLst/>
+              </a:prstGeom>
+              <a:blipFill>
+                <a:blip r:embed="rId8"/>
+                <a:stretch>
+                  <a:fillRect/>
+                </a:stretch>
+              </a:blipFill>
+            </p:spPr>
+            <p:txBody>
+              <a:bodyPr/>
+              <a:lstStyle/>
+              <a:p>
+                <a:r>
+                  <a:rPr lang="en-US">
+                    <a:noFill/>
+                  </a:rPr>
+                  <a:t> </a:t>
+                </a:r>
+              </a:p>
+            </p:txBody>
+          </p:sp>
+        </mc:Fallback>
+      </mc:AlternateContent>
+      <mc:AlternateContent xmlns:mc="http://schemas.openxmlformats.org/markup-compatibility/2006">
+        <mc:Choice xmlns:a14="http://schemas.microsoft.com/office/drawing/2010/main" Requires="a14">
+          <p:sp>
+            <p:nvSpPr>
+              <p:cNvPr id="16" name="TextBox 15"/>
+              <p:cNvSpPr txBox="1"/>
+              <p:nvPr/>
+            </p:nvSpPr>
+            <p:spPr>
+              <a:xfrm>
+                <a:off x="5016057" y="5528386"/>
+                <a:ext cx="2159886" cy="492443"/>
+              </a:xfrm>
+              <a:prstGeom prst="rect">
+                <a:avLst/>
+              </a:prstGeom>
+              <a:noFill/>
+            </p:spPr>
+            <p:txBody>
+              <a:bodyPr wrap="none" lIns="0" tIns="0" rIns="0" bIns="0" rtlCol="0">
+                <a:spAutoFit/>
+              </a:bodyPr>
+              <a:lstStyle/>
+              <a:p>
+                <a14:m>
+                  <m:oMathPara xmlns:m="http://schemas.openxmlformats.org/officeDocument/2006/math">
+                    <m:oMathParaPr>
+                      <m:jc m:val="centerGroup"/>
+                    </m:oMathParaPr>
+                    <m:oMath xmlns:m="http://schemas.openxmlformats.org/officeDocument/2006/math">
+                      <m:d>
+                        <m:dPr>
+                          <m:ctrlPr>
+                            <a:rPr lang="en-US" sz="3200" b="0" i="1" smtClean="0">
+                              <a:latin typeface="Cambria Math" panose="02040503050406030204" pitchFamily="18" charset="0"/>
+                            </a:rPr>
+                          </m:ctrlPr>
+                        </m:dPr>
+                        <m:e>
+                          <m:r>
+                            <a:rPr lang="en-US" sz="3200" b="0" i="1" smtClean="0">
+                              <a:latin typeface="Cambria Math" panose="02040503050406030204" pitchFamily="18" charset="0"/>
+                            </a:rPr>
+                            <m:t>3</m:t>
+                          </m:r>
+                          <m:r>
+                            <a:rPr lang="en-US" sz="3200" b="0" i="1" smtClean="0">
+                              <a:latin typeface="Cambria Math" panose="02040503050406030204" pitchFamily="18" charset="0"/>
+                            </a:rPr>
+                            <m:t>, 5</m:t>
+                          </m:r>
+                        </m:e>
+                      </m:d>
+                      <m:r>
+                        <a:rPr lang="en-US" sz="3200" b="0" i="0" smtClean="0">
+                          <a:latin typeface="Cambria Math" panose="02040503050406030204" pitchFamily="18" charset="0"/>
+                        </a:rPr>
+                        <m:t> →80</m:t>
+                      </m:r>
+                    </m:oMath>
+                  </m:oMathPara>
+                </a14:m>
+                <a:endParaRPr lang="en-US" sz="3200" b="0" dirty="0" smtClean="0"/>
+              </a:p>
+            </p:txBody>
+          </p:sp>
+        </mc:Choice>
+        <mc:Fallback>
+          <p:sp>
+            <p:nvSpPr>
+              <p:cNvPr id="16" name="TextBox 15"/>
+              <p:cNvSpPr txBox="1">
+                <a:spLocks noRot="1" noChangeAspect="1" noMove="1" noResize="1" noEditPoints="1" noAdjustHandles="1" noChangeArrowheads="1" noChangeShapeType="1" noTextEdit="1"/>
+              </p:cNvSpPr>
+              <p:nvPr/>
+            </p:nvSpPr>
+            <p:spPr>
+              <a:xfrm>
+                <a:off x="5016057" y="5528386"/>
+                <a:ext cx="2159886" cy="492443"/>
+              </a:xfrm>
+              <a:prstGeom prst="rect">
+                <a:avLst/>
+              </a:prstGeom>
+              <a:blipFill>
+                <a:blip r:embed="rId9"/>
+                <a:stretch>
+                  <a:fillRect/>
+                </a:stretch>
+              </a:blipFill>
+            </p:spPr>
+            <p:txBody>
+              <a:bodyPr/>
+              <a:lstStyle/>
+              <a:p>
+                <a:r>
+                  <a:rPr lang="en-US">
+                    <a:noFill/>
+                  </a:rPr>
+                  <a:t> </a:t>
+                </a:r>
+              </a:p>
+            </p:txBody>
+          </p:sp>
+        </mc:Fallback>
+      </mc:AlternateContent>
+    </p:spTree>
+    <p:extLst>
+      <p:ext uri="{BB962C8B-B14F-4D97-AF65-F5344CB8AC3E}">
+        <p14:creationId xmlns:p14="http://schemas.microsoft.com/office/powerpoint/2010/main" val="3108736437"/>
+      </p:ext>
+    </p:extLst>
+  </p:cSld>
+  <p:clrMapOvr>
+    <a:masterClrMapping/>
+  </p:clrMapOvr>
+  <mc:AlternateContent xmlns:mc="http://schemas.openxmlformats.org/markup-compatibility/2006">
+    <mc:Choice xmlns:p14="http://schemas.microsoft.com/office/powerpoint/2010/main" Requires="p14">
+      <p:transition spd="slow" p14:dur="2000"/>
+    </mc:Choice>
+    <mc:Fallback>
+      <p:transition spd="slow"/>
+    </mc:Fallback>
+  </mc:AlternateContent>
+</p:sld>
+</file>
+
+<file path=ppt/slides/slide16.xml><?xml version="1.0" encoding="utf-8"?>
+<p:sld xmlns:a="http://schemas.openxmlformats.org/drawingml/2006/main" xmlns:r="http://schemas.openxmlformats.org/officeDocument/2006/relationships" xmlns:p="http://schemas.openxmlformats.org/presentationml/2006/main">
+  <p:cSld>
+    <p:spTree>
+      <p:nvGrpSpPr>
+        <p:cNvPr id="1" name=""/>
+        <p:cNvGrpSpPr/>
+        <p:nvPr/>
+      </p:nvGrpSpPr>
+      <p:grpSpPr>
+        <a:xfrm>
+          <a:off x="0" y="0"/>
+          <a:ext cx="0" cy="0"/>
+          <a:chOff x="0" y="0"/>
+          <a:chExt cx="0" cy="0"/>
+        </a:xfrm>
+      </p:grpSpPr>
+      <p:sp>
+        <p:nvSpPr>
+          <p:cNvPr id="2" name="Title 1"/>
+          <p:cNvSpPr>
+            <a:spLocks noGrp="1"/>
+          </p:cNvSpPr>
+          <p:nvPr>
+            <p:ph type="title"/>
+          </p:nvPr>
+        </p:nvSpPr>
+        <p:spPr>
+          <a:gradFill>
+            <a:gsLst>
+              <a:gs pos="0">
+                <a:schemeClr val="accent1">
+                  <a:lumMod val="5000"/>
+                  <a:lumOff val="95000"/>
+                </a:schemeClr>
+              </a:gs>
+              <a:gs pos="74000">
+                <a:schemeClr val="accent1">
+                  <a:lumMod val="45000"/>
+                  <a:lumOff val="55000"/>
+                </a:schemeClr>
+              </a:gs>
+              <a:gs pos="83000">
+                <a:schemeClr val="accent1">
+                  <a:lumMod val="45000"/>
+                  <a:lumOff val="55000"/>
+                </a:schemeClr>
+              </a:gs>
+              <a:gs pos="100000">
+                <a:schemeClr val="accent1">
+                  <a:lumMod val="30000"/>
+                  <a:lumOff val="70000"/>
+                </a:schemeClr>
+              </a:gs>
+            </a:gsLst>
+            <a:lin ang="5400000" scaled="1"/>
+          </a:gradFill>
+        </p:spPr>
+        <p:txBody>
+          <a:bodyPr>
+            <a:normAutofit/>
+          </a:bodyPr>
+          <a:lstStyle/>
+          <a:p>
+            <a:pPr algn="ctr"/>
+            <a:r>
+              <a:rPr lang="en-US" dirty="0" smtClean="0"/>
+              <a:t>List of Lists (LIL)</a:t>
+            </a:r>
+            <a:endParaRPr lang="en-US" dirty="0"/>
+          </a:p>
+        </p:txBody>
+      </p:sp>
+      <p:sp>
+        <p:nvSpPr>
+          <p:cNvPr id="3" name="Content Placeholder 2"/>
+          <p:cNvSpPr>
+            <a:spLocks noGrp="1"/>
+          </p:cNvSpPr>
+          <p:nvPr>
+            <p:ph idx="1"/>
+          </p:nvPr>
+        </p:nvSpPr>
+        <p:spPr/>
+        <p:txBody>
+          <a:bodyPr>
+            <a:normAutofit/>
+          </a:bodyPr>
+          <a:lstStyle/>
+          <a:p>
+            <a:pPr algn="just">
+              <a:spcAft>
+                <a:spcPts val="1200"/>
+              </a:spcAft>
+            </a:pPr>
+            <a:r>
+              <a:rPr lang="en-US" sz="3400" dirty="0"/>
+              <a:t>LIL stores one list per row, with each entry containing the column index and the value</a:t>
+            </a:r>
+            <a:r>
+              <a:rPr lang="en-US" sz="3400" dirty="0" smtClean="0"/>
+              <a:t>.</a:t>
+            </a:r>
+          </a:p>
+          <a:p>
+            <a:pPr algn="just">
+              <a:spcAft>
+                <a:spcPts val="1200"/>
+              </a:spcAft>
+            </a:pPr>
+            <a:endParaRPr lang="en-US" sz="3400" dirty="0"/>
+          </a:p>
+          <a:p>
+            <a:pPr algn="just">
+              <a:spcAft>
+                <a:spcPts val="1200"/>
+              </a:spcAft>
+            </a:pPr>
+            <a:r>
+              <a:rPr lang="en-US" sz="3400" dirty="0"/>
+              <a:t>Typically, these entries </a:t>
+            </a:r>
+            <a:r>
+              <a:rPr lang="en-US" sz="3400" dirty="0" smtClean="0"/>
+              <a:t>are </a:t>
+            </a:r>
+            <a:r>
+              <a:rPr lang="en-US" sz="3400" dirty="0"/>
+              <a:t>sorted by column index for faster </a:t>
+            </a:r>
+            <a:r>
+              <a:rPr lang="en-US" sz="3400" dirty="0" smtClean="0"/>
+              <a:t>lookup.</a:t>
+            </a:r>
+            <a:endParaRPr lang="en-US" sz="3400" dirty="0"/>
+          </a:p>
+        </p:txBody>
+      </p:sp>
+    </p:spTree>
+    <p:extLst>
+      <p:ext uri="{BB962C8B-B14F-4D97-AF65-F5344CB8AC3E}">
+        <p14:creationId xmlns:p14="http://schemas.microsoft.com/office/powerpoint/2010/main" val="2133999763"/>
+      </p:ext>
+    </p:extLst>
+  </p:cSld>
+  <p:clrMapOvr>
+    <a:masterClrMapping/>
+  </p:clrMapOvr>
+  <mc:AlternateContent xmlns:mc="http://schemas.openxmlformats.org/markup-compatibility/2006">
+    <mc:Choice xmlns:p14="http://schemas.microsoft.com/office/powerpoint/2010/main" Requires="p14">
+      <p:transition spd="slow" p14:dur="2000"/>
+    </mc:Choice>
+    <mc:Fallback>
+      <p:transition spd="slow"/>
+    </mc:Fallback>
+  </mc:AlternateContent>
+</p:sld>
+</file>
+
+<file path=ppt/slides/slide17.xml><?xml version="1.0" encoding="utf-8"?>
+<p:sld xmlns:a="http://schemas.openxmlformats.org/drawingml/2006/main" xmlns:r="http://schemas.openxmlformats.org/officeDocument/2006/relationships" xmlns:p="http://schemas.openxmlformats.org/presentationml/2006/main">
+  <p:cSld>
+    <p:spTree>
+      <p:nvGrpSpPr>
+        <p:cNvPr id="1" name=""/>
+        <p:cNvGrpSpPr/>
+        <p:nvPr/>
+      </p:nvGrpSpPr>
+      <p:grpSpPr>
+        <a:xfrm>
+          <a:off x="0" y="0"/>
+          <a:ext cx="0" cy="0"/>
+          <a:chOff x="0" y="0"/>
+          <a:chExt cx="0" cy="0"/>
+        </a:xfrm>
+      </p:grpSpPr>
+      <p:sp>
+        <p:nvSpPr>
+          <p:cNvPr id="2" name="Title 1"/>
+          <p:cNvSpPr>
+            <a:spLocks noGrp="1"/>
+          </p:cNvSpPr>
+          <p:nvPr>
+            <p:ph type="title"/>
+          </p:nvPr>
+        </p:nvSpPr>
+        <p:spPr>
+          <a:gradFill>
+            <a:gsLst>
+              <a:gs pos="0">
+                <a:schemeClr val="accent1">
+                  <a:lumMod val="5000"/>
+                  <a:lumOff val="95000"/>
+                </a:schemeClr>
+              </a:gs>
+              <a:gs pos="74000">
+                <a:schemeClr val="accent1">
+                  <a:lumMod val="45000"/>
+                  <a:lumOff val="55000"/>
+                </a:schemeClr>
+              </a:gs>
+              <a:gs pos="83000">
+                <a:schemeClr val="accent1">
+                  <a:lumMod val="45000"/>
+                  <a:lumOff val="55000"/>
+                </a:schemeClr>
+              </a:gs>
+              <a:gs pos="100000">
+                <a:schemeClr val="accent1">
+                  <a:lumMod val="30000"/>
+                  <a:lumOff val="70000"/>
+                </a:schemeClr>
+              </a:gs>
+            </a:gsLst>
+            <a:lin ang="5400000" scaled="1"/>
+          </a:gradFill>
+        </p:spPr>
+        <p:txBody>
+          <a:bodyPr>
+            <a:normAutofit/>
+          </a:bodyPr>
+          <a:lstStyle/>
+          <a:p>
+            <a:pPr algn="ctr"/>
+            <a:r>
+              <a:rPr lang="en-US" dirty="0" smtClean="0"/>
+              <a:t>List of Lists (LIL)</a:t>
+            </a:r>
+            <a:endParaRPr lang="en-US" dirty="0"/>
+          </a:p>
+        </p:txBody>
+      </p:sp>
+      <mc:AlternateContent xmlns:mc="http://schemas.openxmlformats.org/markup-compatibility/2006" xmlns:a14="http://schemas.microsoft.com/office/drawing/2010/main">
+        <mc:Choice Requires="a14">
+          <p:sp>
+            <p:nvSpPr>
+              <p:cNvPr id="6" name="TextBox 5"/>
+              <p:cNvSpPr txBox="1"/>
+              <p:nvPr/>
+            </p:nvSpPr>
+            <p:spPr>
+              <a:xfrm>
+                <a:off x="2320089" y="2456871"/>
+                <a:ext cx="6757491" cy="2041008"/>
+              </a:xfrm>
+              <a:prstGeom prst="rect">
+                <a:avLst/>
+              </a:prstGeom>
+              <a:noFill/>
+            </p:spPr>
+            <p:txBody>
+              <a:bodyPr wrap="none" lIns="0" tIns="0" rIns="0" bIns="0" rtlCol="0">
+                <a:spAutoFit/>
+              </a:bodyPr>
+              <a:lstStyle/>
+              <a:p>
+                <a:pPr/>
+                <a14:m>
+                  <m:oMathPara xmlns:m="http://schemas.openxmlformats.org/officeDocument/2006/math">
+                    <m:oMathParaPr>
+                      <m:jc m:val="centerGroup"/>
+                    </m:oMathParaPr>
+                    <m:oMath xmlns:m="http://schemas.openxmlformats.org/officeDocument/2006/math">
+                      <m:r>
+                        <a:rPr lang="en-US" sz="3600" b="0" i="1" smtClean="0">
+                          <a:latin typeface="Cambria Math" panose="02040503050406030204" pitchFamily="18" charset="0"/>
+                        </a:rPr>
+                        <m:t>𝐴</m:t>
+                      </m:r>
+                      <m:r>
+                        <a:rPr lang="en-US" sz="3600" b="0" i="1" smtClean="0">
+                          <a:latin typeface="Cambria Math" panose="02040503050406030204" pitchFamily="18" charset="0"/>
+                        </a:rPr>
+                        <m:t>=</m:t>
+                      </m:r>
+                      <m:d>
+                        <m:dPr>
+                          <m:begChr m:val="["/>
+                          <m:endChr m:val="]"/>
+                          <m:ctrlPr>
+                            <a:rPr lang="en-US" sz="3600" i="1">
+                              <a:latin typeface="Cambria Math" panose="02040503050406030204" pitchFamily="18" charset="0"/>
+                            </a:rPr>
+                          </m:ctrlPr>
+                        </m:dPr>
+                        <m:e>
+                          <m:m>
+                            <m:mPr>
+                              <m:mcs>
+                                <m:mc>
+                                  <m:mcPr>
+                                    <m:count m:val="6"/>
+                                    <m:mcJc m:val="center"/>
+                                  </m:mcPr>
+                                </m:mc>
+                              </m:mcs>
+                              <m:ctrlPr>
+                                <a:rPr lang="en-US" sz="3600" i="1">
+                                  <a:latin typeface="Cambria Math" panose="02040503050406030204" pitchFamily="18" charset="0"/>
+                                </a:rPr>
+                              </m:ctrlPr>
+                            </m:mPr>
+                            <m:mr>
+                              <m:e>
+                                <m:r>
+                                  <m:rPr>
+                                    <m:brk m:alnAt="7"/>
+                                  </m:rPr>
+                                  <a:rPr lang="en-US" sz="3600" b="0" i="1" smtClean="0">
+                                    <a:latin typeface="Cambria Math" panose="02040503050406030204" pitchFamily="18" charset="0"/>
+                                  </a:rPr>
+                                  <m:t>1</m:t>
+                                </m:r>
+                                <m:r>
+                                  <a:rPr lang="en-US" sz="3600" b="0" i="1" smtClean="0">
+                                    <a:latin typeface="Cambria Math" panose="02040503050406030204" pitchFamily="18" charset="0"/>
+                                  </a:rPr>
+                                  <m:t>0</m:t>
+                                </m:r>
+                              </m:e>
+                              <m:e>
+                                <m:r>
+                                  <a:rPr lang="en-US" sz="3600" b="0" i="1" smtClean="0">
+                                    <a:latin typeface="Cambria Math" panose="02040503050406030204" pitchFamily="18" charset="0"/>
+                                  </a:rPr>
+                                  <m:t>20</m:t>
+                                </m:r>
+                              </m:e>
+                              <m:e>
+                                <m:r>
+                                  <a:rPr lang="en-US" sz="3600" b="0" i="1" smtClean="0">
+                                    <a:latin typeface="Cambria Math" panose="02040503050406030204" pitchFamily="18" charset="0"/>
+                                  </a:rPr>
+                                  <m:t>0</m:t>
+                                </m:r>
+                              </m:e>
+                              <m:e>
+                                <m:r>
+                                  <a:rPr lang="en-US" sz="3600" b="0" i="1" smtClean="0">
+                                    <a:latin typeface="Cambria Math" panose="02040503050406030204" pitchFamily="18" charset="0"/>
+                                  </a:rPr>
+                                  <m:t>0</m:t>
+                                </m:r>
+                              </m:e>
+                              <m:e>
+                                <m:r>
+                                  <a:rPr lang="en-US" sz="3600" b="0" i="1" smtClean="0">
+                                    <a:latin typeface="Cambria Math" panose="02040503050406030204" pitchFamily="18" charset="0"/>
+                                  </a:rPr>
+                                  <m:t>0</m:t>
+                                </m:r>
+                              </m:e>
+                              <m:e>
+                                <m:r>
+                                  <a:rPr lang="en-US" sz="3600" b="0" i="1" smtClean="0">
+                                    <a:latin typeface="Cambria Math" panose="02040503050406030204" pitchFamily="18" charset="0"/>
+                                  </a:rPr>
+                                  <m:t>0</m:t>
+                                </m:r>
+                              </m:e>
+                            </m:mr>
+                            <m:mr>
+                              <m:e>
+                                <m:r>
+                                  <a:rPr lang="en-US" sz="3600" b="0" i="1" smtClean="0">
+                                    <a:latin typeface="Cambria Math" panose="02040503050406030204" pitchFamily="18" charset="0"/>
+                                  </a:rPr>
+                                  <m:t>0</m:t>
+                                </m:r>
+                              </m:e>
+                              <m:e>
+                                <m:r>
+                                  <a:rPr lang="en-US" sz="3600" b="0" i="1" smtClean="0">
+                                    <a:latin typeface="Cambria Math" panose="02040503050406030204" pitchFamily="18" charset="0"/>
+                                  </a:rPr>
+                                  <m:t>30</m:t>
+                                </m:r>
+                              </m:e>
+                              <m:e>
+                                <m:r>
+                                  <a:rPr lang="en-US" sz="3600" b="0" i="1" smtClean="0">
+                                    <a:latin typeface="Cambria Math" panose="02040503050406030204" pitchFamily="18" charset="0"/>
+                                  </a:rPr>
+                                  <m:t>0</m:t>
+                                </m:r>
+                              </m:e>
+                              <m:e>
+                                <m:r>
+                                  <a:rPr lang="en-US" sz="3600" b="0" i="1" smtClean="0">
+                                    <a:latin typeface="Cambria Math" panose="02040503050406030204" pitchFamily="18" charset="0"/>
+                                  </a:rPr>
+                                  <m:t>40</m:t>
+                                </m:r>
+                              </m:e>
+                              <m:e>
+                                <m:r>
+                                  <a:rPr lang="en-US" sz="3600" b="0" i="1" smtClean="0">
+                                    <a:latin typeface="Cambria Math" panose="02040503050406030204" pitchFamily="18" charset="0"/>
+                                  </a:rPr>
+                                  <m:t>0</m:t>
+                                </m:r>
+                              </m:e>
+                              <m:e>
+                                <m:r>
+                                  <a:rPr lang="en-US" sz="3600" b="0" i="1" smtClean="0">
+                                    <a:latin typeface="Cambria Math" panose="02040503050406030204" pitchFamily="18" charset="0"/>
+                                  </a:rPr>
+                                  <m:t>0</m:t>
+                                </m:r>
+                              </m:e>
+                            </m:mr>
+                            <m:mr>
+                              <m:e>
+                                <m:r>
+                                  <a:rPr lang="en-US" sz="3600" b="0" i="1" smtClean="0">
+                                    <a:latin typeface="Cambria Math" panose="02040503050406030204" pitchFamily="18" charset="0"/>
+                                  </a:rPr>
+                                  <m:t>0</m:t>
+                                </m:r>
+                              </m:e>
+                              <m:e>
+                                <m:r>
+                                  <a:rPr lang="en-US" sz="3600" b="0" i="1" smtClean="0">
+                                    <a:latin typeface="Cambria Math" panose="02040503050406030204" pitchFamily="18" charset="0"/>
+                                  </a:rPr>
+                                  <m:t>0</m:t>
+                                </m:r>
+                              </m:e>
+                              <m:e>
+                                <m:r>
+                                  <a:rPr lang="en-US" sz="3600" b="0" i="1" smtClean="0">
+                                    <a:latin typeface="Cambria Math" panose="02040503050406030204" pitchFamily="18" charset="0"/>
+                                  </a:rPr>
+                                  <m:t>50</m:t>
+                                </m:r>
+                              </m:e>
+                              <m:e>
+                                <m:r>
+                                  <a:rPr lang="en-US" sz="3600" b="0" i="1" smtClean="0">
+                                    <a:latin typeface="Cambria Math" panose="02040503050406030204" pitchFamily="18" charset="0"/>
+                                  </a:rPr>
+                                  <m:t>60</m:t>
+                                </m:r>
+                              </m:e>
+                              <m:e>
+                                <m:r>
+                                  <a:rPr lang="en-US" sz="3600" b="0" i="1" smtClean="0">
+                                    <a:latin typeface="Cambria Math" panose="02040503050406030204" pitchFamily="18" charset="0"/>
+                                  </a:rPr>
+                                  <m:t>70</m:t>
+                                </m:r>
+                              </m:e>
+                              <m:e>
+                                <m:r>
+                                  <a:rPr lang="en-US" sz="3600" b="0" i="1" smtClean="0">
+                                    <a:latin typeface="Cambria Math" panose="02040503050406030204" pitchFamily="18" charset="0"/>
+                                  </a:rPr>
+                                  <m:t>0</m:t>
+                                </m:r>
+                              </m:e>
+                            </m:mr>
+                            <m:mr>
+                              <m:e>
+                                <m:r>
+                                  <a:rPr lang="en-US" sz="3600" b="0" i="1" smtClean="0">
+                                    <a:latin typeface="Cambria Math" panose="02040503050406030204" pitchFamily="18" charset="0"/>
+                                  </a:rPr>
+                                  <m:t>0</m:t>
+                                </m:r>
+                              </m:e>
+                              <m:e>
+                                <m:r>
+                                  <a:rPr lang="en-US" sz="3600" b="0" i="1" smtClean="0">
+                                    <a:latin typeface="Cambria Math" panose="02040503050406030204" pitchFamily="18" charset="0"/>
+                                  </a:rPr>
+                                  <m:t>0</m:t>
+                                </m:r>
+                              </m:e>
+                              <m:e>
+                                <m:r>
+                                  <a:rPr lang="en-US" sz="3600" b="0" i="1" smtClean="0">
+                                    <a:latin typeface="Cambria Math" panose="02040503050406030204" pitchFamily="18" charset="0"/>
+                                  </a:rPr>
+                                  <m:t>0</m:t>
+                                </m:r>
+                              </m:e>
+                              <m:e>
+                                <m:r>
+                                  <a:rPr lang="en-US" sz="3600" b="0" i="1" smtClean="0">
+                                    <a:latin typeface="Cambria Math" panose="02040503050406030204" pitchFamily="18" charset="0"/>
+                                  </a:rPr>
+                                  <m:t>0</m:t>
+                                </m:r>
+                              </m:e>
+                              <m:e>
+                                <m:r>
+                                  <a:rPr lang="en-US" sz="3600" b="0" i="1" smtClean="0">
+                                    <a:latin typeface="Cambria Math" panose="02040503050406030204" pitchFamily="18" charset="0"/>
+                                  </a:rPr>
+                                  <m:t>0</m:t>
+                                </m:r>
+                              </m:e>
+                              <m:e>
+                                <m:r>
+                                  <a:rPr lang="en-US" sz="3600" b="0" i="1" smtClean="0">
+                                    <a:latin typeface="Cambria Math" panose="02040503050406030204" pitchFamily="18" charset="0"/>
+                                  </a:rPr>
+                                  <m:t>80</m:t>
+                                </m:r>
+                              </m:e>
+                            </m:mr>
+                          </m:m>
+                        </m:e>
+                      </m:d>
+                    </m:oMath>
+                  </m:oMathPara>
+                </a14:m>
+                <a:endParaRPr lang="en-US" sz="3600" dirty="0"/>
+              </a:p>
+            </p:txBody>
+          </p:sp>
+        </mc:Choice>
+        <mc:Fallback xmlns="">
+          <p:sp>
+            <p:nvSpPr>
+              <p:cNvPr id="6" name="TextBox 5"/>
+              <p:cNvSpPr txBox="1">
+                <a:spLocks noRot="1" noChangeAspect="1" noMove="1" noResize="1" noEditPoints="1" noAdjustHandles="1" noChangeArrowheads="1" noChangeShapeType="1" noTextEdit="1"/>
+              </p:cNvSpPr>
+              <p:nvPr/>
+            </p:nvSpPr>
+            <p:spPr>
+              <a:xfrm>
+                <a:off x="2320089" y="2456871"/>
+                <a:ext cx="6757491" cy="2041008"/>
+              </a:xfrm>
+              <a:prstGeom prst="rect">
+                <a:avLst/>
+              </a:prstGeom>
+              <a:blipFill>
+                <a:blip r:embed="rId2"/>
+                <a:stretch>
+                  <a:fillRect/>
+                </a:stretch>
+              </a:blipFill>
+            </p:spPr>
+            <p:txBody>
+              <a:bodyPr/>
+              <a:lstStyle/>
+              <a:p>
+                <a:r>
+                  <a:rPr lang="en-US">
+                    <a:noFill/>
+                  </a:rPr>
+                  <a:t> </a:t>
+                </a:r>
+              </a:p>
+            </p:txBody>
+          </p:sp>
+        </mc:Fallback>
+      </mc:AlternateContent>
+    </p:spTree>
+    <p:extLst>
+      <p:ext uri="{BB962C8B-B14F-4D97-AF65-F5344CB8AC3E}">
+        <p14:creationId xmlns:p14="http://schemas.microsoft.com/office/powerpoint/2010/main" val="3237042336"/>
+      </p:ext>
+    </p:extLst>
+  </p:cSld>
+  <p:clrMapOvr>
+    <a:masterClrMapping/>
+  </p:clrMapOvr>
+  <mc:AlternateContent xmlns:mc="http://schemas.openxmlformats.org/markup-compatibility/2006">
+    <mc:Choice xmlns:p14="http://schemas.microsoft.com/office/powerpoint/2010/main" Requires="p14">
+      <p:transition spd="slow" p14:dur="2000"/>
+    </mc:Choice>
+    <mc:Fallback>
+      <p:transition spd="slow"/>
+    </mc:Fallback>
+  </mc:AlternateContent>
+</p:sld>
+</file>
+
+<file path=ppt/slides/slide18.xml><?xml version="1.0" encoding="utf-8"?>
+<p:sld xmlns:a="http://schemas.openxmlformats.org/drawingml/2006/main" xmlns:r="http://schemas.openxmlformats.org/officeDocument/2006/relationships" xmlns:p="http://schemas.openxmlformats.org/presentationml/2006/main">
+  <p:cSld>
+    <p:spTree>
+      <p:nvGrpSpPr>
+        <p:cNvPr id="1" name=""/>
+        <p:cNvGrpSpPr/>
+        <p:nvPr/>
+      </p:nvGrpSpPr>
+      <p:grpSpPr>
+        <a:xfrm>
+          <a:off x="0" y="0"/>
+          <a:ext cx="0" cy="0"/>
+          <a:chOff x="0" y="0"/>
+          <a:chExt cx="0" cy="0"/>
+        </a:xfrm>
+      </p:grpSpPr>
+      <p:sp>
+        <p:nvSpPr>
+          <p:cNvPr id="2" name="Title 1"/>
+          <p:cNvSpPr>
+            <a:spLocks noGrp="1"/>
+          </p:cNvSpPr>
+          <p:nvPr>
+            <p:ph type="title"/>
+          </p:nvPr>
+        </p:nvSpPr>
+        <p:spPr>
+          <a:gradFill>
+            <a:gsLst>
+              <a:gs pos="0">
+                <a:schemeClr val="accent1">
+                  <a:lumMod val="5000"/>
+                  <a:lumOff val="95000"/>
+                </a:schemeClr>
+              </a:gs>
+              <a:gs pos="74000">
+                <a:schemeClr val="accent1">
+                  <a:lumMod val="45000"/>
+                  <a:lumOff val="55000"/>
+                </a:schemeClr>
+              </a:gs>
+              <a:gs pos="83000">
+                <a:schemeClr val="accent1">
+                  <a:lumMod val="45000"/>
+                  <a:lumOff val="55000"/>
+                </a:schemeClr>
+              </a:gs>
+              <a:gs pos="100000">
+                <a:schemeClr val="accent1">
+                  <a:lumMod val="30000"/>
+                  <a:lumOff val="70000"/>
+                </a:schemeClr>
+              </a:gs>
+            </a:gsLst>
+            <a:lin ang="5400000" scaled="1"/>
+          </a:gradFill>
+        </p:spPr>
+        <p:txBody>
+          <a:bodyPr>
+            <a:normAutofit/>
+          </a:bodyPr>
+          <a:lstStyle/>
+          <a:p>
+            <a:pPr algn="ctr"/>
+            <a:r>
+              <a:rPr lang="en-US" dirty="0" smtClean="0"/>
+              <a:t>List of Lists (LIL)</a:t>
+            </a:r>
+            <a:endParaRPr lang="en-US" dirty="0"/>
+          </a:p>
+        </p:txBody>
+      </p:sp>
+      <mc:AlternateContent xmlns:mc="http://schemas.openxmlformats.org/markup-compatibility/2006">
+        <mc:Choice xmlns:a14="http://schemas.microsoft.com/office/drawing/2010/main" Requires="a14">
+          <p:sp>
+            <p:nvSpPr>
+              <p:cNvPr id="5" name="TextBox 4"/>
+              <p:cNvSpPr txBox="1"/>
+              <p:nvPr/>
+            </p:nvSpPr>
+            <p:spPr>
+              <a:xfrm>
+                <a:off x="1728895" y="3177309"/>
+                <a:ext cx="7884466" cy="1086836"/>
+              </a:xfrm>
+              <a:prstGeom prst="rect">
+                <a:avLst/>
+              </a:prstGeom>
+              <a:noFill/>
+            </p:spPr>
+            <p:txBody>
+              <a:bodyPr wrap="none" lIns="0" tIns="0" rIns="0" bIns="0" rtlCol="0">
+                <a:spAutoFit/>
+              </a:bodyPr>
+              <a:lstStyle/>
+              <a:p>
+                <a14:m>
+                  <m:oMathPara xmlns:m="http://schemas.openxmlformats.org/officeDocument/2006/math">
+                    <m:oMathParaPr>
+                      <m:jc m:val="centerGroup"/>
+                    </m:oMathParaPr>
+                    <m:oMath xmlns:m="http://schemas.openxmlformats.org/officeDocument/2006/math">
+                      <m:r>
+                        <a:rPr lang="en-US" sz="3600" b="0" i="1" smtClean="0">
+                          <a:latin typeface="Cambria Math" panose="02040503050406030204" pitchFamily="18" charset="0"/>
+                        </a:rPr>
+                        <m:t>𝐴</m:t>
+                      </m:r>
+                      <m:r>
+                        <a:rPr lang="en-US" sz="3600" b="0" i="1" smtClean="0">
+                          <a:latin typeface="Cambria Math" panose="02040503050406030204" pitchFamily="18" charset="0"/>
+                        </a:rPr>
+                        <m:t>=</m:t>
+                      </m:r>
+                      <m:d>
+                        <m:dPr>
+                          <m:begChr m:val="["/>
+                          <m:endChr m:val="]"/>
+                          <m:ctrlPr>
+                            <a:rPr lang="en-US" sz="3600" b="0" i="1" smtClean="0">
+                              <a:latin typeface="Cambria Math" panose="02040503050406030204" pitchFamily="18" charset="0"/>
+                            </a:rPr>
+                          </m:ctrlPr>
+                        </m:dPr>
+                        <m:e>
+                          <m:eqArr>
+                            <m:eqArrPr>
+                              <m:ctrlPr>
+                                <a:rPr lang="en-US" sz="3600" b="0" i="1" smtClean="0">
+                                  <a:latin typeface="Cambria Math" panose="02040503050406030204" pitchFamily="18" charset="0"/>
+                                </a:rPr>
+                              </m:ctrlPr>
+                            </m:eqArrPr>
+                            <m:e>
+                              <m:d>
+                                <m:dPr>
+                                  <m:begChr m:val="["/>
+                                  <m:endChr m:val="]"/>
+                                  <m:ctrlPr>
+                                    <a:rPr lang="en-US" sz="3600" b="0" i="1" smtClean="0">
+                                      <a:latin typeface="Cambria Math" panose="02040503050406030204" pitchFamily="18" charset="0"/>
+                                    </a:rPr>
+                                  </m:ctrlPr>
+                                </m:dPr>
+                                <m:e>
+                                  <m:d>
+                                    <m:dPr>
+                                      <m:ctrlPr>
+                                        <a:rPr lang="en-US" sz="3600" b="0" i="1" smtClean="0">
+                                          <a:latin typeface="Cambria Math" panose="02040503050406030204" pitchFamily="18" charset="0"/>
+                                        </a:rPr>
+                                      </m:ctrlPr>
+                                    </m:dPr>
+                                    <m:e>
+                                      <m:r>
+                                        <a:rPr lang="en-US" sz="3600" b="0" i="1" smtClean="0">
+                                          <a:latin typeface="Cambria Math" panose="02040503050406030204" pitchFamily="18" charset="0"/>
+                                        </a:rPr>
+                                        <m:t>0, 10</m:t>
+                                      </m:r>
+                                    </m:e>
+                                  </m:d>
+                                  <m:r>
+                                    <a:rPr lang="en-US" sz="3600" b="0" i="1" smtClean="0">
+                                      <a:latin typeface="Cambria Math" panose="02040503050406030204" pitchFamily="18" charset="0"/>
+                                    </a:rPr>
+                                    <m:t>, </m:t>
+                                  </m:r>
+                                  <m:d>
+                                    <m:dPr>
+                                      <m:ctrlPr>
+                                        <a:rPr lang="en-US" sz="3600" b="0" i="1" smtClean="0">
+                                          <a:latin typeface="Cambria Math" panose="02040503050406030204" pitchFamily="18" charset="0"/>
+                                        </a:rPr>
+                                      </m:ctrlPr>
+                                    </m:dPr>
+                                    <m:e>
+                                      <m:r>
+                                        <a:rPr lang="en-US" sz="3600" b="0" i="1" smtClean="0">
+                                          <a:latin typeface="Cambria Math" panose="02040503050406030204" pitchFamily="18" charset="0"/>
+                                        </a:rPr>
+                                        <m:t>1, 20</m:t>
+                                      </m:r>
+                                    </m:e>
+                                  </m:d>
+                                </m:e>
+                              </m:d>
+                              <m:r>
+                                <a:rPr lang="en-US" sz="3600" b="0" i="1" smtClean="0">
+                                  <a:latin typeface="Cambria Math" panose="02040503050406030204" pitchFamily="18" charset="0"/>
+                                </a:rPr>
+                                <m:t>, </m:t>
+                              </m:r>
+                              <m:d>
+                                <m:dPr>
+                                  <m:begChr m:val="["/>
+                                  <m:endChr m:val="]"/>
+                                  <m:ctrlPr>
+                                    <a:rPr lang="en-US" sz="3600" b="0" i="1" smtClean="0">
+                                      <a:latin typeface="Cambria Math" panose="02040503050406030204" pitchFamily="18" charset="0"/>
+                                    </a:rPr>
+                                  </m:ctrlPr>
+                                </m:dPr>
+                                <m:e>
+                                  <m:d>
+                                    <m:dPr>
+                                      <m:ctrlPr>
+                                        <a:rPr lang="en-US" sz="3600" b="0" i="1" smtClean="0">
+                                          <a:latin typeface="Cambria Math" panose="02040503050406030204" pitchFamily="18" charset="0"/>
+                                        </a:rPr>
+                                      </m:ctrlPr>
+                                    </m:dPr>
+                                    <m:e>
+                                      <m:r>
+                                        <a:rPr lang="en-US" sz="3600" b="0" i="1" smtClean="0">
+                                          <a:latin typeface="Cambria Math" panose="02040503050406030204" pitchFamily="18" charset="0"/>
+                                        </a:rPr>
+                                        <m:t>1, 30</m:t>
+                                      </m:r>
+                                    </m:e>
+                                  </m:d>
+                                  <m:r>
+                                    <a:rPr lang="en-US" sz="3600" b="0" i="1" smtClean="0">
+                                      <a:latin typeface="Cambria Math" panose="02040503050406030204" pitchFamily="18" charset="0"/>
+                                    </a:rPr>
+                                    <m:t>, </m:t>
+                                  </m:r>
+                                  <m:d>
+                                    <m:dPr>
+                                      <m:ctrlPr>
+                                        <a:rPr lang="en-US" sz="3600" b="0" i="1" smtClean="0">
+                                          <a:latin typeface="Cambria Math" panose="02040503050406030204" pitchFamily="18" charset="0"/>
+                                        </a:rPr>
+                                      </m:ctrlPr>
+                                    </m:dPr>
+                                    <m:e>
+                                      <m:r>
+                                        <a:rPr lang="en-US" sz="3600" b="0" i="1" smtClean="0">
+                                          <a:latin typeface="Cambria Math" panose="02040503050406030204" pitchFamily="18" charset="0"/>
+                                        </a:rPr>
+                                        <m:t>3, 40</m:t>
+                                      </m:r>
+                                    </m:e>
+                                  </m:d>
+                                </m:e>
+                              </m:d>
+                              <m:r>
+                                <a:rPr lang="en-US" sz="3600" b="0" i="1" smtClean="0">
+                                  <a:latin typeface="Cambria Math" panose="02040503050406030204" pitchFamily="18" charset="0"/>
+                                </a:rPr>
+                                <m:t>,</m:t>
+                              </m:r>
+                            </m:e>
+                            <m:e>
+                              <m:d>
+                                <m:dPr>
+                                  <m:begChr m:val="["/>
+                                  <m:endChr m:val="]"/>
+                                  <m:ctrlPr>
+                                    <a:rPr lang="en-US" sz="3600" b="0" i="1" smtClean="0">
+                                      <a:latin typeface="Cambria Math" panose="02040503050406030204" pitchFamily="18" charset="0"/>
+                                    </a:rPr>
+                                  </m:ctrlPr>
+                                </m:dPr>
+                                <m:e>
+                                  <m:d>
+                                    <m:dPr>
+                                      <m:ctrlPr>
+                                        <a:rPr lang="en-US" sz="3600" b="0" i="1" smtClean="0">
+                                          <a:latin typeface="Cambria Math" panose="02040503050406030204" pitchFamily="18" charset="0"/>
+                                        </a:rPr>
+                                      </m:ctrlPr>
+                                    </m:dPr>
+                                    <m:e>
+                                      <m:r>
+                                        <a:rPr lang="en-US" sz="3600" b="0" i="1" smtClean="0">
+                                          <a:latin typeface="Cambria Math" panose="02040503050406030204" pitchFamily="18" charset="0"/>
+                                        </a:rPr>
+                                        <m:t>2, 50</m:t>
+                                      </m:r>
+                                    </m:e>
+                                  </m:d>
+                                  <m:r>
+                                    <a:rPr lang="en-US" sz="3600" b="0" i="1" smtClean="0">
+                                      <a:latin typeface="Cambria Math" panose="02040503050406030204" pitchFamily="18" charset="0"/>
+                                    </a:rPr>
+                                    <m:t>, </m:t>
+                                  </m:r>
+                                  <m:d>
+                                    <m:dPr>
+                                      <m:ctrlPr>
+                                        <a:rPr lang="en-US" sz="3600" b="0" i="1" smtClean="0">
+                                          <a:latin typeface="Cambria Math" panose="02040503050406030204" pitchFamily="18" charset="0"/>
+                                        </a:rPr>
+                                      </m:ctrlPr>
+                                    </m:dPr>
+                                    <m:e>
+                                      <m:r>
+                                        <a:rPr lang="en-US" sz="3600" b="0" i="1" smtClean="0">
+                                          <a:latin typeface="Cambria Math" panose="02040503050406030204" pitchFamily="18" charset="0"/>
+                                        </a:rPr>
+                                        <m:t>3, 60</m:t>
+                                      </m:r>
+                                    </m:e>
+                                  </m:d>
+                                  <m:r>
+                                    <a:rPr lang="en-US" sz="3600" b="0" i="1" smtClean="0">
+                                      <a:latin typeface="Cambria Math" panose="02040503050406030204" pitchFamily="18" charset="0"/>
+                                    </a:rPr>
+                                    <m:t>, </m:t>
+                                  </m:r>
+                                  <m:d>
+                                    <m:dPr>
+                                      <m:ctrlPr>
+                                        <a:rPr lang="en-US" sz="3600" b="0" i="1" smtClean="0">
+                                          <a:latin typeface="Cambria Math" panose="02040503050406030204" pitchFamily="18" charset="0"/>
+                                        </a:rPr>
+                                      </m:ctrlPr>
+                                    </m:dPr>
+                                    <m:e>
+                                      <m:r>
+                                        <a:rPr lang="en-US" sz="3600" b="0" i="1" smtClean="0">
+                                          <a:latin typeface="Cambria Math" panose="02040503050406030204" pitchFamily="18" charset="0"/>
+                                        </a:rPr>
+                                        <m:t>4, 70</m:t>
+                                      </m:r>
+                                    </m:e>
+                                  </m:d>
+                                </m:e>
+                              </m:d>
+                              <m:r>
+                                <a:rPr lang="en-US" sz="3600" b="0" i="1" smtClean="0">
+                                  <a:latin typeface="Cambria Math" panose="02040503050406030204" pitchFamily="18" charset="0"/>
+                                </a:rPr>
+                                <m:t>, </m:t>
+                              </m:r>
+                              <m:d>
+                                <m:dPr>
+                                  <m:begChr m:val="["/>
+                                  <m:endChr m:val="]"/>
+                                  <m:ctrlPr>
+                                    <a:rPr lang="en-US" sz="3600" b="0" i="1" smtClean="0">
+                                      <a:latin typeface="Cambria Math" panose="02040503050406030204" pitchFamily="18" charset="0"/>
+                                    </a:rPr>
+                                  </m:ctrlPr>
+                                </m:dPr>
+                                <m:e>
+                                  <m:d>
+                                    <m:dPr>
+                                      <m:ctrlPr>
+                                        <a:rPr lang="en-US" sz="3600" b="0" i="1" smtClean="0">
+                                          <a:latin typeface="Cambria Math" panose="02040503050406030204" pitchFamily="18" charset="0"/>
+                                        </a:rPr>
+                                      </m:ctrlPr>
+                                    </m:dPr>
+                                    <m:e>
+                                      <m:r>
+                                        <a:rPr lang="en-US" sz="3600" b="0" i="1" smtClean="0">
+                                          <a:latin typeface="Cambria Math" panose="02040503050406030204" pitchFamily="18" charset="0"/>
+                                        </a:rPr>
+                                        <m:t>5, 80</m:t>
+                                      </m:r>
+                                    </m:e>
+                                  </m:d>
+                                </m:e>
+                              </m:d>
+                            </m:e>
+                          </m:eqArr>
+                        </m:e>
+                      </m:d>
+                    </m:oMath>
+                  </m:oMathPara>
+                </a14:m>
+                <a:endParaRPr lang="en-US" sz="3600" dirty="0"/>
+              </a:p>
+            </p:txBody>
+          </p:sp>
+        </mc:Choice>
+        <mc:Fallback>
+          <p:sp>
+            <p:nvSpPr>
+              <p:cNvPr id="5" name="TextBox 4"/>
+              <p:cNvSpPr txBox="1">
+                <a:spLocks noRot="1" noChangeAspect="1" noMove="1" noResize="1" noEditPoints="1" noAdjustHandles="1" noChangeArrowheads="1" noChangeShapeType="1" noTextEdit="1"/>
+              </p:cNvSpPr>
+              <p:nvPr/>
+            </p:nvSpPr>
+            <p:spPr>
+              <a:xfrm>
+                <a:off x="1728895" y="3177309"/>
+                <a:ext cx="7884466" cy="1086836"/>
+              </a:xfrm>
+              <a:prstGeom prst="rect">
+                <a:avLst/>
+              </a:prstGeom>
+              <a:blipFill>
+                <a:blip r:embed="rId2"/>
+                <a:stretch>
+                  <a:fillRect/>
+                </a:stretch>
+              </a:blipFill>
+            </p:spPr>
+            <p:txBody>
+              <a:bodyPr/>
+              <a:lstStyle/>
+              <a:p>
+                <a:r>
+                  <a:rPr lang="en-US">
+                    <a:noFill/>
+                  </a:rPr>
+                  <a:t> </a:t>
+                </a:r>
+              </a:p>
+            </p:txBody>
+          </p:sp>
+        </mc:Fallback>
+      </mc:AlternateContent>
+    </p:spTree>
+    <p:extLst>
+      <p:ext uri="{BB962C8B-B14F-4D97-AF65-F5344CB8AC3E}">
+        <p14:creationId xmlns:p14="http://schemas.microsoft.com/office/powerpoint/2010/main" val="3680985726"/>
       </p:ext>
     </p:extLst>
   </p:cSld>
@@ -4818,8 +7647,8 @@
           </a:p>
         </p:txBody>
       </p:sp>
-      <mc:AlternateContent xmlns:mc="http://schemas.openxmlformats.org/markup-compatibility/2006">
-        <mc:Choice xmlns:a14="http://schemas.microsoft.com/office/drawing/2010/main" Requires="a14">
+      <mc:AlternateContent xmlns:mc="http://schemas.openxmlformats.org/markup-compatibility/2006" xmlns:a14="http://schemas.microsoft.com/office/drawing/2010/main">
+        <mc:Choice Requires="a14">
           <p:sp>
             <p:nvSpPr>
               <p:cNvPr id="3" name="Content Placeholder 2"/>
@@ -4952,7 +7781,6 @@
                   <a:rPr lang="en-US" sz="3400" dirty="0" smtClean="0"/>
                   <a:t>In other words, the adjacency matrix would take 1250 terabytes.</a:t>
                 </a:r>
-                <a:endParaRPr lang="en-US" sz="3400" dirty="0" smtClean="0"/>
               </a:p>
               <a:p>
                 <a:pPr marL="0" indent="0" algn="just">
@@ -4966,7 +7794,7 @@
             </p:txBody>
           </p:sp>
         </mc:Choice>
-        <mc:Fallback>
+        <mc:Fallback xmlns="">
           <p:sp>
             <p:nvSpPr>
               <p:cNvPr id="3" name="Content Placeholder 2"/>
@@ -5182,7 +8010,7 @@
 </file>
 
 <file path=ppt/slides/slide7.xml><?xml version="1.0" encoding="utf-8"?>
-<p:sld xmlns:a="http://schemas.openxmlformats.org/drawingml/2006/main" xmlns:r="http://schemas.openxmlformats.org/officeDocument/2006/relationships" xmlns:p="http://schemas.openxmlformats.org/presentationml/2006/main" show="0">
+<p:sld xmlns:a="http://schemas.openxmlformats.org/drawingml/2006/main" xmlns:r="http://schemas.openxmlformats.org/officeDocument/2006/relationships" xmlns:p="http://schemas.openxmlformats.org/presentationml/2006/main">
   <p:cSld>
     <p:spTree>
       <p:nvGrpSpPr>
@@ -5282,13 +8110,8 @@
             </a:r>
             <a:r>
               <a:rPr lang="en-US" sz="3400" dirty="0" smtClean="0"/>
-              <a:t> sparse matrix is a matrix in which most of the elements are </a:t>
-            </a:r>
-            <a:r>
-              <a:rPr lang="en-US" sz="3400" dirty="0" smtClean="0"/>
-              <a:t>zero.</a:t>
-            </a:r>
-            <a:endParaRPr lang="en-US" sz="3400" dirty="0" smtClean="0"/>
+              <a:t> sparse matrix is a matrix in which most of the elements are zero.</a:t>
+            </a:r>
           </a:p>
           <a:p>
             <a:pPr algn="just">
@@ -5306,7 +8129,15 @@
             </a:pPr>
             <a:r>
               <a:rPr lang="en-US" sz="3400" dirty="0" smtClean="0"/>
-              <a:t>By contrast, if most of the elements in a matrix are nonzero, then the matrix is considered dense.</a:t>
+              <a:t>By contrast, if most of the elements in a matrix are </a:t>
+            </a:r>
+            <a:r>
+              <a:rPr lang="en-US" sz="3400" dirty="0" smtClean="0"/>
+              <a:t>non-zero</a:t>
+            </a:r>
+            <a:r>
+              <a:rPr lang="en-US" sz="3400" dirty="0" smtClean="0"/>
+              <a:t>, then the matrix is considered dense.</a:t>
             </a:r>
           </a:p>
           <a:p>
@@ -5350,7 +8181,7 @@
 </file>
 
 <file path=ppt/slides/slide8.xml><?xml version="1.0" encoding="utf-8"?>
-<p:sld xmlns:a="http://schemas.openxmlformats.org/drawingml/2006/main" xmlns:r="http://schemas.openxmlformats.org/officeDocument/2006/relationships" xmlns:p="http://schemas.openxmlformats.org/presentationml/2006/main" show="0">
+<p:sld xmlns:a="http://schemas.openxmlformats.org/drawingml/2006/main" xmlns:r="http://schemas.openxmlformats.org/officeDocument/2006/relationships" xmlns:p="http://schemas.openxmlformats.org/presentationml/2006/main">
   <p:cSld>
     <p:spTree>
       <p:nvGrpSpPr>
@@ -5466,23 +8297,7 @@
             </a:pPr>
             <a:r>
               <a:rPr lang="en-US" sz="3400" dirty="0" smtClean="0"/>
-              <a:t>The number of zero-valued </a:t>
-            </a:r>
-            <a:r>
-              <a:rPr lang="en-US" sz="3400" dirty="0" smtClean="0"/>
-              <a:t>entries </a:t>
-            </a:r>
-            <a:r>
-              <a:rPr lang="en-US" sz="3400" dirty="0" smtClean="0"/>
-              <a:t>in a matrix, divided by the total number of </a:t>
-            </a:r>
-            <a:r>
-              <a:rPr lang="en-US" sz="3400" dirty="0" smtClean="0"/>
-              <a:t>entries </a:t>
-            </a:r>
-            <a:r>
-              <a:rPr lang="en-US" sz="3400" dirty="0" smtClean="0"/>
-              <a:t>in that matrix, is referred to as the sparsity of that matrix.</a:t>
+              <a:t>The number of zero-valued entries in a matrix, divided by the total number of entries in that matrix, is referred to as the sparsity of that matrix.</a:t>
             </a:r>
             <a:endParaRPr lang="en-US" sz="3400" dirty="0"/>
           </a:p>
@@ -5510,7 +8325,7 @@
 </file>
 
 <file path=ppt/slides/slide9.xml><?xml version="1.0" encoding="utf-8"?>
-<p:sld xmlns:a="http://schemas.openxmlformats.org/drawingml/2006/main" xmlns:r="http://schemas.openxmlformats.org/officeDocument/2006/relationships" xmlns:p="http://schemas.openxmlformats.org/presentationml/2006/main" show="0">
+<p:sld xmlns:a="http://schemas.openxmlformats.org/drawingml/2006/main" xmlns:r="http://schemas.openxmlformats.org/officeDocument/2006/relationships" xmlns:p="http://schemas.openxmlformats.org/presentationml/2006/main">
   <p:cSld>
     <p:spTree>
       <p:nvGrpSpPr>
@@ -5643,11 +8458,7 @@
             </a:r>
             <a:r>
               <a:rPr lang="en-US" sz="3200" i="1" dirty="0" smtClean="0"/>
-              <a:t> ed., Page </a:t>
-            </a:r>
-            <a:r>
-              <a:rPr lang="en-US" sz="3200" i="1" dirty="0" smtClean="0"/>
-              <a:t>465.</a:t>
+              <a:t> ed., Page 465.</a:t>
             </a:r>
             <a:endParaRPr lang="en-US" sz="3200" dirty="0"/>
           </a:p>

</xml_diff>